<commit_message>
Phase 0 Step 4 - Simple Broadcast Event
</commit_message>
<xml_diff>
--- a/Illustrations.pptx
+++ b/Illustrations.pptx
@@ -9,6 +9,9 @@
     <p:sldId id="257" r:id="rId3"/>
     <p:sldId id="258" r:id="rId4"/>
     <p:sldId id="259" r:id="rId5"/>
+    <p:sldId id="260" r:id="rId6"/>
+    <p:sldId id="261" r:id="rId7"/>
+    <p:sldId id="262" r:id="rId8"/>
   </p:sldIdLst>
   <p:sldSz cx="6659563" cy="4679950"/>
   <p:notesSz cx="6858000" cy="9144000"/>
@@ -4263,7 +4266,7 @@
           <a:p>
             <a:r>
               <a:rPr lang="en-IN" sz="1200" b="1"/>
-              <a:t>Client Side:</a:t>
+              <a:t>Client Side: (Sender)</a:t>
             </a:r>
           </a:p>
           <a:p>
@@ -4636,7 +4639,7 @@
           <a:p>
             <a:r>
               <a:rPr lang="en-IN" sz="1200" b="1"/>
-              <a:t>Server Side:</a:t>
+              <a:t>Server Side: (Receiver)</a:t>
             </a:r>
           </a:p>
           <a:p>
@@ -4863,6 +4866,1212 @@
     <p:extLst>
       <p:ext uri="{BB962C8B-B14F-4D97-AF65-F5344CB8AC3E}">
         <p14:creationId xmlns:p14="http://schemas.microsoft.com/office/powerpoint/2010/main" val="3326448650"/>
+      </p:ext>
+    </p:extLst>
+  </p:cSld>
+  <p:clrMapOvr>
+    <a:masterClrMapping/>
+  </p:clrMapOvr>
+</p:sld>
+</file>
+
+<file path=ppt/slides/slide5.xml><?xml version="1.0" encoding="utf-8"?>
+<p:sld xmlns:a="http://schemas.openxmlformats.org/drawingml/2006/main" xmlns:r="http://schemas.openxmlformats.org/officeDocument/2006/relationships" xmlns:p="http://schemas.openxmlformats.org/presentationml/2006/main">
+  <p:cSld>
+    <p:spTree>
+      <p:nvGrpSpPr>
+        <p:cNvPr id="1" name=""/>
+        <p:cNvGrpSpPr/>
+        <p:nvPr/>
+      </p:nvGrpSpPr>
+      <p:grpSpPr>
+        <a:xfrm>
+          <a:off x="0" y="0"/>
+          <a:ext cx="0" cy="0"/>
+          <a:chOff x="0" y="0"/>
+          <a:chExt cx="0" cy="0"/>
+        </a:xfrm>
+      </p:grpSpPr>
+      <p:sp>
+        <p:nvSpPr>
+          <p:cNvPr id="7" name="TextBox 6">
+            <a:extLst>
+              <a:ext uri="{FF2B5EF4-FFF2-40B4-BE49-F238E27FC236}">
+                <a16:creationId xmlns:a16="http://schemas.microsoft.com/office/drawing/2014/main" id="{342C9C4D-8096-4F7B-9016-6C449FB864BB}"/>
+              </a:ext>
+            </a:extLst>
+          </p:cNvPr>
+          <p:cNvSpPr txBox="1"/>
+          <p:nvPr/>
+        </p:nvSpPr>
+        <p:spPr>
+          <a:xfrm>
+            <a:off x="0" y="0"/>
+            <a:ext cx="910827" cy="369332"/>
+          </a:xfrm>
+          <a:prstGeom prst="rect">
+            <a:avLst/>
+          </a:prstGeom>
+          <a:solidFill>
+            <a:srgbClr val="FFFF00"/>
+          </a:solidFill>
+        </p:spPr>
+        <p:txBody>
+          <a:bodyPr wrap="none" rtlCol="0">
+            <a:spAutoFit/>
+          </a:bodyPr>
+          <a:lstStyle/>
+          <a:p>
+            <a:r>
+              <a:rPr lang="en-IN"/>
+              <a:t>Phase 0</a:t>
+            </a:r>
+          </a:p>
+        </p:txBody>
+      </p:sp>
+      <p:sp>
+        <p:nvSpPr>
+          <p:cNvPr id="10" name="Rectangle 9">
+            <a:extLst>
+              <a:ext uri="{FF2B5EF4-FFF2-40B4-BE49-F238E27FC236}">
+                <a16:creationId xmlns:a16="http://schemas.microsoft.com/office/drawing/2014/main" id="{42FA6294-7392-4952-B39B-FC61CCE74675}"/>
+              </a:ext>
+            </a:extLst>
+          </p:cNvPr>
+          <p:cNvSpPr/>
+          <p:nvPr/>
+        </p:nvSpPr>
+        <p:spPr>
+          <a:xfrm>
+            <a:off x="87786" y="503112"/>
+            <a:ext cx="2712602" cy="769441"/>
+          </a:xfrm>
+          <a:prstGeom prst="rect">
+            <a:avLst/>
+          </a:prstGeom>
+        </p:spPr>
+        <p:txBody>
+          <a:bodyPr wrap="none">
+            <a:spAutoFit/>
+          </a:bodyPr>
+          <a:lstStyle/>
+          <a:p>
+            <a:r>
+              <a:rPr lang="en-IN" sz="1200">
+                <a:hlinkClick r:id="rId2"/>
+              </a:rPr>
+              <a:t>https://socket.io/get-started/chat/</a:t>
+            </a:r>
+            <a:endParaRPr lang="en-IN" sz="1200"/>
+          </a:p>
+          <a:p>
+            <a:endParaRPr lang="en-IN" sz="1200"/>
+          </a:p>
+          <a:p>
+            <a:r>
+              <a:rPr lang="en-IN" sz="1200" b="1"/>
+              <a:t>Broadcasting Events </a:t>
+            </a:r>
+          </a:p>
+          <a:p>
+            <a:r>
+              <a:rPr lang="en-IN" sz="800"/>
+              <a:t>(Server broadcasting new messages it received, to all clients)</a:t>
+            </a:r>
+          </a:p>
+        </p:txBody>
+      </p:sp>
+      <p:sp>
+        <p:nvSpPr>
+          <p:cNvPr id="11" name="Rectangle 10">
+            <a:extLst>
+              <a:ext uri="{FF2B5EF4-FFF2-40B4-BE49-F238E27FC236}">
+                <a16:creationId xmlns:a16="http://schemas.microsoft.com/office/drawing/2014/main" id="{073194BA-38AD-4684-AE47-A2A3913C1A8C}"/>
+              </a:ext>
+            </a:extLst>
+          </p:cNvPr>
+          <p:cNvSpPr/>
+          <p:nvPr/>
+        </p:nvSpPr>
+        <p:spPr>
+          <a:xfrm>
+            <a:off x="1261345" y="1445876"/>
+            <a:ext cx="805133" cy="226901"/>
+          </a:xfrm>
+          <a:prstGeom prst="rect">
+            <a:avLst/>
+          </a:prstGeom>
+        </p:spPr>
+        <p:style>
+          <a:lnRef idx="2">
+            <a:schemeClr val="accent1">
+              <a:shade val="50000"/>
+            </a:schemeClr>
+          </a:lnRef>
+          <a:fillRef idx="1">
+            <a:schemeClr val="accent1"/>
+          </a:fillRef>
+          <a:effectRef idx="0">
+            <a:schemeClr val="accent1"/>
+          </a:effectRef>
+          <a:fontRef idx="minor">
+            <a:schemeClr val="lt1"/>
+          </a:fontRef>
+        </p:style>
+        <p:txBody>
+          <a:bodyPr rot="0" spcFirstLastPara="0" vertOverflow="overflow" horzOverflow="overflow" vert="horz" wrap="square" lIns="37695" tIns="18847" rIns="37695" bIns="18847" numCol="1" spcCol="0" rtlCol="0" fromWordArt="0" anchor="ctr" anchorCtr="0" forceAA="0" compatLnSpc="1">
+            <a:prstTxWarp prst="textNoShape">
+              <a:avLst/>
+            </a:prstTxWarp>
+            <a:noAutofit/>
+          </a:bodyPr>
+          <a:lstStyle/>
+          <a:p>
+            <a:pPr algn="ctr"/>
+            <a:r>
+              <a:rPr lang="en-IN" sz="1200"/>
+              <a:t>Client</a:t>
+            </a:r>
+          </a:p>
+        </p:txBody>
+      </p:sp>
+      <p:sp>
+        <p:nvSpPr>
+          <p:cNvPr id="12" name="Rectangle 11">
+            <a:extLst>
+              <a:ext uri="{FF2B5EF4-FFF2-40B4-BE49-F238E27FC236}">
+                <a16:creationId xmlns:a16="http://schemas.microsoft.com/office/drawing/2014/main" id="{AD1647D1-ECB3-4E5B-9979-0DDC4EB91C74}"/>
+              </a:ext>
+            </a:extLst>
+          </p:cNvPr>
+          <p:cNvSpPr/>
+          <p:nvPr/>
+        </p:nvSpPr>
+        <p:spPr>
+          <a:xfrm>
+            <a:off x="4277870" y="1445876"/>
+            <a:ext cx="805133" cy="226901"/>
+          </a:xfrm>
+          <a:prstGeom prst="rect">
+            <a:avLst/>
+          </a:prstGeom>
+        </p:spPr>
+        <p:style>
+          <a:lnRef idx="2">
+            <a:schemeClr val="accent1">
+              <a:shade val="50000"/>
+            </a:schemeClr>
+          </a:lnRef>
+          <a:fillRef idx="1">
+            <a:schemeClr val="accent1"/>
+          </a:fillRef>
+          <a:effectRef idx="0">
+            <a:schemeClr val="accent1"/>
+          </a:effectRef>
+          <a:fontRef idx="minor">
+            <a:schemeClr val="lt1"/>
+          </a:fontRef>
+        </p:style>
+        <p:txBody>
+          <a:bodyPr rot="0" spcFirstLastPara="0" vertOverflow="overflow" horzOverflow="overflow" vert="horz" wrap="square" lIns="37695" tIns="18847" rIns="37695" bIns="18847" numCol="1" spcCol="0" rtlCol="0" fromWordArt="0" anchor="ctr" anchorCtr="0" forceAA="0" compatLnSpc="1">
+            <a:prstTxWarp prst="textNoShape">
+              <a:avLst/>
+            </a:prstTxWarp>
+            <a:noAutofit/>
+          </a:bodyPr>
+          <a:lstStyle/>
+          <a:p>
+            <a:pPr algn="ctr"/>
+            <a:r>
+              <a:rPr lang="en-IN" sz="1200"/>
+              <a:t>Server</a:t>
+            </a:r>
+          </a:p>
+        </p:txBody>
+      </p:sp>
+      <p:cxnSp>
+        <p:nvCxnSpPr>
+          <p:cNvPr id="13" name="Straight Connector 12">
+            <a:extLst>
+              <a:ext uri="{FF2B5EF4-FFF2-40B4-BE49-F238E27FC236}">
+                <a16:creationId xmlns:a16="http://schemas.microsoft.com/office/drawing/2014/main" id="{5F94E9C4-1AB0-4FC0-807F-4ACB19F2CFD4}"/>
+              </a:ext>
+            </a:extLst>
+          </p:cNvPr>
+          <p:cNvCxnSpPr>
+            <a:stCxn id="11" idx="2"/>
+          </p:cNvCxnSpPr>
+          <p:nvPr/>
+        </p:nvCxnSpPr>
+        <p:spPr>
+          <a:xfrm>
+            <a:off x="1663909" y="1672777"/>
+            <a:ext cx="0" cy="607509"/>
+          </a:xfrm>
+          <a:prstGeom prst="line">
+            <a:avLst/>
+          </a:prstGeom>
+        </p:spPr>
+        <p:style>
+          <a:lnRef idx="1">
+            <a:schemeClr val="accent1"/>
+          </a:lnRef>
+          <a:fillRef idx="0">
+            <a:schemeClr val="accent1"/>
+          </a:fillRef>
+          <a:effectRef idx="0">
+            <a:schemeClr val="accent1"/>
+          </a:effectRef>
+          <a:fontRef idx="minor">
+            <a:schemeClr val="tx1"/>
+          </a:fontRef>
+        </p:style>
+      </p:cxnSp>
+      <p:cxnSp>
+        <p:nvCxnSpPr>
+          <p:cNvPr id="14" name="Straight Connector 13">
+            <a:extLst>
+              <a:ext uri="{FF2B5EF4-FFF2-40B4-BE49-F238E27FC236}">
+                <a16:creationId xmlns:a16="http://schemas.microsoft.com/office/drawing/2014/main" id="{B965A9A8-AD22-4A6D-A84C-40B9540F2410}"/>
+              </a:ext>
+            </a:extLst>
+          </p:cNvPr>
+          <p:cNvCxnSpPr>
+            <a:cxnSpLocks/>
+            <a:stCxn id="12" idx="2"/>
+          </p:cNvCxnSpPr>
+          <p:nvPr/>
+        </p:nvCxnSpPr>
+        <p:spPr>
+          <a:xfrm>
+            <a:off x="4680434" y="1672777"/>
+            <a:ext cx="0" cy="586161"/>
+          </a:xfrm>
+          <a:prstGeom prst="line">
+            <a:avLst/>
+          </a:prstGeom>
+        </p:spPr>
+        <p:style>
+          <a:lnRef idx="1">
+            <a:schemeClr val="accent1"/>
+          </a:lnRef>
+          <a:fillRef idx="0">
+            <a:schemeClr val="accent1"/>
+          </a:fillRef>
+          <a:effectRef idx="0">
+            <a:schemeClr val="accent1"/>
+          </a:effectRef>
+          <a:fontRef idx="minor">
+            <a:schemeClr val="tx1"/>
+          </a:fontRef>
+        </p:style>
+      </p:cxnSp>
+      <p:cxnSp>
+        <p:nvCxnSpPr>
+          <p:cNvPr id="15" name="Straight Arrow Connector 14">
+            <a:extLst>
+              <a:ext uri="{FF2B5EF4-FFF2-40B4-BE49-F238E27FC236}">
+                <a16:creationId xmlns:a16="http://schemas.microsoft.com/office/drawing/2014/main" id="{48970C91-A5CF-47AF-A38C-964027451FF1}"/>
+              </a:ext>
+            </a:extLst>
+          </p:cNvPr>
+          <p:cNvCxnSpPr>
+            <a:cxnSpLocks/>
+          </p:cNvCxnSpPr>
+          <p:nvPr/>
+        </p:nvCxnSpPr>
+        <p:spPr>
+          <a:xfrm>
+            <a:off x="1663911" y="1969210"/>
+            <a:ext cx="3016525" cy="0"/>
+          </a:xfrm>
+          <a:prstGeom prst="straightConnector1">
+            <a:avLst/>
+          </a:prstGeom>
+          <a:ln w="38100">
+            <a:headEnd type="triangle" w="med" len="med"/>
+            <a:tailEnd type="none" w="med" len="med"/>
+          </a:ln>
+        </p:spPr>
+        <p:style>
+          <a:lnRef idx="1">
+            <a:schemeClr val="accent1"/>
+          </a:lnRef>
+          <a:fillRef idx="0">
+            <a:schemeClr val="accent1"/>
+          </a:fillRef>
+          <a:effectRef idx="0">
+            <a:schemeClr val="accent1"/>
+          </a:effectRef>
+          <a:fontRef idx="minor">
+            <a:schemeClr val="tx1"/>
+          </a:fontRef>
+        </p:style>
+      </p:cxnSp>
+      <p:sp>
+        <p:nvSpPr>
+          <p:cNvPr id="16" name="TextBox 15">
+            <a:extLst>
+              <a:ext uri="{FF2B5EF4-FFF2-40B4-BE49-F238E27FC236}">
+                <a16:creationId xmlns:a16="http://schemas.microsoft.com/office/drawing/2014/main" id="{44D3EA67-0390-4198-A6FA-386C8BF90166}"/>
+              </a:ext>
+            </a:extLst>
+          </p:cNvPr>
+          <p:cNvSpPr txBox="1"/>
+          <p:nvPr/>
+        </p:nvSpPr>
+        <p:spPr>
+          <a:xfrm>
+            <a:off x="2355593" y="1786228"/>
+            <a:ext cx="1184170" cy="276999"/>
+          </a:xfrm>
+          <a:prstGeom prst="rect">
+            <a:avLst/>
+          </a:prstGeom>
+          <a:solidFill>
+            <a:schemeClr val="tx2">
+              <a:lumMod val="20000"/>
+              <a:lumOff val="80000"/>
+            </a:schemeClr>
+          </a:solidFill>
+        </p:spPr>
+        <p:txBody>
+          <a:bodyPr wrap="none" rtlCol="0">
+            <a:spAutoFit/>
+          </a:bodyPr>
+          <a:lstStyle/>
+          <a:p>
+            <a:r>
+              <a:rPr lang="en-IN" sz="1200"/>
+              <a:t>Broadcast Event</a:t>
+            </a:r>
+          </a:p>
+        </p:txBody>
+      </p:sp>
+      <p:sp>
+        <p:nvSpPr>
+          <p:cNvPr id="17" name="TextBox 16">
+            <a:extLst>
+              <a:ext uri="{FF2B5EF4-FFF2-40B4-BE49-F238E27FC236}">
+                <a16:creationId xmlns:a16="http://schemas.microsoft.com/office/drawing/2014/main" id="{C130C983-AA29-4D5D-A657-9DC74DBE4D37}"/>
+              </a:ext>
+            </a:extLst>
+          </p:cNvPr>
+          <p:cNvSpPr txBox="1"/>
+          <p:nvPr/>
+        </p:nvSpPr>
+        <p:spPr>
+          <a:xfrm>
+            <a:off x="3626490" y="2573230"/>
+            <a:ext cx="2175596" cy="400110"/>
+          </a:xfrm>
+          <a:prstGeom prst="rect">
+            <a:avLst/>
+          </a:prstGeom>
+          <a:noFill/>
+        </p:spPr>
+        <p:txBody>
+          <a:bodyPr wrap="none" rtlCol="0">
+            <a:spAutoFit/>
+          </a:bodyPr>
+          <a:lstStyle/>
+          <a:p>
+            <a:r>
+              <a:rPr lang="en-IN" sz="1000">
+                <a:solidFill>
+                  <a:srgbClr val="0070C0"/>
+                </a:solidFill>
+              </a:rPr>
+              <a:t>socketServer</a:t>
+            </a:r>
+            <a:r>
+              <a:rPr lang="en-IN" sz="1000"/>
+              <a:t>.emit(“</a:t>
+            </a:r>
+            <a:r>
+              <a:rPr lang="en-IN" sz="1000">
+                <a:solidFill>
+                  <a:srgbClr val="0070C0"/>
+                </a:solidFill>
+              </a:rPr>
+              <a:t>Broadcast Event</a:t>
+            </a:r>
+            <a:r>
+              <a:rPr lang="en-IN" sz="1000"/>
+              <a:t>”, </a:t>
+            </a:r>
+          </a:p>
+          <a:p>
+            <a:r>
+              <a:rPr lang="en-IN" sz="1000"/>
+              <a:t> //message to be broadcastsed);</a:t>
+            </a:r>
+          </a:p>
+        </p:txBody>
+      </p:sp>
+      <p:sp>
+        <p:nvSpPr>
+          <p:cNvPr id="18" name="TextBox 17">
+            <a:extLst>
+              <a:ext uri="{FF2B5EF4-FFF2-40B4-BE49-F238E27FC236}">
+                <a16:creationId xmlns:a16="http://schemas.microsoft.com/office/drawing/2014/main" id="{5D40AE96-E7CE-449B-ACD3-CAF28D1CF4E3}"/>
+              </a:ext>
+            </a:extLst>
+          </p:cNvPr>
+          <p:cNvSpPr txBox="1"/>
+          <p:nvPr/>
+        </p:nvSpPr>
+        <p:spPr>
+          <a:xfrm>
+            <a:off x="374851" y="2405941"/>
+            <a:ext cx="2101857" cy="707886"/>
+          </a:xfrm>
+          <a:prstGeom prst="rect">
+            <a:avLst/>
+          </a:prstGeom>
+          <a:noFill/>
+        </p:spPr>
+        <p:txBody>
+          <a:bodyPr wrap="none" rtlCol="0">
+            <a:spAutoFit/>
+          </a:bodyPr>
+          <a:lstStyle/>
+          <a:p>
+            <a:r>
+              <a:rPr lang="en-IN" sz="1000">
+                <a:solidFill>
+                  <a:srgbClr val="0070C0"/>
+                </a:solidFill>
+              </a:rPr>
+              <a:t>socketClient</a:t>
+            </a:r>
+            <a:r>
+              <a:rPr lang="en-IN" sz="1000"/>
+              <a:t>.on(“</a:t>
+            </a:r>
+            <a:r>
+              <a:rPr lang="en-IN" sz="1000">
+                <a:solidFill>
+                  <a:srgbClr val="0070C0"/>
+                </a:solidFill>
+              </a:rPr>
+              <a:t>Broadcast Event</a:t>
+            </a:r>
+            <a:r>
+              <a:rPr lang="en-IN" sz="1000"/>
+              <a:t>”, ..</a:t>
+            </a:r>
+          </a:p>
+          <a:p>
+            <a:r>
+              <a:rPr lang="en-IN" sz="1000"/>
+              <a:t>{</a:t>
+            </a:r>
+          </a:p>
+          <a:p>
+            <a:r>
+              <a:rPr lang="en-IN" sz="1000"/>
+              <a:t>	//update that in page</a:t>
+            </a:r>
+          </a:p>
+          <a:p>
+            <a:r>
+              <a:rPr lang="en-IN" sz="1000"/>
+              <a:t>}</a:t>
+            </a:r>
+          </a:p>
+        </p:txBody>
+      </p:sp>
+      <p:sp>
+        <p:nvSpPr>
+          <p:cNvPr id="3" name="Rectangle 2">
+            <a:extLst>
+              <a:ext uri="{FF2B5EF4-FFF2-40B4-BE49-F238E27FC236}">
+                <a16:creationId xmlns:a16="http://schemas.microsoft.com/office/drawing/2014/main" id="{9C6BF3BC-9B36-4222-A1B7-A96402DBAD21}"/>
+              </a:ext>
+            </a:extLst>
+          </p:cNvPr>
+          <p:cNvSpPr/>
+          <p:nvPr/>
+        </p:nvSpPr>
+        <p:spPr>
+          <a:xfrm>
+            <a:off x="402778" y="3379292"/>
+            <a:ext cx="5399308" cy="338554"/>
+          </a:xfrm>
+          <a:prstGeom prst="rect">
+            <a:avLst/>
+          </a:prstGeom>
+        </p:spPr>
+        <p:txBody>
+          <a:bodyPr wrap="square">
+            <a:spAutoFit/>
+          </a:bodyPr>
+          <a:lstStyle/>
+          <a:p>
+            <a:r>
+              <a:rPr lang="en-IN" sz="800"/>
+              <a:t>We could also skip the client which sent that message in first place, using </a:t>
+            </a:r>
+            <a:r>
+              <a:rPr lang="en-IN" sz="800">
+                <a:solidFill>
+                  <a:srgbClr val="0070C0"/>
+                </a:solidFill>
+              </a:rPr>
+              <a:t>socketServer.broadcast.emit </a:t>
+            </a:r>
+            <a:r>
+              <a:rPr lang="en-IN" sz="800"/>
+              <a:t>but that’s for  later.</a:t>
+            </a:r>
+          </a:p>
+          <a:p>
+            <a:r>
+              <a:rPr lang="en-IN" sz="800"/>
+              <a:t>Now broadcasting to all clients.</a:t>
+            </a:r>
+          </a:p>
+        </p:txBody>
+      </p:sp>
+    </p:spTree>
+    <p:extLst>
+      <p:ext uri="{BB962C8B-B14F-4D97-AF65-F5344CB8AC3E}">
+        <p14:creationId xmlns:p14="http://schemas.microsoft.com/office/powerpoint/2010/main" val="1174693886"/>
+      </p:ext>
+    </p:extLst>
+  </p:cSld>
+  <p:clrMapOvr>
+    <a:masterClrMapping/>
+  </p:clrMapOvr>
+</p:sld>
+</file>
+
+<file path=ppt/slides/slide6.xml><?xml version="1.0" encoding="utf-8"?>
+<p:sld xmlns:a="http://schemas.openxmlformats.org/drawingml/2006/main" xmlns:r="http://schemas.openxmlformats.org/officeDocument/2006/relationships" xmlns:p="http://schemas.openxmlformats.org/presentationml/2006/main">
+  <p:cSld>
+    <p:spTree>
+      <p:nvGrpSpPr>
+        <p:cNvPr id="1" name=""/>
+        <p:cNvGrpSpPr/>
+        <p:nvPr/>
+      </p:nvGrpSpPr>
+      <p:grpSpPr>
+        <a:xfrm>
+          <a:off x="0" y="0"/>
+          <a:ext cx="0" cy="0"/>
+          <a:chOff x="0" y="0"/>
+          <a:chExt cx="0" cy="0"/>
+        </a:xfrm>
+      </p:grpSpPr>
+      <p:sp>
+        <p:nvSpPr>
+          <p:cNvPr id="6" name="Rectangle 5">
+            <a:extLst>
+              <a:ext uri="{FF2B5EF4-FFF2-40B4-BE49-F238E27FC236}">
+                <a16:creationId xmlns:a16="http://schemas.microsoft.com/office/drawing/2014/main" id="{62E25BB3-6005-43CB-835F-1CC72C0E70E2}"/>
+              </a:ext>
+            </a:extLst>
+          </p:cNvPr>
+          <p:cNvSpPr/>
+          <p:nvPr/>
+        </p:nvSpPr>
+        <p:spPr>
+          <a:xfrm>
+            <a:off x="2779973" y="504145"/>
+            <a:ext cx="806631" cy="246221"/>
+          </a:xfrm>
+          <a:prstGeom prst="rect">
+            <a:avLst/>
+          </a:prstGeom>
+        </p:spPr>
+        <p:txBody>
+          <a:bodyPr wrap="none">
+            <a:spAutoFit/>
+          </a:bodyPr>
+          <a:lstStyle/>
+          <a:p>
+            <a:r>
+              <a:rPr lang="en-IN" sz="1000" b="1">
+                <a:solidFill>
+                  <a:srgbClr val="0070C0"/>
+                </a:solidFill>
+              </a:rPr>
+              <a:t>Actual code</a:t>
+            </a:r>
+          </a:p>
+        </p:txBody>
+      </p:sp>
+      <p:sp>
+        <p:nvSpPr>
+          <p:cNvPr id="7" name="TextBox 6">
+            <a:extLst>
+              <a:ext uri="{FF2B5EF4-FFF2-40B4-BE49-F238E27FC236}">
+                <a16:creationId xmlns:a16="http://schemas.microsoft.com/office/drawing/2014/main" id="{342C9C4D-8096-4F7B-9016-6C449FB864BB}"/>
+              </a:ext>
+            </a:extLst>
+          </p:cNvPr>
+          <p:cNvSpPr txBox="1"/>
+          <p:nvPr/>
+        </p:nvSpPr>
+        <p:spPr>
+          <a:xfrm>
+            <a:off x="0" y="0"/>
+            <a:ext cx="910827" cy="369332"/>
+          </a:xfrm>
+          <a:prstGeom prst="rect">
+            <a:avLst/>
+          </a:prstGeom>
+          <a:solidFill>
+            <a:srgbClr val="FFFF00"/>
+          </a:solidFill>
+        </p:spPr>
+        <p:txBody>
+          <a:bodyPr wrap="none" rtlCol="0">
+            <a:spAutoFit/>
+          </a:bodyPr>
+          <a:lstStyle/>
+          <a:p>
+            <a:r>
+              <a:rPr lang="en-IN"/>
+              <a:t>Phase 0</a:t>
+            </a:r>
+          </a:p>
+        </p:txBody>
+      </p:sp>
+      <p:sp>
+        <p:nvSpPr>
+          <p:cNvPr id="9" name="Rectangle 8">
+            <a:extLst>
+              <a:ext uri="{FF2B5EF4-FFF2-40B4-BE49-F238E27FC236}">
+                <a16:creationId xmlns:a16="http://schemas.microsoft.com/office/drawing/2014/main" id="{CC705658-8A7C-4427-B68C-465AABC2CB31}"/>
+              </a:ext>
+            </a:extLst>
+          </p:cNvPr>
+          <p:cNvSpPr/>
+          <p:nvPr/>
+        </p:nvSpPr>
+        <p:spPr>
+          <a:xfrm>
+            <a:off x="0" y="466206"/>
+            <a:ext cx="2693366" cy="1569660"/>
+          </a:xfrm>
+          <a:prstGeom prst="rect">
+            <a:avLst/>
+          </a:prstGeom>
+        </p:spPr>
+        <p:txBody>
+          <a:bodyPr wrap="none">
+            <a:spAutoFit/>
+          </a:bodyPr>
+          <a:lstStyle/>
+          <a:p>
+            <a:r>
+              <a:rPr lang="en-IN" sz="1200" b="1"/>
+              <a:t>Server Side:  (Sender)</a:t>
+            </a:r>
+          </a:p>
+          <a:p>
+            <a:endParaRPr lang="en-IN" sz="1000" b="1">
+              <a:solidFill>
+                <a:srgbClr val="0070C0"/>
+              </a:solidFill>
+            </a:endParaRPr>
+          </a:p>
+          <a:p>
+            <a:r>
+              <a:rPr lang="en-IN" sz="1000" b="1">
+                <a:solidFill>
+                  <a:srgbClr val="0070C0"/>
+                </a:solidFill>
+              </a:rPr>
+              <a:t>Psuedocode</a:t>
+            </a:r>
+          </a:p>
+          <a:p>
+            <a:r>
+              <a:rPr lang="en-IN" sz="800" i="1"/>
+              <a:t>Inside socket connected code module..</a:t>
+            </a:r>
+          </a:p>
+          <a:p>
+            <a:endParaRPr lang="en-IN" sz="800"/>
+          </a:p>
+          <a:p>
+            <a:r>
+              <a:rPr lang="en-IN" sz="800"/>
+              <a:t>(when socketFromClient receives “New Message Event”)</a:t>
+            </a:r>
+          </a:p>
+          <a:p>
+            <a:r>
+              <a:rPr lang="en-IN" sz="800"/>
+              <a:t>{</a:t>
+            </a:r>
+          </a:p>
+          <a:p>
+            <a:r>
+              <a:rPr lang="en-IN" sz="800"/>
+              <a:t>	</a:t>
+            </a:r>
+            <a:r>
+              <a:rPr lang="en-IN" sz="800">
+                <a:solidFill>
+                  <a:srgbClr val="0070C0"/>
+                </a:solidFill>
+              </a:rPr>
+              <a:t>(broadcast that to all clients incl, one that sent it)</a:t>
+            </a:r>
+          </a:p>
+          <a:p>
+            <a:r>
+              <a:rPr lang="en-IN" sz="800">
+                <a:solidFill>
+                  <a:srgbClr val="0070C0"/>
+                </a:solidFill>
+              </a:rPr>
+              <a:t>	(event name: Broadcast Event)</a:t>
+            </a:r>
+          </a:p>
+          <a:p>
+            <a:r>
+              <a:rPr lang="en-IN" sz="800"/>
+              <a:t>}</a:t>
+            </a:r>
+          </a:p>
+          <a:p>
+            <a:endParaRPr lang="en-IN" sz="800"/>
+          </a:p>
+        </p:txBody>
+      </p:sp>
+      <p:pic>
+        <p:nvPicPr>
+          <p:cNvPr id="10" name="Picture 9">
+            <a:extLst>
+              <a:ext uri="{FF2B5EF4-FFF2-40B4-BE49-F238E27FC236}">
+                <a16:creationId xmlns:a16="http://schemas.microsoft.com/office/drawing/2014/main" id="{F19135B8-9F19-4064-B467-E1B1DB906B9E}"/>
+              </a:ext>
+            </a:extLst>
+          </p:cNvPr>
+          <p:cNvPicPr>
+            <a:picLocks noChangeAspect="1"/>
+          </p:cNvPicPr>
+          <p:nvPr/>
+        </p:nvPicPr>
+        <p:blipFill>
+          <a:blip r:embed="rId2">
+            <a:extLst>
+              <a:ext uri="{28A0092B-C50C-407E-A947-70E740481C1C}">
+                <a14:useLocalDpi xmlns:a14="http://schemas.microsoft.com/office/drawing/2010/main" val="0"/>
+              </a:ext>
+            </a:extLst>
+          </a:blip>
+          <a:stretch>
+            <a:fillRect/>
+          </a:stretch>
+        </p:blipFill>
+        <p:spPr>
+          <a:xfrm>
+            <a:off x="2859050" y="773251"/>
+            <a:ext cx="3350754" cy="3350754"/>
+          </a:xfrm>
+          <a:prstGeom prst="rect">
+            <a:avLst/>
+          </a:prstGeom>
+        </p:spPr>
+      </p:pic>
+      <p:sp>
+        <p:nvSpPr>
+          <p:cNvPr id="11" name="Rectangle: Rounded Corners 10">
+            <a:extLst>
+              <a:ext uri="{FF2B5EF4-FFF2-40B4-BE49-F238E27FC236}">
+                <a16:creationId xmlns:a16="http://schemas.microsoft.com/office/drawing/2014/main" id="{406E592F-84D4-4476-A5BD-8D3058CA53BD}"/>
+              </a:ext>
+            </a:extLst>
+          </p:cNvPr>
+          <p:cNvSpPr/>
+          <p:nvPr/>
+        </p:nvSpPr>
+        <p:spPr>
+          <a:xfrm>
+            <a:off x="3526884" y="2399181"/>
+            <a:ext cx="2682920" cy="245829"/>
+          </a:xfrm>
+          <a:prstGeom prst="roundRect">
+            <a:avLst/>
+          </a:prstGeom>
+          <a:solidFill>
+            <a:srgbClr val="FFFF00">
+              <a:alpha val="22000"/>
+            </a:srgbClr>
+          </a:solidFill>
+          <a:ln>
+            <a:noFill/>
+          </a:ln>
+        </p:spPr>
+        <p:style>
+          <a:lnRef idx="2">
+            <a:schemeClr val="accent1">
+              <a:shade val="50000"/>
+            </a:schemeClr>
+          </a:lnRef>
+          <a:fillRef idx="1">
+            <a:schemeClr val="accent1"/>
+          </a:fillRef>
+          <a:effectRef idx="0">
+            <a:schemeClr val="accent1"/>
+          </a:effectRef>
+          <a:fontRef idx="minor">
+            <a:schemeClr val="lt1"/>
+          </a:fontRef>
+        </p:style>
+        <p:txBody>
+          <a:bodyPr rtlCol="0" anchor="ctr"/>
+          <a:lstStyle/>
+          <a:p>
+            <a:pPr algn="ctr"/>
+            <a:endParaRPr lang="en-IN"/>
+          </a:p>
+        </p:txBody>
+      </p:sp>
+    </p:spTree>
+    <p:extLst>
+      <p:ext uri="{BB962C8B-B14F-4D97-AF65-F5344CB8AC3E}">
+        <p14:creationId xmlns:p14="http://schemas.microsoft.com/office/powerpoint/2010/main" val="4146875712"/>
+      </p:ext>
+    </p:extLst>
+  </p:cSld>
+  <p:clrMapOvr>
+    <a:masterClrMapping/>
+  </p:clrMapOvr>
+</p:sld>
+</file>
+
+<file path=ppt/slides/slide7.xml><?xml version="1.0" encoding="utf-8"?>
+<p:sld xmlns:a="http://schemas.openxmlformats.org/drawingml/2006/main" xmlns:r="http://schemas.openxmlformats.org/officeDocument/2006/relationships" xmlns:p="http://schemas.openxmlformats.org/presentationml/2006/main">
+  <p:cSld>
+    <p:spTree>
+      <p:nvGrpSpPr>
+        <p:cNvPr id="1" name=""/>
+        <p:cNvGrpSpPr/>
+        <p:nvPr/>
+      </p:nvGrpSpPr>
+      <p:grpSpPr>
+        <a:xfrm>
+          <a:off x="0" y="0"/>
+          <a:ext cx="0" cy="0"/>
+          <a:chOff x="0" y="0"/>
+          <a:chExt cx="0" cy="0"/>
+        </a:xfrm>
+      </p:grpSpPr>
+      <p:sp>
+        <p:nvSpPr>
+          <p:cNvPr id="2" name="Rectangle 1">
+            <a:extLst>
+              <a:ext uri="{FF2B5EF4-FFF2-40B4-BE49-F238E27FC236}">
+                <a16:creationId xmlns:a16="http://schemas.microsoft.com/office/drawing/2014/main" id="{F2D05F09-4166-4506-8EA4-126E04E70349}"/>
+              </a:ext>
+            </a:extLst>
+          </p:cNvPr>
+          <p:cNvSpPr/>
+          <p:nvPr/>
+        </p:nvSpPr>
+        <p:spPr>
+          <a:xfrm>
+            <a:off x="0" y="391621"/>
+            <a:ext cx="2231701" cy="1815882"/>
+          </a:xfrm>
+          <a:prstGeom prst="rect">
+            <a:avLst/>
+          </a:prstGeom>
+        </p:spPr>
+        <p:txBody>
+          <a:bodyPr wrap="none">
+            <a:spAutoFit/>
+          </a:bodyPr>
+          <a:lstStyle/>
+          <a:p>
+            <a:r>
+              <a:rPr lang="en-IN" sz="1200" b="1"/>
+              <a:t>Client Side: (Receiver)</a:t>
+            </a:r>
+          </a:p>
+          <a:p>
+            <a:endParaRPr lang="en-IN" sz="1000" b="1">
+              <a:solidFill>
+                <a:srgbClr val="0070C0"/>
+              </a:solidFill>
+            </a:endParaRPr>
+          </a:p>
+          <a:p>
+            <a:r>
+              <a:rPr lang="en-IN" sz="1000" b="1">
+                <a:solidFill>
+                  <a:srgbClr val="0070C0"/>
+                </a:solidFill>
+              </a:rPr>
+              <a:t>Psuedocode</a:t>
+            </a:r>
+          </a:p>
+          <a:p>
+            <a:r>
+              <a:rPr lang="en-IN" sz="800"/>
+              <a:t>(when document is ready)</a:t>
+            </a:r>
+          </a:p>
+          <a:p>
+            <a:r>
+              <a:rPr lang="en-IN" sz="800"/>
+              <a:t>{</a:t>
+            </a:r>
+          </a:p>
+          <a:p>
+            <a:r>
+              <a:rPr lang="en-IN" sz="800"/>
+              <a:t>	// after previous stuff</a:t>
+            </a:r>
+          </a:p>
+          <a:p>
+            <a:r>
+              <a:rPr lang="en-IN" sz="800"/>
+              <a:t>	(</a:t>
+            </a:r>
+            <a:r>
+              <a:rPr lang="en-IN" sz="800">
+                <a:solidFill>
+                  <a:srgbClr val="0070C0"/>
+                </a:solidFill>
+              </a:rPr>
+              <a:t>when server broadcast anything, </a:t>
+            </a:r>
+          </a:p>
+          <a:p>
+            <a:r>
+              <a:rPr lang="en-IN" sz="800">
+                <a:solidFill>
+                  <a:srgbClr val="0070C0"/>
+                </a:solidFill>
+              </a:rPr>
+              <a:t>	get that by agreed event name </a:t>
+            </a:r>
+          </a:p>
+          <a:p>
+            <a:r>
+              <a:rPr lang="en-IN" sz="800">
+                <a:solidFill>
+                  <a:srgbClr val="0070C0"/>
+                </a:solidFill>
+              </a:rPr>
+              <a:t>	“Broadcast event” along with its data</a:t>
+            </a:r>
+            <a:r>
+              <a:rPr lang="en-IN" sz="800"/>
+              <a:t>)</a:t>
+            </a:r>
+          </a:p>
+          <a:p>
+            <a:r>
+              <a:rPr lang="en-IN" sz="800"/>
+              <a:t>	{</a:t>
+            </a:r>
+          </a:p>
+          <a:p>
+            <a:r>
+              <a:rPr lang="en-IN" sz="800"/>
+              <a:t>		</a:t>
+            </a:r>
+            <a:r>
+              <a:rPr lang="en-IN" sz="800">
+                <a:solidFill>
+                  <a:srgbClr val="0070C0"/>
+                </a:solidFill>
+              </a:rPr>
+              <a:t>update that data in html</a:t>
+            </a:r>
+          </a:p>
+          <a:p>
+            <a:r>
+              <a:rPr lang="en-IN" sz="800"/>
+              <a:t>	}</a:t>
+            </a:r>
+          </a:p>
+          <a:p>
+            <a:r>
+              <a:rPr lang="en-IN" sz="800"/>
+              <a:t>}</a:t>
+            </a:r>
+          </a:p>
+        </p:txBody>
+      </p:sp>
+      <p:sp>
+        <p:nvSpPr>
+          <p:cNvPr id="6" name="Rectangle 5">
+            <a:extLst>
+              <a:ext uri="{FF2B5EF4-FFF2-40B4-BE49-F238E27FC236}">
+                <a16:creationId xmlns:a16="http://schemas.microsoft.com/office/drawing/2014/main" id="{62E25BB3-6005-43CB-835F-1CC72C0E70E2}"/>
+              </a:ext>
+            </a:extLst>
+          </p:cNvPr>
+          <p:cNvSpPr/>
+          <p:nvPr/>
+        </p:nvSpPr>
+        <p:spPr>
+          <a:xfrm>
+            <a:off x="2180205" y="518561"/>
+            <a:ext cx="806631" cy="246221"/>
+          </a:xfrm>
+          <a:prstGeom prst="rect">
+            <a:avLst/>
+          </a:prstGeom>
+        </p:spPr>
+        <p:txBody>
+          <a:bodyPr wrap="none">
+            <a:spAutoFit/>
+          </a:bodyPr>
+          <a:lstStyle/>
+          <a:p>
+            <a:r>
+              <a:rPr lang="en-IN" sz="1000" b="1">
+                <a:solidFill>
+                  <a:srgbClr val="0070C0"/>
+                </a:solidFill>
+              </a:rPr>
+              <a:t>Actual code</a:t>
+            </a:r>
+          </a:p>
+        </p:txBody>
+      </p:sp>
+      <p:sp>
+        <p:nvSpPr>
+          <p:cNvPr id="7" name="TextBox 6">
+            <a:extLst>
+              <a:ext uri="{FF2B5EF4-FFF2-40B4-BE49-F238E27FC236}">
+                <a16:creationId xmlns:a16="http://schemas.microsoft.com/office/drawing/2014/main" id="{342C9C4D-8096-4F7B-9016-6C449FB864BB}"/>
+              </a:ext>
+            </a:extLst>
+          </p:cNvPr>
+          <p:cNvSpPr txBox="1"/>
+          <p:nvPr/>
+        </p:nvSpPr>
+        <p:spPr>
+          <a:xfrm>
+            <a:off x="0" y="0"/>
+            <a:ext cx="910827" cy="369332"/>
+          </a:xfrm>
+          <a:prstGeom prst="rect">
+            <a:avLst/>
+          </a:prstGeom>
+          <a:solidFill>
+            <a:srgbClr val="FFFF00"/>
+          </a:solidFill>
+        </p:spPr>
+        <p:txBody>
+          <a:bodyPr wrap="none" rtlCol="0">
+            <a:spAutoFit/>
+          </a:bodyPr>
+          <a:lstStyle/>
+          <a:p>
+            <a:r>
+              <a:rPr lang="en-IN"/>
+              <a:t>Phase 0</a:t>
+            </a:r>
+          </a:p>
+        </p:txBody>
+      </p:sp>
+      <p:pic>
+        <p:nvPicPr>
+          <p:cNvPr id="4" name="Picture 3">
+            <a:extLst>
+              <a:ext uri="{FF2B5EF4-FFF2-40B4-BE49-F238E27FC236}">
+                <a16:creationId xmlns:a16="http://schemas.microsoft.com/office/drawing/2014/main" id="{C847226E-B515-4BC3-A456-DE819615F52C}"/>
+              </a:ext>
+            </a:extLst>
+          </p:cNvPr>
+          <p:cNvPicPr>
+            <a:picLocks noChangeAspect="1"/>
+          </p:cNvPicPr>
+          <p:nvPr/>
+        </p:nvPicPr>
+        <p:blipFill>
+          <a:blip r:embed="rId2">
+            <a:extLst>
+              <a:ext uri="{28A0092B-C50C-407E-A947-70E740481C1C}">
+                <a14:useLocalDpi xmlns:a14="http://schemas.microsoft.com/office/drawing/2010/main" val="0"/>
+              </a:ext>
+            </a:extLst>
+          </a:blip>
+          <a:stretch>
+            <a:fillRect/>
+          </a:stretch>
+        </p:blipFill>
+        <p:spPr>
+          <a:xfrm>
+            <a:off x="2225158" y="764782"/>
+            <a:ext cx="4341338" cy="3776533"/>
+          </a:xfrm>
+          <a:prstGeom prst="rect">
+            <a:avLst/>
+          </a:prstGeom>
+        </p:spPr>
+      </p:pic>
+      <p:sp>
+        <p:nvSpPr>
+          <p:cNvPr id="8" name="Rectangle: Rounded Corners 7">
+            <a:extLst>
+              <a:ext uri="{FF2B5EF4-FFF2-40B4-BE49-F238E27FC236}">
+                <a16:creationId xmlns:a16="http://schemas.microsoft.com/office/drawing/2014/main" id="{92DA42D1-1EDE-4805-AF83-1B1C749BA7B3}"/>
+              </a:ext>
+            </a:extLst>
+          </p:cNvPr>
+          <p:cNvSpPr/>
+          <p:nvPr/>
+        </p:nvSpPr>
+        <p:spPr>
+          <a:xfrm>
+            <a:off x="2729085" y="3215390"/>
+            <a:ext cx="3720810" cy="1025217"/>
+          </a:xfrm>
+          <a:prstGeom prst="roundRect">
+            <a:avLst/>
+          </a:prstGeom>
+          <a:solidFill>
+            <a:srgbClr val="FFFF00">
+              <a:alpha val="22000"/>
+            </a:srgbClr>
+          </a:solidFill>
+          <a:ln>
+            <a:noFill/>
+          </a:ln>
+        </p:spPr>
+        <p:style>
+          <a:lnRef idx="2">
+            <a:schemeClr val="accent1">
+              <a:shade val="50000"/>
+            </a:schemeClr>
+          </a:lnRef>
+          <a:fillRef idx="1">
+            <a:schemeClr val="accent1"/>
+          </a:fillRef>
+          <a:effectRef idx="0">
+            <a:schemeClr val="accent1"/>
+          </a:effectRef>
+          <a:fontRef idx="minor">
+            <a:schemeClr val="lt1"/>
+          </a:fontRef>
+        </p:style>
+        <p:txBody>
+          <a:bodyPr rtlCol="0" anchor="ctr"/>
+          <a:lstStyle/>
+          <a:p>
+            <a:pPr algn="ctr"/>
+            <a:endParaRPr lang="en-IN"/>
+          </a:p>
+        </p:txBody>
+      </p:sp>
+    </p:spTree>
+    <p:extLst>
+      <p:ext uri="{BB962C8B-B14F-4D97-AF65-F5344CB8AC3E}">
+        <p14:creationId xmlns:p14="http://schemas.microsoft.com/office/powerpoint/2010/main" val="2102416717"/>
       </p:ext>
     </p:extLst>
   </p:cSld>

</xml_diff>

<commit_message>
upgraded UI 1 with bootstrap 4
</commit_message>
<xml_diff>
--- a/Illustrations.pptx
+++ b/Illustrations.pptx
@@ -12,6 +12,10 @@
     <p:sldId id="260" r:id="rId6"/>
     <p:sldId id="261" r:id="rId7"/>
     <p:sldId id="262" r:id="rId8"/>
+    <p:sldId id="263" r:id="rId9"/>
+    <p:sldId id="264" r:id="rId10"/>
+    <p:sldId id="265" r:id="rId11"/>
+    <p:sldId id="266" r:id="rId12"/>
   </p:sldIdLst>
   <p:sldSz cx="6659563" cy="4679950"/>
   <p:notesSz cx="6858000" cy="9144000"/>
@@ -264,7 +268,7 @@
           <a:p>
             <a:fld id="{2E87C897-2203-447C-8023-8D9097301B59}" type="datetimeFigureOut">
               <a:rPr lang="en-IN" smtClean="0"/>
-              <a:t>20-10-2017</a:t>
+              <a:t>05-11-2017</a:t>
             </a:fld>
             <a:endParaRPr lang="en-IN"/>
           </a:p>
@@ -434,7 +438,7 @@
           <a:p>
             <a:fld id="{2E87C897-2203-447C-8023-8D9097301B59}" type="datetimeFigureOut">
               <a:rPr lang="en-IN" smtClean="0"/>
-              <a:t>20-10-2017</a:t>
+              <a:t>05-11-2017</a:t>
             </a:fld>
             <a:endParaRPr lang="en-IN"/>
           </a:p>
@@ -614,7 +618,7 @@
           <a:p>
             <a:fld id="{2E87C897-2203-447C-8023-8D9097301B59}" type="datetimeFigureOut">
               <a:rPr lang="en-IN" smtClean="0"/>
-              <a:t>20-10-2017</a:t>
+              <a:t>05-11-2017</a:t>
             </a:fld>
             <a:endParaRPr lang="en-IN"/>
           </a:p>
@@ -784,7 +788,7 @@
           <a:p>
             <a:fld id="{2E87C897-2203-447C-8023-8D9097301B59}" type="datetimeFigureOut">
               <a:rPr lang="en-IN" smtClean="0"/>
-              <a:t>20-10-2017</a:t>
+              <a:t>05-11-2017</a:t>
             </a:fld>
             <a:endParaRPr lang="en-IN"/>
           </a:p>
@@ -1028,7 +1032,7 @@
           <a:p>
             <a:fld id="{2E87C897-2203-447C-8023-8D9097301B59}" type="datetimeFigureOut">
               <a:rPr lang="en-IN" smtClean="0"/>
-              <a:t>20-10-2017</a:t>
+              <a:t>05-11-2017</a:t>
             </a:fld>
             <a:endParaRPr lang="en-IN"/>
           </a:p>
@@ -1260,7 +1264,7 @@
           <a:p>
             <a:fld id="{2E87C897-2203-447C-8023-8D9097301B59}" type="datetimeFigureOut">
               <a:rPr lang="en-IN" smtClean="0"/>
-              <a:t>20-10-2017</a:t>
+              <a:t>05-11-2017</a:t>
             </a:fld>
             <a:endParaRPr lang="en-IN"/>
           </a:p>
@@ -1627,7 +1631,7 @@
           <a:p>
             <a:fld id="{2E87C897-2203-447C-8023-8D9097301B59}" type="datetimeFigureOut">
               <a:rPr lang="en-IN" smtClean="0"/>
-              <a:t>20-10-2017</a:t>
+              <a:t>05-11-2017</a:t>
             </a:fld>
             <a:endParaRPr lang="en-IN"/>
           </a:p>
@@ -1745,7 +1749,7 @@
           <a:p>
             <a:fld id="{2E87C897-2203-447C-8023-8D9097301B59}" type="datetimeFigureOut">
               <a:rPr lang="en-IN" smtClean="0"/>
-              <a:t>20-10-2017</a:t>
+              <a:t>05-11-2017</a:t>
             </a:fld>
             <a:endParaRPr lang="en-IN"/>
           </a:p>
@@ -1840,7 +1844,7 @@
           <a:p>
             <a:fld id="{2E87C897-2203-447C-8023-8D9097301B59}" type="datetimeFigureOut">
               <a:rPr lang="en-IN" smtClean="0"/>
-              <a:t>20-10-2017</a:t>
+              <a:t>05-11-2017</a:t>
             </a:fld>
             <a:endParaRPr lang="en-IN"/>
           </a:p>
@@ -2117,7 +2121,7 @@
           <a:p>
             <a:fld id="{2E87C897-2203-447C-8023-8D9097301B59}" type="datetimeFigureOut">
               <a:rPr lang="en-IN" smtClean="0"/>
-              <a:t>20-10-2017</a:t>
+              <a:t>05-11-2017</a:t>
             </a:fld>
             <a:endParaRPr lang="en-IN"/>
           </a:p>
@@ -2374,7 +2378,7 @@
           <a:p>
             <a:fld id="{2E87C897-2203-447C-8023-8D9097301B59}" type="datetimeFigureOut">
               <a:rPr lang="en-IN" smtClean="0"/>
-              <a:t>20-10-2017</a:t>
+              <a:t>05-11-2017</a:t>
             </a:fld>
             <a:endParaRPr lang="en-IN"/>
           </a:p>
@@ -2587,7 +2591,7 @@
           <a:p>
             <a:fld id="{2E87C897-2203-447C-8023-8D9097301B59}" type="datetimeFigureOut">
               <a:rPr lang="en-IN" smtClean="0"/>
-              <a:t>20-10-2017</a:t>
+              <a:t>05-11-2017</a:t>
             </a:fld>
             <a:endParaRPr lang="en-IN"/>
           </a:p>
@@ -3494,6 +3498,549 @@
 </p:sld>
 </file>
 
+<file path=ppt/slides/slide10.xml><?xml version="1.0" encoding="utf-8"?>
+<p:sld xmlns:a="http://schemas.openxmlformats.org/drawingml/2006/main" xmlns:r="http://schemas.openxmlformats.org/officeDocument/2006/relationships" xmlns:p="http://schemas.openxmlformats.org/presentationml/2006/main">
+  <p:cSld>
+    <p:spTree>
+      <p:nvGrpSpPr>
+        <p:cNvPr id="1" name=""/>
+        <p:cNvGrpSpPr/>
+        <p:nvPr/>
+      </p:nvGrpSpPr>
+      <p:grpSpPr>
+        <a:xfrm>
+          <a:off x="0" y="0"/>
+          <a:ext cx="0" cy="0"/>
+          <a:chOff x="0" y="0"/>
+          <a:chExt cx="0" cy="0"/>
+        </a:xfrm>
+      </p:grpSpPr>
+      <p:sp>
+        <p:nvSpPr>
+          <p:cNvPr id="7" name="TextBox 6">
+            <a:extLst>
+              <a:ext uri="{FF2B5EF4-FFF2-40B4-BE49-F238E27FC236}">
+                <a16:creationId xmlns:a16="http://schemas.microsoft.com/office/drawing/2014/main" id="{342C9C4D-8096-4F7B-9016-6C449FB864BB}"/>
+              </a:ext>
+            </a:extLst>
+          </p:cNvPr>
+          <p:cNvSpPr txBox="1"/>
+          <p:nvPr/>
+        </p:nvSpPr>
+        <p:spPr>
+          <a:xfrm>
+            <a:off x="0" y="0"/>
+            <a:ext cx="910827" cy="369332"/>
+          </a:xfrm>
+          <a:prstGeom prst="rect">
+            <a:avLst/>
+          </a:prstGeom>
+          <a:solidFill>
+            <a:srgbClr val="FFFF00"/>
+          </a:solidFill>
+        </p:spPr>
+        <p:txBody>
+          <a:bodyPr wrap="none" rtlCol="0">
+            <a:spAutoFit/>
+          </a:bodyPr>
+          <a:lstStyle/>
+          <a:p>
+            <a:r>
+              <a:rPr lang="en-IN"/>
+              <a:t>Phase 1</a:t>
+            </a:r>
+          </a:p>
+        </p:txBody>
+      </p:sp>
+      <p:sp>
+        <p:nvSpPr>
+          <p:cNvPr id="9" name="Rectangle 8">
+            <a:extLst>
+              <a:ext uri="{FF2B5EF4-FFF2-40B4-BE49-F238E27FC236}">
+                <a16:creationId xmlns:a16="http://schemas.microsoft.com/office/drawing/2014/main" id="{2BD5C4B9-FFED-4311-BEB9-A4AE679A3CC9}"/>
+              </a:ext>
+            </a:extLst>
+          </p:cNvPr>
+          <p:cNvSpPr/>
+          <p:nvPr/>
+        </p:nvSpPr>
+        <p:spPr>
+          <a:xfrm>
+            <a:off x="87786" y="503112"/>
+            <a:ext cx="6070380" cy="276999"/>
+          </a:xfrm>
+          <a:prstGeom prst="rect">
+            <a:avLst/>
+          </a:prstGeom>
+        </p:spPr>
+        <p:txBody>
+          <a:bodyPr wrap="none">
+            <a:spAutoFit/>
+          </a:bodyPr>
+          <a:lstStyle/>
+          <a:p>
+            <a:r>
+              <a:rPr lang="en-IN" sz="1200"/>
+              <a:t>1.0 Enter username first – to be unique in current and session – then enters chat window page</a:t>
+            </a:r>
+          </a:p>
+        </p:txBody>
+      </p:sp>
+      <p:pic>
+        <p:nvPicPr>
+          <p:cNvPr id="4" name="Picture 3">
+            <a:extLst>
+              <a:ext uri="{FF2B5EF4-FFF2-40B4-BE49-F238E27FC236}">
+                <a16:creationId xmlns:a16="http://schemas.microsoft.com/office/drawing/2014/main" id="{328E867F-51BF-4FDA-B7B1-6DAAB11FB108}"/>
+              </a:ext>
+            </a:extLst>
+          </p:cNvPr>
+          <p:cNvPicPr>
+            <a:picLocks noChangeAspect="1"/>
+          </p:cNvPicPr>
+          <p:nvPr/>
+        </p:nvPicPr>
+        <p:blipFill>
+          <a:blip r:embed="rId2">
+            <a:extLst>
+              <a:ext uri="{28A0092B-C50C-407E-A947-70E740481C1C}">
+                <a14:useLocalDpi xmlns:a14="http://schemas.microsoft.com/office/drawing/2010/main" val="0"/>
+              </a:ext>
+            </a:extLst>
+          </a:blip>
+          <a:stretch>
+            <a:fillRect/>
+          </a:stretch>
+        </p:blipFill>
+        <p:spPr>
+          <a:xfrm>
+            <a:off x="306927" y="1437685"/>
+            <a:ext cx="4092961" cy="2373918"/>
+          </a:xfrm>
+          <a:prstGeom prst="rect">
+            <a:avLst/>
+          </a:prstGeom>
+        </p:spPr>
+      </p:pic>
+      <p:sp>
+        <p:nvSpPr>
+          <p:cNvPr id="18" name="Rectangle 17">
+            <a:extLst>
+              <a:ext uri="{FF2B5EF4-FFF2-40B4-BE49-F238E27FC236}">
+                <a16:creationId xmlns:a16="http://schemas.microsoft.com/office/drawing/2014/main" id="{E39D4869-66FE-4B67-AD46-C15D22E6A38E}"/>
+              </a:ext>
+            </a:extLst>
+          </p:cNvPr>
+          <p:cNvSpPr/>
+          <p:nvPr/>
+        </p:nvSpPr>
+        <p:spPr>
+          <a:xfrm>
+            <a:off x="306927" y="1095211"/>
+            <a:ext cx="5098364" cy="246221"/>
+          </a:xfrm>
+          <a:prstGeom prst="rect">
+            <a:avLst/>
+          </a:prstGeom>
+        </p:spPr>
+        <p:txBody>
+          <a:bodyPr wrap="square">
+            <a:spAutoFit/>
+          </a:bodyPr>
+          <a:lstStyle/>
+          <a:p>
+            <a:r>
+              <a:rPr lang="en-IN" sz="1000" b="1"/>
+              <a:t>How do we send validity via callback? Just as below</a:t>
+            </a:r>
+            <a:endParaRPr lang="en-IN" sz="1000"/>
+          </a:p>
+        </p:txBody>
+      </p:sp>
+      <p:sp>
+        <p:nvSpPr>
+          <p:cNvPr id="19" name="Rectangle 18">
+            <a:extLst>
+              <a:ext uri="{FF2B5EF4-FFF2-40B4-BE49-F238E27FC236}">
+                <a16:creationId xmlns:a16="http://schemas.microsoft.com/office/drawing/2014/main" id="{D255C71E-6844-45B2-80A2-0768608BCB26}"/>
+              </a:ext>
+            </a:extLst>
+          </p:cNvPr>
+          <p:cNvSpPr/>
+          <p:nvPr/>
+        </p:nvSpPr>
+        <p:spPr>
+          <a:xfrm>
+            <a:off x="228321" y="3907856"/>
+            <a:ext cx="5098364" cy="400110"/>
+          </a:xfrm>
+          <a:prstGeom prst="rect">
+            <a:avLst/>
+          </a:prstGeom>
+        </p:spPr>
+        <p:txBody>
+          <a:bodyPr wrap="square">
+            <a:spAutoFit/>
+          </a:bodyPr>
+          <a:lstStyle/>
+          <a:p>
+            <a:r>
+              <a:rPr lang="en-IN" sz="1000"/>
+              <a:t>callback(true), that value true is received as confirmation (or any argument) in callback function on caller or client side</a:t>
+            </a:r>
+          </a:p>
+        </p:txBody>
+      </p:sp>
+    </p:spTree>
+    <p:extLst>
+      <p:ext uri="{BB962C8B-B14F-4D97-AF65-F5344CB8AC3E}">
+        <p14:creationId xmlns:p14="http://schemas.microsoft.com/office/powerpoint/2010/main" val="1029210211"/>
+      </p:ext>
+    </p:extLst>
+  </p:cSld>
+  <p:clrMapOvr>
+    <a:masterClrMapping/>
+  </p:clrMapOvr>
+</p:sld>
+</file>
+
+<file path=ppt/slides/slide11.xml><?xml version="1.0" encoding="utf-8"?>
+<p:sld xmlns:a="http://schemas.openxmlformats.org/drawingml/2006/main" xmlns:r="http://schemas.openxmlformats.org/officeDocument/2006/relationships" xmlns:p="http://schemas.openxmlformats.org/presentationml/2006/main">
+  <p:cSld>
+    <p:spTree>
+      <p:nvGrpSpPr>
+        <p:cNvPr id="1" name=""/>
+        <p:cNvGrpSpPr/>
+        <p:nvPr/>
+      </p:nvGrpSpPr>
+      <p:grpSpPr>
+        <a:xfrm>
+          <a:off x="0" y="0"/>
+          <a:ext cx="0" cy="0"/>
+          <a:chOff x="0" y="0"/>
+          <a:chExt cx="0" cy="0"/>
+        </a:xfrm>
+      </p:grpSpPr>
+      <p:sp>
+        <p:nvSpPr>
+          <p:cNvPr id="7" name="TextBox 6">
+            <a:extLst>
+              <a:ext uri="{FF2B5EF4-FFF2-40B4-BE49-F238E27FC236}">
+                <a16:creationId xmlns:a16="http://schemas.microsoft.com/office/drawing/2014/main" id="{342C9C4D-8096-4F7B-9016-6C449FB864BB}"/>
+              </a:ext>
+            </a:extLst>
+          </p:cNvPr>
+          <p:cNvSpPr txBox="1"/>
+          <p:nvPr/>
+        </p:nvSpPr>
+        <p:spPr>
+          <a:xfrm>
+            <a:off x="0" y="0"/>
+            <a:ext cx="910827" cy="369332"/>
+          </a:xfrm>
+          <a:prstGeom prst="rect">
+            <a:avLst/>
+          </a:prstGeom>
+          <a:solidFill>
+            <a:srgbClr val="FFFF00"/>
+          </a:solidFill>
+        </p:spPr>
+        <p:txBody>
+          <a:bodyPr wrap="none" rtlCol="0">
+            <a:spAutoFit/>
+          </a:bodyPr>
+          <a:lstStyle/>
+          <a:p>
+            <a:r>
+              <a:rPr lang="en-IN"/>
+              <a:t>Phase 1</a:t>
+            </a:r>
+          </a:p>
+        </p:txBody>
+      </p:sp>
+      <p:sp>
+        <p:nvSpPr>
+          <p:cNvPr id="9" name="Rectangle 8">
+            <a:extLst>
+              <a:ext uri="{FF2B5EF4-FFF2-40B4-BE49-F238E27FC236}">
+                <a16:creationId xmlns:a16="http://schemas.microsoft.com/office/drawing/2014/main" id="{2BD5C4B9-FFED-4311-BEB9-A4AE679A3CC9}"/>
+              </a:ext>
+            </a:extLst>
+          </p:cNvPr>
+          <p:cNvSpPr/>
+          <p:nvPr/>
+        </p:nvSpPr>
+        <p:spPr>
+          <a:xfrm>
+            <a:off x="87786" y="503112"/>
+            <a:ext cx="6070380" cy="276999"/>
+          </a:xfrm>
+          <a:prstGeom prst="rect">
+            <a:avLst/>
+          </a:prstGeom>
+        </p:spPr>
+        <p:txBody>
+          <a:bodyPr wrap="none">
+            <a:spAutoFit/>
+          </a:bodyPr>
+          <a:lstStyle/>
+          <a:p>
+            <a:r>
+              <a:rPr lang="en-IN" sz="1200"/>
+              <a:t>1.0 Enter username first – to be unique in current and session – then enters chat window page</a:t>
+            </a:r>
+          </a:p>
+        </p:txBody>
+      </p:sp>
+      <p:sp>
+        <p:nvSpPr>
+          <p:cNvPr id="13" name="Rectangle 12">
+            <a:extLst>
+              <a:ext uri="{FF2B5EF4-FFF2-40B4-BE49-F238E27FC236}">
+                <a16:creationId xmlns:a16="http://schemas.microsoft.com/office/drawing/2014/main" id="{4CEBAE59-B6DA-454E-A06A-79AE96C0D040}"/>
+              </a:ext>
+            </a:extLst>
+          </p:cNvPr>
+          <p:cNvSpPr/>
+          <p:nvPr/>
+        </p:nvSpPr>
+        <p:spPr>
+          <a:xfrm>
+            <a:off x="150665" y="1132237"/>
+            <a:ext cx="3179910" cy="375385"/>
+          </a:xfrm>
+          <a:prstGeom prst="rect">
+            <a:avLst/>
+          </a:prstGeom>
+        </p:spPr>
+        <p:style>
+          <a:lnRef idx="2">
+            <a:schemeClr val="accent1">
+              <a:shade val="50000"/>
+            </a:schemeClr>
+          </a:lnRef>
+          <a:fillRef idx="1">
+            <a:schemeClr val="accent1"/>
+          </a:fillRef>
+          <a:effectRef idx="0">
+            <a:schemeClr val="accent1"/>
+          </a:effectRef>
+          <a:fontRef idx="minor">
+            <a:schemeClr val="lt1"/>
+          </a:fontRef>
+        </p:style>
+        <p:txBody>
+          <a:bodyPr rtlCol="0" anchor="ctr"/>
+          <a:lstStyle/>
+          <a:p>
+            <a:pPr algn="ctr"/>
+            <a:endParaRPr lang="en-IN"/>
+          </a:p>
+        </p:txBody>
+      </p:sp>
+      <p:sp>
+        <p:nvSpPr>
+          <p:cNvPr id="2" name="Rectangle 1">
+            <a:extLst>
+              <a:ext uri="{FF2B5EF4-FFF2-40B4-BE49-F238E27FC236}">
+                <a16:creationId xmlns:a16="http://schemas.microsoft.com/office/drawing/2014/main" id="{6602037D-E455-459D-99AD-C010F228A28F}"/>
+              </a:ext>
+            </a:extLst>
+          </p:cNvPr>
+          <p:cNvSpPr/>
+          <p:nvPr/>
+        </p:nvSpPr>
+        <p:spPr>
+          <a:xfrm>
+            <a:off x="455413" y="1232034"/>
+            <a:ext cx="1710271" cy="173254"/>
+          </a:xfrm>
+          <a:prstGeom prst="rect">
+            <a:avLst/>
+          </a:prstGeom>
+          <a:solidFill>
+            <a:schemeClr val="bg2">
+              <a:lumMod val="90000"/>
+            </a:schemeClr>
+          </a:solidFill>
+        </p:spPr>
+        <p:style>
+          <a:lnRef idx="2">
+            <a:schemeClr val="accent1">
+              <a:shade val="50000"/>
+            </a:schemeClr>
+          </a:lnRef>
+          <a:fillRef idx="1">
+            <a:schemeClr val="accent1"/>
+          </a:fillRef>
+          <a:effectRef idx="0">
+            <a:schemeClr val="accent1"/>
+          </a:effectRef>
+          <a:fontRef idx="minor">
+            <a:schemeClr val="lt1"/>
+          </a:fontRef>
+        </p:style>
+        <p:txBody>
+          <a:bodyPr rtlCol="0" anchor="ctr"/>
+          <a:lstStyle/>
+          <a:p>
+            <a:pPr algn="ctr"/>
+            <a:r>
+              <a:rPr lang="en-IN" sz="1000">
+                <a:solidFill>
+                  <a:schemeClr val="tx1"/>
+                </a:solidFill>
+              </a:rPr>
+              <a:t>Enter user name</a:t>
+            </a:r>
+          </a:p>
+        </p:txBody>
+      </p:sp>
+      <p:sp>
+        <p:nvSpPr>
+          <p:cNvPr id="15" name="Rectangle 14">
+            <a:extLst>
+              <a:ext uri="{FF2B5EF4-FFF2-40B4-BE49-F238E27FC236}">
+                <a16:creationId xmlns:a16="http://schemas.microsoft.com/office/drawing/2014/main" id="{9E23835D-4939-40FD-BBDA-D11B3BB58E90}"/>
+              </a:ext>
+            </a:extLst>
+          </p:cNvPr>
+          <p:cNvSpPr/>
+          <p:nvPr/>
+        </p:nvSpPr>
+        <p:spPr>
+          <a:xfrm>
+            <a:off x="2348564" y="1241659"/>
+            <a:ext cx="774412" cy="163629"/>
+          </a:xfrm>
+          <a:prstGeom prst="rect">
+            <a:avLst/>
+          </a:prstGeom>
+        </p:spPr>
+        <p:style>
+          <a:lnRef idx="1">
+            <a:schemeClr val="accent2"/>
+          </a:lnRef>
+          <a:fillRef idx="3">
+            <a:schemeClr val="accent2"/>
+          </a:fillRef>
+          <a:effectRef idx="2">
+            <a:schemeClr val="accent2"/>
+          </a:effectRef>
+          <a:fontRef idx="minor">
+            <a:schemeClr val="lt1"/>
+          </a:fontRef>
+        </p:style>
+        <p:txBody>
+          <a:bodyPr rtlCol="0" anchor="ctr"/>
+          <a:lstStyle/>
+          <a:p>
+            <a:pPr algn="ctr"/>
+            <a:r>
+              <a:rPr lang="en-IN" sz="1200"/>
+              <a:t>Enter</a:t>
+            </a:r>
+          </a:p>
+        </p:txBody>
+      </p:sp>
+      <p:sp>
+        <p:nvSpPr>
+          <p:cNvPr id="16" name="Rectangle 15">
+            <a:extLst>
+              <a:ext uri="{FF2B5EF4-FFF2-40B4-BE49-F238E27FC236}">
+                <a16:creationId xmlns:a16="http://schemas.microsoft.com/office/drawing/2014/main" id="{2DD8A713-5897-4261-888B-BFE091D400EA}"/>
+              </a:ext>
+            </a:extLst>
+          </p:cNvPr>
+          <p:cNvSpPr/>
+          <p:nvPr/>
+        </p:nvSpPr>
+        <p:spPr>
+          <a:xfrm>
+            <a:off x="150665" y="1558071"/>
+            <a:ext cx="3179910" cy="2006570"/>
+          </a:xfrm>
+          <a:prstGeom prst="rect">
+            <a:avLst/>
+          </a:prstGeom>
+        </p:spPr>
+        <p:style>
+          <a:lnRef idx="2">
+            <a:schemeClr val="accent1">
+              <a:shade val="50000"/>
+            </a:schemeClr>
+          </a:lnRef>
+          <a:fillRef idx="1">
+            <a:schemeClr val="accent1"/>
+          </a:fillRef>
+          <a:effectRef idx="0">
+            <a:schemeClr val="accent1"/>
+          </a:effectRef>
+          <a:fontRef idx="minor">
+            <a:schemeClr val="lt1"/>
+          </a:fontRef>
+        </p:style>
+        <p:txBody>
+          <a:bodyPr rtlCol="0" anchor="ctr"/>
+          <a:lstStyle/>
+          <a:p>
+            <a:pPr algn="ctr"/>
+            <a:endParaRPr lang="en-IN"/>
+          </a:p>
+        </p:txBody>
+      </p:sp>
+      <p:sp>
+        <p:nvSpPr>
+          <p:cNvPr id="17" name="TextBox 16">
+            <a:extLst>
+              <a:ext uri="{FF2B5EF4-FFF2-40B4-BE49-F238E27FC236}">
+                <a16:creationId xmlns:a16="http://schemas.microsoft.com/office/drawing/2014/main" id="{587B879B-0C94-4135-B93A-3B5FFDB79A6C}"/>
+              </a:ext>
+            </a:extLst>
+          </p:cNvPr>
+          <p:cNvSpPr txBox="1"/>
+          <p:nvPr/>
+        </p:nvSpPr>
+        <p:spPr>
+          <a:xfrm>
+            <a:off x="1275697" y="2438245"/>
+            <a:ext cx="889987" cy="246221"/>
+          </a:xfrm>
+          <a:prstGeom prst="rect">
+            <a:avLst/>
+          </a:prstGeom>
+          <a:noFill/>
+        </p:spPr>
+        <p:txBody>
+          <a:bodyPr wrap="none" rtlCol="0">
+            <a:spAutoFit/>
+          </a:bodyPr>
+          <a:lstStyle/>
+          <a:p>
+            <a:r>
+              <a:rPr lang="en-IN" sz="1000">
+                <a:solidFill>
+                  <a:schemeClr val="bg1"/>
+                </a:solidFill>
+              </a:rPr>
+              <a:t>Chat Window</a:t>
+            </a:r>
+          </a:p>
+        </p:txBody>
+      </p:sp>
+    </p:spTree>
+    <p:extLst>
+      <p:ext uri="{BB962C8B-B14F-4D97-AF65-F5344CB8AC3E}">
+        <p14:creationId xmlns:p14="http://schemas.microsoft.com/office/powerpoint/2010/main" val="1672147497"/>
+      </p:ext>
+    </p:extLst>
+  </p:cSld>
+  <p:clrMapOvr>
+    <a:masterClrMapping/>
+  </p:clrMapOvr>
+</p:sld>
+</file>
+
 <file path=ppt/slides/slide2.xml><?xml version="1.0" encoding="utf-8"?>
 <p:sld xmlns:a="http://schemas.openxmlformats.org/drawingml/2006/main" xmlns:r="http://schemas.openxmlformats.org/officeDocument/2006/relationships" xmlns:p="http://schemas.openxmlformats.org/presentationml/2006/main">
   <p:cSld>
@@ -6072,6 +6619,746 @@
     <p:extLst>
       <p:ext uri="{BB962C8B-B14F-4D97-AF65-F5344CB8AC3E}">
         <p14:creationId xmlns:p14="http://schemas.microsoft.com/office/powerpoint/2010/main" val="2102416717"/>
+      </p:ext>
+    </p:extLst>
+  </p:cSld>
+  <p:clrMapOvr>
+    <a:masterClrMapping/>
+  </p:clrMapOvr>
+</p:sld>
+</file>
+
+<file path=ppt/slides/slide8.xml><?xml version="1.0" encoding="utf-8"?>
+<p:sld xmlns:a="http://schemas.openxmlformats.org/drawingml/2006/main" xmlns:r="http://schemas.openxmlformats.org/officeDocument/2006/relationships" xmlns:p="http://schemas.openxmlformats.org/presentationml/2006/main">
+  <p:cSld>
+    <p:spTree>
+      <p:nvGrpSpPr>
+        <p:cNvPr id="1" name=""/>
+        <p:cNvGrpSpPr/>
+        <p:nvPr/>
+      </p:nvGrpSpPr>
+      <p:grpSpPr>
+        <a:xfrm>
+          <a:off x="0" y="0"/>
+          <a:ext cx="0" cy="0"/>
+          <a:chOff x="0" y="0"/>
+          <a:chExt cx="0" cy="0"/>
+        </a:xfrm>
+      </p:grpSpPr>
+      <p:sp>
+        <p:nvSpPr>
+          <p:cNvPr id="7" name="TextBox 6">
+            <a:extLst>
+              <a:ext uri="{FF2B5EF4-FFF2-40B4-BE49-F238E27FC236}">
+                <a16:creationId xmlns:a16="http://schemas.microsoft.com/office/drawing/2014/main" id="{342C9C4D-8096-4F7B-9016-6C449FB864BB}"/>
+              </a:ext>
+            </a:extLst>
+          </p:cNvPr>
+          <p:cNvSpPr txBox="1"/>
+          <p:nvPr/>
+        </p:nvSpPr>
+        <p:spPr>
+          <a:xfrm>
+            <a:off x="0" y="0"/>
+            <a:ext cx="910827" cy="369332"/>
+          </a:xfrm>
+          <a:prstGeom prst="rect">
+            <a:avLst/>
+          </a:prstGeom>
+          <a:solidFill>
+            <a:srgbClr val="FFFF00"/>
+          </a:solidFill>
+        </p:spPr>
+        <p:txBody>
+          <a:bodyPr wrap="none" rtlCol="0">
+            <a:spAutoFit/>
+          </a:bodyPr>
+          <a:lstStyle/>
+          <a:p>
+            <a:r>
+              <a:rPr lang="en-IN"/>
+              <a:t>Phase 1</a:t>
+            </a:r>
+          </a:p>
+        </p:txBody>
+      </p:sp>
+      <p:sp>
+        <p:nvSpPr>
+          <p:cNvPr id="9" name="Rectangle 8">
+            <a:extLst>
+              <a:ext uri="{FF2B5EF4-FFF2-40B4-BE49-F238E27FC236}">
+                <a16:creationId xmlns:a16="http://schemas.microsoft.com/office/drawing/2014/main" id="{2BD5C4B9-FFED-4311-BEB9-A4AE679A3CC9}"/>
+              </a:ext>
+            </a:extLst>
+          </p:cNvPr>
+          <p:cNvSpPr/>
+          <p:nvPr/>
+        </p:nvSpPr>
+        <p:spPr>
+          <a:xfrm>
+            <a:off x="87786" y="503112"/>
+            <a:ext cx="6070380" cy="1384995"/>
+          </a:xfrm>
+          <a:prstGeom prst="rect">
+            <a:avLst/>
+          </a:prstGeom>
+        </p:spPr>
+        <p:txBody>
+          <a:bodyPr wrap="none">
+            <a:spAutoFit/>
+          </a:bodyPr>
+          <a:lstStyle/>
+          <a:p>
+            <a:r>
+              <a:rPr lang="en-IN" sz="1200"/>
+              <a:t>1.0 Enter username first – to be unique in current and session – then enters chat window page</a:t>
+            </a:r>
+          </a:p>
+          <a:p>
+            <a:r>
+              <a:rPr lang="en-IN" sz="1200"/>
+              <a:t>1.1 Online Userlists display on right/left pane</a:t>
+            </a:r>
+          </a:p>
+          <a:p>
+            <a:r>
+              <a:rPr lang="en-IN" sz="1200"/>
+              <a:t>1.2 Display User’s message on right, others on left of chat window</a:t>
+            </a:r>
+          </a:p>
+          <a:p>
+            <a:endParaRPr lang="en-IN" sz="1200"/>
+          </a:p>
+          <a:p>
+            <a:r>
+              <a:rPr lang="en-IN" sz="1200">
+                <a:solidFill>
+                  <a:schemeClr val="bg1">
+                    <a:lumMod val="75000"/>
+                  </a:schemeClr>
+                </a:solidFill>
+              </a:rPr>
+              <a:t>2.1 Private messaging (italicized, diff color)</a:t>
+            </a:r>
+          </a:p>
+          <a:p>
+            <a:r>
+              <a:rPr lang="en-IN" sz="1200">
+                <a:solidFill>
+                  <a:schemeClr val="bg1">
+                    <a:lumMod val="75000"/>
+                  </a:schemeClr>
+                </a:solidFill>
+              </a:rPr>
+              <a:t>2.2 When receiver offline, inform sender, it is so.</a:t>
+            </a:r>
+          </a:p>
+          <a:p>
+            <a:r>
+              <a:rPr lang="en-IN" sz="1200">
+                <a:solidFill>
+                  <a:schemeClr val="bg1">
+                    <a:lumMod val="75000"/>
+                  </a:schemeClr>
+                </a:solidFill>
+              </a:rPr>
+              <a:t>2.3 Auto Scroll</a:t>
+            </a:r>
+          </a:p>
+        </p:txBody>
+      </p:sp>
+    </p:spTree>
+    <p:extLst>
+      <p:ext uri="{BB962C8B-B14F-4D97-AF65-F5344CB8AC3E}">
+        <p14:creationId xmlns:p14="http://schemas.microsoft.com/office/powerpoint/2010/main" val="1514518796"/>
+      </p:ext>
+    </p:extLst>
+  </p:cSld>
+  <p:clrMapOvr>
+    <a:masterClrMapping/>
+  </p:clrMapOvr>
+</p:sld>
+</file>
+
+<file path=ppt/slides/slide9.xml><?xml version="1.0" encoding="utf-8"?>
+<p:sld xmlns:a="http://schemas.openxmlformats.org/drawingml/2006/main" xmlns:r="http://schemas.openxmlformats.org/officeDocument/2006/relationships" xmlns:p="http://schemas.openxmlformats.org/presentationml/2006/main">
+  <p:cSld>
+    <p:spTree>
+      <p:nvGrpSpPr>
+        <p:cNvPr id="1" name=""/>
+        <p:cNvGrpSpPr/>
+        <p:nvPr/>
+      </p:nvGrpSpPr>
+      <p:grpSpPr>
+        <a:xfrm>
+          <a:off x="0" y="0"/>
+          <a:ext cx="0" cy="0"/>
+          <a:chOff x="0" y="0"/>
+          <a:chExt cx="0" cy="0"/>
+        </a:xfrm>
+      </p:grpSpPr>
+      <p:sp>
+        <p:nvSpPr>
+          <p:cNvPr id="12" name="Rectangle 11">
+            <a:extLst>
+              <a:ext uri="{FF2B5EF4-FFF2-40B4-BE49-F238E27FC236}">
+                <a16:creationId xmlns:a16="http://schemas.microsoft.com/office/drawing/2014/main" id="{3BC39180-08AD-46B4-8172-2BCA13B57D1F}"/>
+              </a:ext>
+            </a:extLst>
+          </p:cNvPr>
+          <p:cNvSpPr/>
+          <p:nvPr/>
+        </p:nvSpPr>
+        <p:spPr>
+          <a:xfrm>
+            <a:off x="150665" y="1558071"/>
+            <a:ext cx="3179910" cy="2006570"/>
+          </a:xfrm>
+          <a:prstGeom prst="rect">
+            <a:avLst/>
+          </a:prstGeom>
+        </p:spPr>
+        <p:style>
+          <a:lnRef idx="2">
+            <a:schemeClr val="accent1">
+              <a:shade val="50000"/>
+            </a:schemeClr>
+          </a:lnRef>
+          <a:fillRef idx="1">
+            <a:schemeClr val="accent1"/>
+          </a:fillRef>
+          <a:effectRef idx="0">
+            <a:schemeClr val="accent1"/>
+          </a:effectRef>
+          <a:fontRef idx="minor">
+            <a:schemeClr val="lt1"/>
+          </a:fontRef>
+        </p:style>
+        <p:txBody>
+          <a:bodyPr rtlCol="0" anchor="ctr"/>
+          <a:lstStyle/>
+          <a:p>
+            <a:pPr algn="ctr"/>
+            <a:endParaRPr lang="en-IN"/>
+          </a:p>
+        </p:txBody>
+      </p:sp>
+      <p:sp>
+        <p:nvSpPr>
+          <p:cNvPr id="7" name="TextBox 6">
+            <a:extLst>
+              <a:ext uri="{FF2B5EF4-FFF2-40B4-BE49-F238E27FC236}">
+                <a16:creationId xmlns:a16="http://schemas.microsoft.com/office/drawing/2014/main" id="{342C9C4D-8096-4F7B-9016-6C449FB864BB}"/>
+              </a:ext>
+            </a:extLst>
+          </p:cNvPr>
+          <p:cNvSpPr txBox="1"/>
+          <p:nvPr/>
+        </p:nvSpPr>
+        <p:spPr>
+          <a:xfrm>
+            <a:off x="0" y="0"/>
+            <a:ext cx="910827" cy="369332"/>
+          </a:xfrm>
+          <a:prstGeom prst="rect">
+            <a:avLst/>
+          </a:prstGeom>
+          <a:solidFill>
+            <a:srgbClr val="FFFF00"/>
+          </a:solidFill>
+        </p:spPr>
+        <p:txBody>
+          <a:bodyPr wrap="none" rtlCol="0">
+            <a:spAutoFit/>
+          </a:bodyPr>
+          <a:lstStyle/>
+          <a:p>
+            <a:r>
+              <a:rPr lang="en-IN"/>
+              <a:t>Phase 1</a:t>
+            </a:r>
+          </a:p>
+        </p:txBody>
+      </p:sp>
+      <p:sp>
+        <p:nvSpPr>
+          <p:cNvPr id="9" name="Rectangle 8">
+            <a:extLst>
+              <a:ext uri="{FF2B5EF4-FFF2-40B4-BE49-F238E27FC236}">
+                <a16:creationId xmlns:a16="http://schemas.microsoft.com/office/drawing/2014/main" id="{2BD5C4B9-FFED-4311-BEB9-A4AE679A3CC9}"/>
+              </a:ext>
+            </a:extLst>
+          </p:cNvPr>
+          <p:cNvSpPr/>
+          <p:nvPr/>
+        </p:nvSpPr>
+        <p:spPr>
+          <a:xfrm>
+            <a:off x="87786" y="503112"/>
+            <a:ext cx="6070380" cy="276999"/>
+          </a:xfrm>
+          <a:prstGeom prst="rect">
+            <a:avLst/>
+          </a:prstGeom>
+        </p:spPr>
+        <p:txBody>
+          <a:bodyPr wrap="none">
+            <a:spAutoFit/>
+          </a:bodyPr>
+          <a:lstStyle/>
+          <a:p>
+            <a:r>
+              <a:rPr lang="en-IN" sz="1200"/>
+              <a:t>1.0 Enter username first – to be unique in current and session – then enters chat window page</a:t>
+            </a:r>
+          </a:p>
+        </p:txBody>
+      </p:sp>
+      <p:sp>
+        <p:nvSpPr>
+          <p:cNvPr id="2" name="Rectangle 1">
+            <a:extLst>
+              <a:ext uri="{FF2B5EF4-FFF2-40B4-BE49-F238E27FC236}">
+                <a16:creationId xmlns:a16="http://schemas.microsoft.com/office/drawing/2014/main" id="{CC9A61AA-E459-48A5-818E-20C4F53EFDB0}"/>
+              </a:ext>
+            </a:extLst>
+          </p:cNvPr>
+          <p:cNvSpPr/>
+          <p:nvPr/>
+        </p:nvSpPr>
+        <p:spPr>
+          <a:xfrm>
+            <a:off x="150665" y="1132237"/>
+            <a:ext cx="3179910" cy="375385"/>
+          </a:xfrm>
+          <a:prstGeom prst="rect">
+            <a:avLst/>
+          </a:prstGeom>
+        </p:spPr>
+        <p:style>
+          <a:lnRef idx="2">
+            <a:schemeClr val="accent1">
+              <a:shade val="50000"/>
+            </a:schemeClr>
+          </a:lnRef>
+          <a:fillRef idx="1">
+            <a:schemeClr val="accent1"/>
+          </a:fillRef>
+          <a:effectRef idx="0">
+            <a:schemeClr val="accent1"/>
+          </a:effectRef>
+          <a:fontRef idx="minor">
+            <a:schemeClr val="lt1"/>
+          </a:fontRef>
+        </p:style>
+        <p:txBody>
+          <a:bodyPr rtlCol="0" anchor="ctr"/>
+          <a:lstStyle/>
+          <a:p>
+            <a:pPr algn="ctr"/>
+            <a:endParaRPr lang="en-IN"/>
+          </a:p>
+        </p:txBody>
+      </p:sp>
+      <p:sp>
+        <p:nvSpPr>
+          <p:cNvPr id="5" name="Rectangle 4">
+            <a:extLst>
+              <a:ext uri="{FF2B5EF4-FFF2-40B4-BE49-F238E27FC236}">
+                <a16:creationId xmlns:a16="http://schemas.microsoft.com/office/drawing/2014/main" id="{B7801FC8-A769-4452-8025-19BAB2A66470}"/>
+              </a:ext>
+            </a:extLst>
+          </p:cNvPr>
+          <p:cNvSpPr/>
+          <p:nvPr/>
+        </p:nvSpPr>
+        <p:spPr>
+          <a:xfrm>
+            <a:off x="150665" y="1610711"/>
+            <a:ext cx="2130757" cy="1674797"/>
+          </a:xfrm>
+          <a:prstGeom prst="rect">
+            <a:avLst/>
+          </a:prstGeom>
+          <a:solidFill>
+            <a:schemeClr val="accent6">
+              <a:lumMod val="40000"/>
+              <a:lumOff val="60000"/>
+            </a:schemeClr>
+          </a:solidFill>
+        </p:spPr>
+        <p:style>
+          <a:lnRef idx="2">
+            <a:schemeClr val="accent1">
+              <a:shade val="50000"/>
+            </a:schemeClr>
+          </a:lnRef>
+          <a:fillRef idx="1">
+            <a:schemeClr val="accent1"/>
+          </a:fillRef>
+          <a:effectRef idx="0">
+            <a:schemeClr val="accent1"/>
+          </a:effectRef>
+          <a:fontRef idx="minor">
+            <a:schemeClr val="lt1"/>
+          </a:fontRef>
+        </p:style>
+        <p:txBody>
+          <a:bodyPr rtlCol="0" anchor="ctr"/>
+          <a:lstStyle/>
+          <a:p>
+            <a:pPr algn="ctr"/>
+            <a:endParaRPr lang="en-IN" sz="1200">
+              <a:latin typeface="Roboto" panose="02000000000000000000" pitchFamily="2" charset="0"/>
+              <a:ea typeface="Roboto" panose="02000000000000000000" pitchFamily="2" charset="0"/>
+            </a:endParaRPr>
+          </a:p>
+        </p:txBody>
+      </p:sp>
+      <p:sp>
+        <p:nvSpPr>
+          <p:cNvPr id="6" name="Rectangle 5">
+            <a:extLst>
+              <a:ext uri="{FF2B5EF4-FFF2-40B4-BE49-F238E27FC236}">
+                <a16:creationId xmlns:a16="http://schemas.microsoft.com/office/drawing/2014/main" id="{439FC08D-68EC-47B8-81E2-B110503D2DBA}"/>
+              </a:ext>
+            </a:extLst>
+          </p:cNvPr>
+          <p:cNvSpPr/>
+          <p:nvPr/>
+        </p:nvSpPr>
+        <p:spPr>
+          <a:xfrm>
+            <a:off x="2281422" y="1610712"/>
+            <a:ext cx="981776" cy="1674797"/>
+          </a:xfrm>
+          <a:prstGeom prst="rect">
+            <a:avLst/>
+          </a:prstGeom>
+          <a:solidFill>
+            <a:schemeClr val="accent2">
+              <a:lumMod val="40000"/>
+              <a:lumOff val="60000"/>
+            </a:schemeClr>
+          </a:solidFill>
+        </p:spPr>
+        <p:style>
+          <a:lnRef idx="2">
+            <a:schemeClr val="accent1">
+              <a:shade val="50000"/>
+            </a:schemeClr>
+          </a:lnRef>
+          <a:fillRef idx="1">
+            <a:schemeClr val="accent1"/>
+          </a:fillRef>
+          <a:effectRef idx="0">
+            <a:schemeClr val="accent1"/>
+          </a:effectRef>
+          <a:fontRef idx="minor">
+            <a:schemeClr val="lt1"/>
+          </a:fontRef>
+        </p:style>
+        <p:txBody>
+          <a:bodyPr rtlCol="0" anchor="ctr"/>
+          <a:lstStyle/>
+          <a:p>
+            <a:pPr algn="ctr"/>
+            <a:endParaRPr lang="en-IN"/>
+          </a:p>
+        </p:txBody>
+      </p:sp>
+      <p:sp>
+        <p:nvSpPr>
+          <p:cNvPr id="8" name="TextBox 7">
+            <a:extLst>
+              <a:ext uri="{FF2B5EF4-FFF2-40B4-BE49-F238E27FC236}">
+                <a16:creationId xmlns:a16="http://schemas.microsoft.com/office/drawing/2014/main" id="{D386BC5C-6C32-4B38-9DB5-9FB0DC2C1420}"/>
+              </a:ext>
+            </a:extLst>
+          </p:cNvPr>
+          <p:cNvSpPr txBox="1"/>
+          <p:nvPr/>
+        </p:nvSpPr>
+        <p:spPr>
+          <a:xfrm>
+            <a:off x="752614" y="2324998"/>
+            <a:ext cx="914033" cy="246221"/>
+          </a:xfrm>
+          <a:prstGeom prst="rect">
+            <a:avLst/>
+          </a:prstGeom>
+          <a:noFill/>
+        </p:spPr>
+        <p:txBody>
+          <a:bodyPr wrap="none" rtlCol="0">
+            <a:spAutoFit/>
+          </a:bodyPr>
+          <a:lstStyle/>
+          <a:p>
+            <a:r>
+              <a:rPr lang="en-IN" sz="1000"/>
+              <a:t>Message Card</a:t>
+            </a:r>
+          </a:p>
+        </p:txBody>
+      </p:sp>
+      <p:sp>
+        <p:nvSpPr>
+          <p:cNvPr id="10" name="TextBox 9">
+            <a:extLst>
+              <a:ext uri="{FF2B5EF4-FFF2-40B4-BE49-F238E27FC236}">
+                <a16:creationId xmlns:a16="http://schemas.microsoft.com/office/drawing/2014/main" id="{C6AAECD2-AA1E-4B04-9990-192146CB8F0A}"/>
+              </a:ext>
+            </a:extLst>
+          </p:cNvPr>
+          <p:cNvSpPr txBox="1"/>
+          <p:nvPr/>
+        </p:nvSpPr>
+        <p:spPr>
+          <a:xfrm>
+            <a:off x="2336341" y="2324997"/>
+            <a:ext cx="845103" cy="246221"/>
+          </a:xfrm>
+          <a:prstGeom prst="rect">
+            <a:avLst/>
+          </a:prstGeom>
+          <a:noFill/>
+        </p:spPr>
+        <p:txBody>
+          <a:bodyPr wrap="none" rtlCol="0">
+            <a:spAutoFit/>
+          </a:bodyPr>
+          <a:lstStyle/>
+          <a:p>
+            <a:r>
+              <a:rPr lang="en-IN" sz="1000"/>
+              <a:t>Online Users</a:t>
+            </a:r>
+          </a:p>
+        </p:txBody>
+      </p:sp>
+      <p:sp>
+        <p:nvSpPr>
+          <p:cNvPr id="11" name="TextBox 10">
+            <a:extLst>
+              <a:ext uri="{FF2B5EF4-FFF2-40B4-BE49-F238E27FC236}">
+                <a16:creationId xmlns:a16="http://schemas.microsoft.com/office/drawing/2014/main" id="{D5EED9DC-1D29-4C0A-AB2E-9D67342A1D77}"/>
+              </a:ext>
+            </a:extLst>
+          </p:cNvPr>
+          <p:cNvSpPr txBox="1"/>
+          <p:nvPr/>
+        </p:nvSpPr>
+        <p:spPr>
+          <a:xfrm>
+            <a:off x="1136953" y="1215059"/>
+            <a:ext cx="1170513" cy="246221"/>
+          </a:xfrm>
+          <a:prstGeom prst="rect">
+            <a:avLst/>
+          </a:prstGeom>
+          <a:noFill/>
+        </p:spPr>
+        <p:txBody>
+          <a:bodyPr wrap="none" rtlCol="0">
+            <a:spAutoFit/>
+          </a:bodyPr>
+          <a:lstStyle/>
+          <a:p>
+            <a:r>
+              <a:rPr lang="en-IN" sz="1000">
+                <a:solidFill>
+                  <a:schemeClr val="bg1"/>
+                </a:solidFill>
+              </a:rPr>
+              <a:t>username Window</a:t>
+            </a:r>
+          </a:p>
+        </p:txBody>
+      </p:sp>
+      <p:sp>
+        <p:nvSpPr>
+          <p:cNvPr id="13" name="TextBox 12">
+            <a:extLst>
+              <a:ext uri="{FF2B5EF4-FFF2-40B4-BE49-F238E27FC236}">
+                <a16:creationId xmlns:a16="http://schemas.microsoft.com/office/drawing/2014/main" id="{0CA201B5-C398-4A68-94DA-8EB6BEB99A39}"/>
+              </a:ext>
+            </a:extLst>
+          </p:cNvPr>
+          <p:cNvSpPr txBox="1"/>
+          <p:nvPr/>
+        </p:nvSpPr>
+        <p:spPr>
+          <a:xfrm>
+            <a:off x="1284170" y="3301964"/>
+            <a:ext cx="889987" cy="246221"/>
+          </a:xfrm>
+          <a:prstGeom prst="rect">
+            <a:avLst/>
+          </a:prstGeom>
+          <a:noFill/>
+        </p:spPr>
+        <p:txBody>
+          <a:bodyPr wrap="none" rtlCol="0">
+            <a:spAutoFit/>
+          </a:bodyPr>
+          <a:lstStyle/>
+          <a:p>
+            <a:r>
+              <a:rPr lang="en-IN" sz="1000">
+                <a:solidFill>
+                  <a:schemeClr val="bg1"/>
+                </a:solidFill>
+              </a:rPr>
+              <a:t>Chat Window</a:t>
+            </a:r>
+          </a:p>
+        </p:txBody>
+      </p:sp>
+      <p:sp>
+        <p:nvSpPr>
+          <p:cNvPr id="14" name="Rectangle 13">
+            <a:extLst>
+              <a:ext uri="{FF2B5EF4-FFF2-40B4-BE49-F238E27FC236}">
+                <a16:creationId xmlns:a16="http://schemas.microsoft.com/office/drawing/2014/main" id="{E1E20BA9-F352-4B2D-B271-141287E34949}"/>
+              </a:ext>
+            </a:extLst>
+          </p:cNvPr>
+          <p:cNvSpPr/>
+          <p:nvPr/>
+        </p:nvSpPr>
+        <p:spPr>
+          <a:xfrm>
+            <a:off x="3750855" y="940638"/>
+            <a:ext cx="2628652" cy="2092881"/>
+          </a:xfrm>
+          <a:prstGeom prst="rect">
+            <a:avLst/>
+          </a:prstGeom>
+        </p:spPr>
+        <p:txBody>
+          <a:bodyPr wrap="square">
+            <a:spAutoFit/>
+          </a:bodyPr>
+          <a:lstStyle/>
+          <a:p>
+            <a:r>
+              <a:rPr lang="en-IN" sz="1000" b="1"/>
+              <a:t>Client:</a:t>
+            </a:r>
+          </a:p>
+          <a:p>
+            <a:endParaRPr lang="en-IN" sz="1000"/>
+          </a:p>
+          <a:p>
+            <a:r>
+              <a:rPr lang="en-IN" sz="1000"/>
+              <a:t>Initially  username window is visible</a:t>
+            </a:r>
+          </a:p>
+          <a:p>
+            <a:r>
+              <a:rPr lang="en-IN" sz="1000"/>
+              <a:t>Chat Window is not</a:t>
+            </a:r>
+          </a:p>
+          <a:p>
+            <a:endParaRPr lang="en-IN" sz="1000"/>
+          </a:p>
+          <a:p>
+            <a:r>
+              <a:rPr lang="en-IN" sz="1000"/>
+              <a:t>After userNamevalidation, if new User in session. Chat Window is visible. Till then not. </a:t>
+            </a:r>
+          </a:p>
+          <a:p>
+            <a:endParaRPr lang="en-IN" sz="1000"/>
+          </a:p>
+          <a:p>
+            <a:r>
+              <a:rPr lang="en-IN" sz="1000"/>
+              <a:t>userNameValidation:</a:t>
+            </a:r>
+          </a:p>
+          <a:p>
+            <a:r>
+              <a:rPr lang="en-IN" sz="1000"/>
+              <a:t>Client sends username to Server</a:t>
+            </a:r>
+          </a:p>
+          <a:p>
+            <a:r>
+              <a:rPr lang="en-IN" sz="1000"/>
+              <a:t>Server checks and responds validity</a:t>
+            </a:r>
+          </a:p>
+          <a:p>
+            <a:r>
+              <a:rPr lang="en-IN" sz="1000"/>
+              <a:t>Client shows Chat window or ask another user name accordingly.</a:t>
+            </a:r>
+          </a:p>
+        </p:txBody>
+      </p:sp>
+      <p:sp>
+        <p:nvSpPr>
+          <p:cNvPr id="15" name="Rectangle 14">
+            <a:extLst>
+              <a:ext uri="{FF2B5EF4-FFF2-40B4-BE49-F238E27FC236}">
+                <a16:creationId xmlns:a16="http://schemas.microsoft.com/office/drawing/2014/main" id="{3EF993EC-C5EB-44A5-A98B-8D83001011F1}"/>
+              </a:ext>
+            </a:extLst>
+          </p:cNvPr>
+          <p:cNvSpPr/>
+          <p:nvPr/>
+        </p:nvSpPr>
+        <p:spPr>
+          <a:xfrm>
+            <a:off x="3750855" y="3154245"/>
+            <a:ext cx="2628652" cy="1169551"/>
+          </a:xfrm>
+          <a:prstGeom prst="rect">
+            <a:avLst/>
+          </a:prstGeom>
+        </p:spPr>
+        <p:txBody>
+          <a:bodyPr wrap="square">
+            <a:spAutoFit/>
+          </a:bodyPr>
+          <a:lstStyle/>
+          <a:p>
+            <a:r>
+              <a:rPr lang="en-IN" sz="1000" b="1"/>
+              <a:t>Sever:</a:t>
+            </a:r>
+          </a:p>
+          <a:p>
+            <a:endParaRPr lang="en-IN" sz="1000"/>
+          </a:p>
+          <a:p>
+            <a:r>
+              <a:rPr lang="en-IN" sz="1000"/>
+              <a:t>Client sends newUser event with username. </a:t>
+            </a:r>
+          </a:p>
+          <a:p>
+            <a:r>
+              <a:rPr lang="en-IN" sz="1000"/>
+              <a:t>If username already exists, send failure response (send false via callback)</a:t>
+            </a:r>
+          </a:p>
+          <a:p>
+            <a:r>
+              <a:rPr lang="en-IN" sz="1000"/>
+              <a:t>If no, add to user array, and send success response (send true via callback)</a:t>
+            </a:r>
+          </a:p>
+        </p:txBody>
+      </p:sp>
+    </p:spTree>
+    <p:extLst>
+      <p:ext uri="{BB962C8B-B14F-4D97-AF65-F5344CB8AC3E}">
+        <p14:creationId xmlns:p14="http://schemas.microsoft.com/office/powerpoint/2010/main" val="2680326067"/>
       </p:ext>
     </p:extLst>
   </p:cSld>

</xml_diff>

<commit_message>
User Name Validation Done
</commit_message>
<xml_diff>
--- a/Illustrations.pptx
+++ b/Illustrations.pptx
@@ -16,6 +16,8 @@
     <p:sldId id="264" r:id="rId10"/>
     <p:sldId id="265" r:id="rId11"/>
     <p:sldId id="266" r:id="rId12"/>
+    <p:sldId id="267" r:id="rId13"/>
+    <p:sldId id="268" r:id="rId14"/>
   </p:sldIdLst>
   <p:sldSz cx="6659563" cy="4679950"/>
   <p:notesSz cx="6858000" cy="9144000"/>
@@ -3794,10 +3796,10 @@
       </p:sp>
       <p:sp>
         <p:nvSpPr>
-          <p:cNvPr id="13" name="Rectangle 12">
-            <a:extLst>
-              <a:ext uri="{FF2B5EF4-FFF2-40B4-BE49-F238E27FC236}">
-                <a16:creationId xmlns:a16="http://schemas.microsoft.com/office/drawing/2014/main" id="{4CEBAE59-B6DA-454E-A06A-79AE96C0D040}"/>
+          <p:cNvPr id="10" name="Rectangle 9">
+            <a:extLst>
+              <a:ext uri="{FF2B5EF4-FFF2-40B4-BE49-F238E27FC236}">
+                <a16:creationId xmlns:a16="http://schemas.microsoft.com/office/drawing/2014/main" id="{8ED94A2C-615B-404B-A986-0B7EA0583BBD}"/>
               </a:ext>
             </a:extLst>
           </p:cNvPr>
@@ -3806,12 +3808,90 @@
         </p:nvSpPr>
         <p:spPr>
           <a:xfrm>
-            <a:off x="150665" y="1132237"/>
-            <a:ext cx="3179910" cy="375385"/>
+            <a:off x="306927" y="1095211"/>
+            <a:ext cx="5098364" cy="246221"/>
           </a:xfrm>
           <a:prstGeom prst="rect">
             <a:avLst/>
           </a:prstGeom>
+        </p:spPr>
+        <p:txBody>
+          <a:bodyPr wrap="square">
+            <a:spAutoFit/>
+          </a:bodyPr>
+          <a:lstStyle/>
+          <a:p>
+            <a:r>
+              <a:rPr lang="en-IN" sz="1000"/>
+              <a:t>In javascript, it is possible to define a new property for an object, but just giving it a value. </a:t>
+            </a:r>
+          </a:p>
+        </p:txBody>
+      </p:sp>
+      <p:pic>
+        <p:nvPicPr>
+          <p:cNvPr id="4" name="Picture 3">
+            <a:extLst>
+              <a:ext uri="{FF2B5EF4-FFF2-40B4-BE49-F238E27FC236}">
+                <a16:creationId xmlns:a16="http://schemas.microsoft.com/office/drawing/2014/main" id="{0F56A4BE-78AF-4A47-997E-4FDB87508150}"/>
+              </a:ext>
+            </a:extLst>
+          </p:cNvPr>
+          <p:cNvPicPr>
+            <a:picLocks noChangeAspect="1"/>
+          </p:cNvPicPr>
+          <p:nvPr/>
+        </p:nvPicPr>
+        <p:blipFill>
+          <a:blip r:embed="rId2">
+            <a:extLst>
+              <a:ext uri="{28A0092B-C50C-407E-A947-70E740481C1C}">
+                <a14:useLocalDpi xmlns:a14="http://schemas.microsoft.com/office/drawing/2010/main" val="0"/>
+              </a:ext>
+            </a:extLst>
+          </a:blip>
+          <a:stretch>
+            <a:fillRect/>
+          </a:stretch>
+        </p:blipFill>
+        <p:spPr>
+          <a:xfrm>
+            <a:off x="386170" y="1457234"/>
+            <a:ext cx="5308510" cy="1959734"/>
+          </a:xfrm>
+          <a:prstGeom prst="rect">
+            <a:avLst/>
+          </a:prstGeom>
+        </p:spPr>
+      </p:pic>
+      <p:sp>
+        <p:nvSpPr>
+          <p:cNvPr id="12" name="Rectangle: Rounded Corners 11">
+            <a:extLst>
+              <a:ext uri="{FF2B5EF4-FFF2-40B4-BE49-F238E27FC236}">
+                <a16:creationId xmlns:a16="http://schemas.microsoft.com/office/drawing/2014/main" id="{C4285637-6E7E-46A4-A249-E75D85E8AA67}"/>
+              </a:ext>
+            </a:extLst>
+          </p:cNvPr>
+          <p:cNvSpPr/>
+          <p:nvPr/>
+        </p:nvSpPr>
+        <p:spPr>
+          <a:xfrm>
+            <a:off x="386170" y="1578542"/>
+            <a:ext cx="5308510" cy="327259"/>
+          </a:xfrm>
+          <a:prstGeom prst="roundRect">
+            <a:avLst/>
+          </a:prstGeom>
+          <a:solidFill>
+            <a:srgbClr val="FFFF00">
+              <a:alpha val="22000"/>
+            </a:srgbClr>
+          </a:solidFill>
+          <a:ln>
+            <a:noFill/>
+          </a:ln>
         </p:spPr>
         <p:style>
           <a:lnRef idx="2">
@@ -3840,10 +3920,10 @@
       </p:sp>
       <p:sp>
         <p:nvSpPr>
-          <p:cNvPr id="2" name="Rectangle 1">
-            <a:extLst>
-              <a:ext uri="{FF2B5EF4-FFF2-40B4-BE49-F238E27FC236}">
-                <a16:creationId xmlns:a16="http://schemas.microsoft.com/office/drawing/2014/main" id="{6602037D-E455-459D-99AD-C010F228A28F}"/>
+          <p:cNvPr id="14" name="Rectangle 13">
+            <a:extLst>
+              <a:ext uri="{FF2B5EF4-FFF2-40B4-BE49-F238E27FC236}">
+                <a16:creationId xmlns:a16="http://schemas.microsoft.com/office/drawing/2014/main" id="{34E8F1CA-659F-4393-B5DE-C3DDBA60518C}"/>
               </a:ext>
             </a:extLst>
           </p:cNvPr>
@@ -3852,17 +3932,433 @@
         </p:nvSpPr>
         <p:spPr>
           <a:xfrm>
-            <a:off x="455413" y="1232034"/>
-            <a:ext cx="1710271" cy="173254"/>
+            <a:off x="455413" y="3663552"/>
+            <a:ext cx="5098364" cy="400110"/>
           </a:xfrm>
           <a:prstGeom prst="rect">
             <a:avLst/>
           </a:prstGeom>
+        </p:spPr>
+        <p:txBody>
+          <a:bodyPr wrap="square">
+            <a:spAutoFit/>
+          </a:bodyPr>
+          <a:lstStyle/>
+          <a:p>
+            <a:r>
+              <a:rPr lang="en-IN" sz="1000"/>
+              <a:t>We need to know this basics, because we will attach username to the incoming socket from each client, to be able to identify particular socket later for other operations..</a:t>
+            </a:r>
+          </a:p>
+        </p:txBody>
+      </p:sp>
+    </p:spTree>
+    <p:extLst>
+      <p:ext uri="{BB962C8B-B14F-4D97-AF65-F5344CB8AC3E}">
+        <p14:creationId xmlns:p14="http://schemas.microsoft.com/office/powerpoint/2010/main" val="1672147497"/>
+      </p:ext>
+    </p:extLst>
+  </p:cSld>
+  <p:clrMapOvr>
+    <a:masterClrMapping/>
+  </p:clrMapOvr>
+</p:sld>
+</file>
+
+<file path=ppt/slides/slide12.xml><?xml version="1.0" encoding="utf-8"?>
+<p:sld xmlns:a="http://schemas.openxmlformats.org/drawingml/2006/main" xmlns:r="http://schemas.openxmlformats.org/officeDocument/2006/relationships" xmlns:p="http://schemas.openxmlformats.org/presentationml/2006/main">
+  <p:cSld>
+    <p:spTree>
+      <p:nvGrpSpPr>
+        <p:cNvPr id="1" name=""/>
+        <p:cNvGrpSpPr/>
+        <p:nvPr/>
+      </p:nvGrpSpPr>
+      <p:grpSpPr>
+        <a:xfrm>
+          <a:off x="0" y="0"/>
+          <a:ext cx="0" cy="0"/>
+          <a:chOff x="0" y="0"/>
+          <a:chExt cx="0" cy="0"/>
+        </a:xfrm>
+      </p:grpSpPr>
+      <p:sp>
+        <p:nvSpPr>
+          <p:cNvPr id="7" name="TextBox 6">
+            <a:extLst>
+              <a:ext uri="{FF2B5EF4-FFF2-40B4-BE49-F238E27FC236}">
+                <a16:creationId xmlns:a16="http://schemas.microsoft.com/office/drawing/2014/main" id="{342C9C4D-8096-4F7B-9016-6C449FB864BB}"/>
+              </a:ext>
+            </a:extLst>
+          </p:cNvPr>
+          <p:cNvSpPr txBox="1"/>
+          <p:nvPr/>
+        </p:nvSpPr>
+        <p:spPr>
+          <a:xfrm>
+            <a:off x="0" y="0"/>
+            <a:ext cx="910827" cy="369332"/>
+          </a:xfrm>
+          <a:prstGeom prst="rect">
+            <a:avLst/>
+          </a:prstGeom>
           <a:solidFill>
-            <a:schemeClr val="bg2">
-              <a:lumMod val="90000"/>
-            </a:schemeClr>
+            <a:srgbClr val="FFFF00"/>
           </a:solidFill>
+        </p:spPr>
+        <p:txBody>
+          <a:bodyPr wrap="none" rtlCol="0">
+            <a:spAutoFit/>
+          </a:bodyPr>
+          <a:lstStyle/>
+          <a:p>
+            <a:r>
+              <a:rPr lang="en-IN"/>
+              <a:t>Phase 1</a:t>
+            </a:r>
+          </a:p>
+        </p:txBody>
+      </p:sp>
+      <p:sp>
+        <p:nvSpPr>
+          <p:cNvPr id="10" name="Rectangle 9">
+            <a:extLst>
+              <a:ext uri="{FF2B5EF4-FFF2-40B4-BE49-F238E27FC236}">
+                <a16:creationId xmlns:a16="http://schemas.microsoft.com/office/drawing/2014/main" id="{8ED94A2C-615B-404B-A986-0B7EA0583BBD}"/>
+              </a:ext>
+            </a:extLst>
+          </p:cNvPr>
+          <p:cNvSpPr/>
+          <p:nvPr/>
+        </p:nvSpPr>
+        <p:spPr>
+          <a:xfrm>
+            <a:off x="154527" y="994829"/>
+            <a:ext cx="746775" cy="246221"/>
+          </a:xfrm>
+          <a:prstGeom prst="rect">
+            <a:avLst/>
+          </a:prstGeom>
+        </p:spPr>
+        <p:txBody>
+          <a:bodyPr wrap="square">
+            <a:spAutoFit/>
+          </a:bodyPr>
+          <a:lstStyle/>
+          <a:p>
+            <a:r>
+              <a:rPr lang="en-IN" sz="1000" b="1"/>
+              <a:t>Server:</a:t>
+            </a:r>
+          </a:p>
+        </p:txBody>
+      </p:sp>
+      <p:pic>
+        <p:nvPicPr>
+          <p:cNvPr id="3" name="Picture 2">
+            <a:extLst>
+              <a:ext uri="{FF2B5EF4-FFF2-40B4-BE49-F238E27FC236}">
+                <a16:creationId xmlns:a16="http://schemas.microsoft.com/office/drawing/2014/main" id="{D8EFE2BA-EB88-4D25-BFF0-56D9A07B72A6}"/>
+              </a:ext>
+            </a:extLst>
+          </p:cNvPr>
+          <p:cNvPicPr>
+            <a:picLocks noChangeAspect="1"/>
+          </p:cNvPicPr>
+          <p:nvPr/>
+        </p:nvPicPr>
+        <p:blipFill>
+          <a:blip r:embed="rId2">
+            <a:extLst>
+              <a:ext uri="{28A0092B-C50C-407E-A947-70E740481C1C}">
+                <a14:useLocalDpi xmlns:a14="http://schemas.microsoft.com/office/drawing/2010/main" val="0"/>
+              </a:ext>
+            </a:extLst>
+          </a:blip>
+          <a:stretch>
+            <a:fillRect/>
+          </a:stretch>
+        </p:blipFill>
+        <p:spPr>
+          <a:xfrm>
+            <a:off x="230663" y="1621051"/>
+            <a:ext cx="4674714" cy="2276960"/>
+          </a:xfrm>
+          <a:prstGeom prst="rect">
+            <a:avLst/>
+          </a:prstGeom>
+        </p:spPr>
+      </p:pic>
+      <p:pic>
+        <p:nvPicPr>
+          <p:cNvPr id="6" name="Picture 5">
+            <a:extLst>
+              <a:ext uri="{FF2B5EF4-FFF2-40B4-BE49-F238E27FC236}">
+                <a16:creationId xmlns:a16="http://schemas.microsoft.com/office/drawing/2014/main" id="{D60EEA3F-83CC-43BF-958E-71B4EF434579}"/>
+              </a:ext>
+            </a:extLst>
+          </p:cNvPr>
+          <p:cNvPicPr>
+            <a:picLocks noChangeAspect="1"/>
+          </p:cNvPicPr>
+          <p:nvPr/>
+        </p:nvPicPr>
+        <p:blipFill>
+          <a:blip r:embed="rId3">
+            <a:extLst>
+              <a:ext uri="{28A0092B-C50C-407E-A947-70E740481C1C}">
+                <a14:useLocalDpi xmlns:a14="http://schemas.microsoft.com/office/drawing/2010/main" val="0"/>
+              </a:ext>
+            </a:extLst>
+          </a:blip>
+          <a:stretch>
+            <a:fillRect/>
+          </a:stretch>
+        </p:blipFill>
+        <p:spPr>
+          <a:xfrm>
+            <a:off x="230663" y="1241050"/>
+            <a:ext cx="2703038" cy="243339"/>
+          </a:xfrm>
+          <a:prstGeom prst="rect">
+            <a:avLst/>
+          </a:prstGeom>
+        </p:spPr>
+      </p:pic>
+      <p:sp>
+        <p:nvSpPr>
+          <p:cNvPr id="13" name="Rectangle 12">
+            <a:extLst>
+              <a:ext uri="{FF2B5EF4-FFF2-40B4-BE49-F238E27FC236}">
+                <a16:creationId xmlns:a16="http://schemas.microsoft.com/office/drawing/2014/main" id="{845F9BD9-0531-4244-94A5-8CC5E74A777D}"/>
+              </a:ext>
+            </a:extLst>
+          </p:cNvPr>
+          <p:cNvSpPr/>
+          <p:nvPr/>
+        </p:nvSpPr>
+        <p:spPr>
+          <a:xfrm>
+            <a:off x="154527" y="3898011"/>
+            <a:ext cx="5098364" cy="400110"/>
+          </a:xfrm>
+          <a:prstGeom prst="rect">
+            <a:avLst/>
+          </a:prstGeom>
+        </p:spPr>
+        <p:txBody>
+          <a:bodyPr wrap="square">
+            <a:spAutoFit/>
+          </a:bodyPr>
+          <a:lstStyle/>
+          <a:p>
+            <a:r>
+              <a:rPr lang="en-IN" sz="1000"/>
+              <a:t>Note above, how socket gets new property “username” with new username, and how its pushed in the usersArray</a:t>
+            </a:r>
+          </a:p>
+        </p:txBody>
+      </p:sp>
+    </p:spTree>
+    <p:extLst>
+      <p:ext uri="{BB962C8B-B14F-4D97-AF65-F5344CB8AC3E}">
+        <p14:creationId xmlns:p14="http://schemas.microsoft.com/office/powerpoint/2010/main" val="1376061297"/>
+      </p:ext>
+    </p:extLst>
+  </p:cSld>
+  <p:clrMapOvr>
+    <a:masterClrMapping/>
+  </p:clrMapOvr>
+</p:sld>
+</file>
+
+<file path=ppt/slides/slide13.xml><?xml version="1.0" encoding="utf-8"?>
+<p:sld xmlns:a="http://schemas.openxmlformats.org/drawingml/2006/main" xmlns:r="http://schemas.openxmlformats.org/officeDocument/2006/relationships" xmlns:p="http://schemas.openxmlformats.org/presentationml/2006/main">
+  <p:cSld>
+    <p:spTree>
+      <p:nvGrpSpPr>
+        <p:cNvPr id="1" name=""/>
+        <p:cNvGrpSpPr/>
+        <p:nvPr/>
+      </p:nvGrpSpPr>
+      <p:grpSpPr>
+        <a:xfrm>
+          <a:off x="0" y="0"/>
+          <a:ext cx="0" cy="0"/>
+          <a:chOff x="0" y="0"/>
+          <a:chExt cx="0" cy="0"/>
+        </a:xfrm>
+      </p:grpSpPr>
+      <p:sp>
+        <p:nvSpPr>
+          <p:cNvPr id="7" name="TextBox 6">
+            <a:extLst>
+              <a:ext uri="{FF2B5EF4-FFF2-40B4-BE49-F238E27FC236}">
+                <a16:creationId xmlns:a16="http://schemas.microsoft.com/office/drawing/2014/main" id="{342C9C4D-8096-4F7B-9016-6C449FB864BB}"/>
+              </a:ext>
+            </a:extLst>
+          </p:cNvPr>
+          <p:cNvSpPr txBox="1"/>
+          <p:nvPr/>
+        </p:nvSpPr>
+        <p:spPr>
+          <a:xfrm>
+            <a:off x="0" y="0"/>
+            <a:ext cx="910827" cy="369332"/>
+          </a:xfrm>
+          <a:prstGeom prst="rect">
+            <a:avLst/>
+          </a:prstGeom>
+          <a:solidFill>
+            <a:srgbClr val="FFFF00"/>
+          </a:solidFill>
+        </p:spPr>
+        <p:txBody>
+          <a:bodyPr wrap="none" rtlCol="0">
+            <a:spAutoFit/>
+          </a:bodyPr>
+          <a:lstStyle/>
+          <a:p>
+            <a:r>
+              <a:rPr lang="en-IN"/>
+              <a:t>Phase 1</a:t>
+            </a:r>
+          </a:p>
+        </p:txBody>
+      </p:sp>
+      <p:sp>
+        <p:nvSpPr>
+          <p:cNvPr id="10" name="Rectangle 9">
+            <a:extLst>
+              <a:ext uri="{FF2B5EF4-FFF2-40B4-BE49-F238E27FC236}">
+                <a16:creationId xmlns:a16="http://schemas.microsoft.com/office/drawing/2014/main" id="{8ED94A2C-615B-404B-A986-0B7EA0583BBD}"/>
+              </a:ext>
+            </a:extLst>
+          </p:cNvPr>
+          <p:cNvSpPr/>
+          <p:nvPr/>
+        </p:nvSpPr>
+        <p:spPr>
+          <a:xfrm>
+            <a:off x="-61768" y="1052501"/>
+            <a:ext cx="746775" cy="246221"/>
+          </a:xfrm>
+          <a:prstGeom prst="rect">
+            <a:avLst/>
+          </a:prstGeom>
+        </p:spPr>
+        <p:txBody>
+          <a:bodyPr wrap="square">
+            <a:spAutoFit/>
+          </a:bodyPr>
+          <a:lstStyle/>
+          <a:p>
+            <a:r>
+              <a:rPr lang="en-IN" sz="1000" b="1"/>
+              <a:t>Client:</a:t>
+            </a:r>
+          </a:p>
+        </p:txBody>
+      </p:sp>
+      <p:pic>
+        <p:nvPicPr>
+          <p:cNvPr id="4" name="Picture 3">
+            <a:extLst>
+              <a:ext uri="{FF2B5EF4-FFF2-40B4-BE49-F238E27FC236}">
+                <a16:creationId xmlns:a16="http://schemas.microsoft.com/office/drawing/2014/main" id="{44218F85-A0C3-4210-A2A6-F2EE17F06BE6}"/>
+              </a:ext>
+            </a:extLst>
+          </p:cNvPr>
+          <p:cNvPicPr>
+            <a:picLocks noChangeAspect="1"/>
+          </p:cNvPicPr>
+          <p:nvPr/>
+        </p:nvPicPr>
+        <p:blipFill>
+          <a:blip r:embed="rId2">
+            <a:extLst>
+              <a:ext uri="{28A0092B-C50C-407E-A947-70E740481C1C}">
+                <a14:useLocalDpi xmlns:a14="http://schemas.microsoft.com/office/drawing/2010/main" val="0"/>
+              </a:ext>
+            </a:extLst>
+          </a:blip>
+          <a:stretch>
+            <a:fillRect/>
+          </a:stretch>
+        </p:blipFill>
+        <p:spPr>
+          <a:xfrm>
+            <a:off x="0" y="1327283"/>
+            <a:ext cx="4895850" cy="3352667"/>
+          </a:xfrm>
+          <a:prstGeom prst="rect">
+            <a:avLst/>
+          </a:prstGeom>
+        </p:spPr>
+      </p:pic>
+      <p:pic>
+        <p:nvPicPr>
+          <p:cNvPr id="6" name="Picture 5">
+            <a:extLst>
+              <a:ext uri="{FF2B5EF4-FFF2-40B4-BE49-F238E27FC236}">
+                <a16:creationId xmlns:a16="http://schemas.microsoft.com/office/drawing/2014/main" id="{459A9019-88F9-4C62-86F0-E13534C0B98C}"/>
+              </a:ext>
+            </a:extLst>
+          </p:cNvPr>
+          <p:cNvPicPr>
+            <a:picLocks noChangeAspect="1"/>
+          </p:cNvPicPr>
+          <p:nvPr/>
+        </p:nvPicPr>
+        <p:blipFill rotWithShape="1">
+          <a:blip r:embed="rId3">
+            <a:extLst>
+              <a:ext uri="{28A0092B-C50C-407E-A947-70E740481C1C}">
+                <a14:useLocalDpi xmlns:a14="http://schemas.microsoft.com/office/drawing/2010/main" val="0"/>
+              </a:ext>
+            </a:extLst>
+          </a:blip>
+          <a:srcRect b="35860"/>
+          <a:stretch/>
+        </p:blipFill>
+        <p:spPr>
+          <a:xfrm>
+            <a:off x="1097276" y="393780"/>
+            <a:ext cx="2363189" cy="759688"/>
+          </a:xfrm>
+          <a:prstGeom prst="rect">
+            <a:avLst/>
+          </a:prstGeom>
+        </p:spPr>
+      </p:pic>
+      <p:sp>
+        <p:nvSpPr>
+          <p:cNvPr id="11" name="Rectangle: Rounded Corners 10">
+            <a:extLst>
+              <a:ext uri="{FF2B5EF4-FFF2-40B4-BE49-F238E27FC236}">
+                <a16:creationId xmlns:a16="http://schemas.microsoft.com/office/drawing/2014/main" id="{1A340D9A-EAA4-4D24-8423-68FE9D6AC027}"/>
+              </a:ext>
+            </a:extLst>
+          </p:cNvPr>
+          <p:cNvSpPr/>
+          <p:nvPr/>
+        </p:nvSpPr>
+        <p:spPr>
+          <a:xfrm>
+            <a:off x="1443516" y="929391"/>
+            <a:ext cx="1442559" cy="224078"/>
+          </a:xfrm>
+          <a:prstGeom prst="roundRect">
+            <a:avLst/>
+          </a:prstGeom>
+          <a:solidFill>
+            <a:srgbClr val="FFFF00">
+              <a:alpha val="22000"/>
+            </a:srgbClr>
+          </a:solidFill>
+          <a:ln>
+            <a:noFill/>
+          </a:ln>
         </p:spPr>
         <p:style>
           <a:lnRef idx="2">
@@ -3885,23 +4381,16 @@
           <a:lstStyle/>
           <a:p>
             <a:pPr algn="ctr"/>
-            <a:r>
-              <a:rPr lang="en-IN" sz="1000">
-                <a:solidFill>
-                  <a:schemeClr val="tx1"/>
-                </a:solidFill>
-              </a:rPr>
-              <a:t>Enter user name</a:t>
-            </a:r>
-          </a:p>
-        </p:txBody>
-      </p:sp>
-      <p:sp>
-        <p:nvSpPr>
-          <p:cNvPr id="15" name="Rectangle 14">
-            <a:extLst>
-              <a:ext uri="{FF2B5EF4-FFF2-40B4-BE49-F238E27FC236}">
-                <a16:creationId xmlns:a16="http://schemas.microsoft.com/office/drawing/2014/main" id="{9E23835D-4939-40FD-BBDA-D11B3BB58E90}"/>
+            <a:endParaRPr lang="en-IN"/>
+          </a:p>
+        </p:txBody>
+      </p:sp>
+      <p:sp>
+        <p:nvSpPr>
+          <p:cNvPr id="12" name="Rectangle 11">
+            <a:extLst>
+              <a:ext uri="{FF2B5EF4-FFF2-40B4-BE49-F238E27FC236}">
+                <a16:creationId xmlns:a16="http://schemas.microsoft.com/office/drawing/2014/main" id="{13B71450-29B0-472D-9356-B280EF7D0C12}"/>
               </a:ext>
             </a:extLst>
           </p:cNvPr>
@@ -3910,45 +4399,32 @@
         </p:nvSpPr>
         <p:spPr>
           <a:xfrm>
-            <a:off x="2348564" y="1241659"/>
-            <a:ext cx="774412" cy="163629"/>
+            <a:off x="3806705" y="929391"/>
+            <a:ext cx="1737375" cy="246221"/>
           </a:xfrm>
           <a:prstGeom prst="rect">
             <a:avLst/>
           </a:prstGeom>
         </p:spPr>
-        <p:style>
-          <a:lnRef idx="1">
-            <a:schemeClr val="accent2"/>
-          </a:lnRef>
-          <a:fillRef idx="3">
-            <a:schemeClr val="accent2"/>
-          </a:fillRef>
-          <a:effectRef idx="2">
-            <a:schemeClr val="accent2"/>
-          </a:effectRef>
-          <a:fontRef idx="minor">
-            <a:schemeClr val="lt1"/>
-          </a:fontRef>
-        </p:style>
-        <p:txBody>
-          <a:bodyPr rtlCol="0" anchor="ctr"/>
-          <a:lstStyle/>
-          <a:p>
-            <a:pPr algn="ctr"/>
-            <a:r>
-              <a:rPr lang="en-IN" sz="1200"/>
-              <a:t>Enter</a:t>
-            </a:r>
-          </a:p>
-        </p:txBody>
-      </p:sp>
-      <p:sp>
-        <p:nvSpPr>
-          <p:cNvPr id="16" name="Rectangle 15">
-            <a:extLst>
-              <a:ext uri="{FF2B5EF4-FFF2-40B4-BE49-F238E27FC236}">
-                <a16:creationId xmlns:a16="http://schemas.microsoft.com/office/drawing/2014/main" id="{2DD8A713-5897-4261-888B-BFE091D400EA}"/>
+        <p:txBody>
+          <a:bodyPr wrap="square">
+            <a:spAutoFit/>
+          </a:bodyPr>
+          <a:lstStyle/>
+          <a:p>
+            <a:r>
+              <a:rPr lang="en-IN" sz="1000"/>
+              <a:t>We hide chatWindow initially</a:t>
+            </a:r>
+          </a:p>
+        </p:txBody>
+      </p:sp>
+      <p:sp>
+        <p:nvSpPr>
+          <p:cNvPr id="8" name="Arrow: Right 7">
+            <a:extLst>
+              <a:ext uri="{FF2B5EF4-FFF2-40B4-BE49-F238E27FC236}">
+                <a16:creationId xmlns:a16="http://schemas.microsoft.com/office/drawing/2014/main" id="{5656A48F-F349-442B-B6F6-4DD901AAE90E}"/>
               </a:ext>
             </a:extLst>
           </p:cNvPr>
@@ -3957,10 +4433,10 @@
         </p:nvSpPr>
         <p:spPr>
           <a:xfrm>
-            <a:off x="150665" y="1558071"/>
-            <a:ext cx="3179910" cy="2006570"/>
-          </a:xfrm>
-          <a:prstGeom prst="rect">
+            <a:off x="3009900" y="1041430"/>
+            <a:ext cx="719041" cy="112038"/>
+          </a:xfrm>
+          <a:prstGeom prst="rightArrow">
             <a:avLst/>
           </a:prstGeom>
         </p:spPr>
@@ -3989,49 +4465,10 @@
           </a:p>
         </p:txBody>
       </p:sp>
-      <p:sp>
-        <p:nvSpPr>
-          <p:cNvPr id="17" name="TextBox 16">
-            <a:extLst>
-              <a:ext uri="{FF2B5EF4-FFF2-40B4-BE49-F238E27FC236}">
-                <a16:creationId xmlns:a16="http://schemas.microsoft.com/office/drawing/2014/main" id="{587B879B-0C94-4135-B93A-3B5FFDB79A6C}"/>
-              </a:ext>
-            </a:extLst>
-          </p:cNvPr>
-          <p:cNvSpPr txBox="1"/>
-          <p:nvPr/>
-        </p:nvSpPr>
-        <p:spPr>
-          <a:xfrm>
-            <a:off x="1275697" y="2438245"/>
-            <a:ext cx="889987" cy="246221"/>
-          </a:xfrm>
-          <a:prstGeom prst="rect">
-            <a:avLst/>
-          </a:prstGeom>
-          <a:noFill/>
-        </p:spPr>
-        <p:txBody>
-          <a:bodyPr wrap="none" rtlCol="0">
-            <a:spAutoFit/>
-          </a:bodyPr>
-          <a:lstStyle/>
-          <a:p>
-            <a:r>
-              <a:rPr lang="en-IN" sz="1000">
-                <a:solidFill>
-                  <a:schemeClr val="bg1"/>
-                </a:solidFill>
-              </a:rPr>
-              <a:t>Chat Window</a:t>
-            </a:r>
-          </a:p>
-        </p:txBody>
-      </p:sp>
     </p:spTree>
     <p:extLst>
       <p:ext uri="{BB962C8B-B14F-4D97-AF65-F5344CB8AC3E}">
-        <p14:creationId xmlns:p14="http://schemas.microsoft.com/office/powerpoint/2010/main" val="1672147497"/>
+        <p14:creationId xmlns:p14="http://schemas.microsoft.com/office/powerpoint/2010/main" val="3130402744"/>
       </p:ext>
     </p:extLst>
   </p:cSld>

</xml_diff>

<commit_message>
Phase 1 Step 2 User Online Listing
</commit_message>
<xml_diff>
--- a/Illustrations.pptx
+++ b/Illustrations.pptx
@@ -18,6 +18,9 @@
     <p:sldId id="266" r:id="rId12"/>
     <p:sldId id="267" r:id="rId13"/>
     <p:sldId id="268" r:id="rId14"/>
+    <p:sldId id="269" r:id="rId15"/>
+    <p:sldId id="270" r:id="rId16"/>
+    <p:sldId id="271" r:id="rId17"/>
   </p:sldIdLst>
   <p:sldSz cx="6659563" cy="4679950"/>
   <p:notesSz cx="6858000" cy="9144000"/>
@@ -270,7 +273,7 @@
           <a:p>
             <a:fld id="{2E87C897-2203-447C-8023-8D9097301B59}" type="datetimeFigureOut">
               <a:rPr lang="en-IN" smtClean="0"/>
-              <a:t>05-11-2017</a:t>
+              <a:t>06-11-2017</a:t>
             </a:fld>
             <a:endParaRPr lang="en-IN"/>
           </a:p>
@@ -440,7 +443,7 @@
           <a:p>
             <a:fld id="{2E87C897-2203-447C-8023-8D9097301B59}" type="datetimeFigureOut">
               <a:rPr lang="en-IN" smtClean="0"/>
-              <a:t>05-11-2017</a:t>
+              <a:t>06-11-2017</a:t>
             </a:fld>
             <a:endParaRPr lang="en-IN"/>
           </a:p>
@@ -620,7 +623,7 @@
           <a:p>
             <a:fld id="{2E87C897-2203-447C-8023-8D9097301B59}" type="datetimeFigureOut">
               <a:rPr lang="en-IN" smtClean="0"/>
-              <a:t>05-11-2017</a:t>
+              <a:t>06-11-2017</a:t>
             </a:fld>
             <a:endParaRPr lang="en-IN"/>
           </a:p>
@@ -790,7 +793,7 @@
           <a:p>
             <a:fld id="{2E87C897-2203-447C-8023-8D9097301B59}" type="datetimeFigureOut">
               <a:rPr lang="en-IN" smtClean="0"/>
-              <a:t>05-11-2017</a:t>
+              <a:t>06-11-2017</a:t>
             </a:fld>
             <a:endParaRPr lang="en-IN"/>
           </a:p>
@@ -1034,7 +1037,7 @@
           <a:p>
             <a:fld id="{2E87C897-2203-447C-8023-8D9097301B59}" type="datetimeFigureOut">
               <a:rPr lang="en-IN" smtClean="0"/>
-              <a:t>05-11-2017</a:t>
+              <a:t>06-11-2017</a:t>
             </a:fld>
             <a:endParaRPr lang="en-IN"/>
           </a:p>
@@ -1266,7 +1269,7 @@
           <a:p>
             <a:fld id="{2E87C897-2203-447C-8023-8D9097301B59}" type="datetimeFigureOut">
               <a:rPr lang="en-IN" smtClean="0"/>
-              <a:t>05-11-2017</a:t>
+              <a:t>06-11-2017</a:t>
             </a:fld>
             <a:endParaRPr lang="en-IN"/>
           </a:p>
@@ -1633,7 +1636,7 @@
           <a:p>
             <a:fld id="{2E87C897-2203-447C-8023-8D9097301B59}" type="datetimeFigureOut">
               <a:rPr lang="en-IN" smtClean="0"/>
-              <a:t>05-11-2017</a:t>
+              <a:t>06-11-2017</a:t>
             </a:fld>
             <a:endParaRPr lang="en-IN"/>
           </a:p>
@@ -1751,7 +1754,7 @@
           <a:p>
             <a:fld id="{2E87C897-2203-447C-8023-8D9097301B59}" type="datetimeFigureOut">
               <a:rPr lang="en-IN" smtClean="0"/>
-              <a:t>05-11-2017</a:t>
+              <a:t>06-11-2017</a:t>
             </a:fld>
             <a:endParaRPr lang="en-IN"/>
           </a:p>
@@ -1846,7 +1849,7 @@
           <a:p>
             <a:fld id="{2E87C897-2203-447C-8023-8D9097301B59}" type="datetimeFigureOut">
               <a:rPr lang="en-IN" smtClean="0"/>
-              <a:t>05-11-2017</a:t>
+              <a:t>06-11-2017</a:t>
             </a:fld>
             <a:endParaRPr lang="en-IN"/>
           </a:p>
@@ -2123,7 +2126,7 @@
           <a:p>
             <a:fld id="{2E87C897-2203-447C-8023-8D9097301B59}" type="datetimeFigureOut">
               <a:rPr lang="en-IN" smtClean="0"/>
-              <a:t>05-11-2017</a:t>
+              <a:t>06-11-2017</a:t>
             </a:fld>
             <a:endParaRPr lang="en-IN"/>
           </a:p>
@@ -2380,7 +2383,7 @@
           <a:p>
             <a:fld id="{2E87C897-2203-447C-8023-8D9097301B59}" type="datetimeFigureOut">
               <a:rPr lang="en-IN" smtClean="0"/>
-              <a:t>05-11-2017</a:t>
+              <a:t>06-11-2017</a:t>
             </a:fld>
             <a:endParaRPr lang="en-IN"/>
           </a:p>
@@ -2593,7 +2596,7 @@
           <a:p>
             <a:fld id="{2E87C897-2203-447C-8023-8D9097301B59}" type="datetimeFigureOut">
               <a:rPr lang="en-IN" smtClean="0"/>
-              <a:t>05-11-2017</a:t>
+              <a:t>06-11-2017</a:t>
             </a:fld>
             <a:endParaRPr lang="en-IN"/>
           </a:p>
@@ -4033,7 +4036,7 @@
         </p:nvSpPr>
         <p:spPr>
           <a:xfrm>
-            <a:off x="154527" y="994829"/>
+            <a:off x="318156" y="667570"/>
             <a:ext cx="746775" cy="246221"/>
           </a:xfrm>
           <a:prstGeom prst="rect">
@@ -4081,7 +4084,7 @@
         </p:blipFill>
         <p:spPr>
           <a:xfrm>
-            <a:off x="230663" y="1621051"/>
+            <a:off x="394292" y="1293792"/>
             <a:ext cx="4674714" cy="2276960"/>
           </a:xfrm>
           <a:prstGeom prst="rect">
@@ -4117,7 +4120,7 @@
         </p:blipFill>
         <p:spPr>
           <a:xfrm>
-            <a:off x="230663" y="1241050"/>
+            <a:off x="394292" y="913791"/>
             <a:ext cx="2703038" cy="243339"/>
           </a:xfrm>
           <a:prstGeom prst="rect">
@@ -4139,7 +4142,7 @@
         </p:nvSpPr>
         <p:spPr>
           <a:xfrm>
-            <a:off x="154527" y="3898011"/>
+            <a:off x="318156" y="3570752"/>
             <a:ext cx="5098364" cy="400110"/>
           </a:xfrm>
           <a:prstGeom prst="rect">
@@ -4156,6 +4159,60 @@
               <a:rPr lang="en-IN" sz="1000"/>
               <a:t>Note above, how socket gets new property “username” with new username, and how its pushed in the usersArray</a:t>
             </a:r>
+          </a:p>
+        </p:txBody>
+      </p:sp>
+      <p:sp>
+        <p:nvSpPr>
+          <p:cNvPr id="8" name="Rectangle: Rounded Corners 7">
+            <a:extLst>
+              <a:ext uri="{FF2B5EF4-FFF2-40B4-BE49-F238E27FC236}">
+                <a16:creationId xmlns:a16="http://schemas.microsoft.com/office/drawing/2014/main" id="{C715378D-0F03-4CB9-ADDC-DCFCD2A3289D}"/>
+              </a:ext>
+            </a:extLst>
+          </p:cNvPr>
+          <p:cNvSpPr/>
+          <p:nvPr/>
+        </p:nvSpPr>
+        <p:spPr>
+          <a:xfrm>
+            <a:off x="1024531" y="2719690"/>
+            <a:ext cx="2710071" cy="264142"/>
+          </a:xfrm>
+          <a:prstGeom prst="roundRect">
+            <a:avLst/>
+          </a:prstGeom>
+          <a:solidFill>
+            <a:srgbClr val="FFFF00">
+              <a:alpha val="22000"/>
+            </a:srgbClr>
+          </a:solidFill>
+          <a:ln>
+            <a:noFill/>
+          </a:ln>
+        </p:spPr>
+        <p:style>
+          <a:lnRef idx="2">
+            <a:schemeClr val="accent1">
+              <a:shade val="50000"/>
+            </a:schemeClr>
+          </a:lnRef>
+          <a:fillRef idx="1">
+            <a:schemeClr val="accent1"/>
+          </a:fillRef>
+          <a:effectRef idx="0">
+            <a:schemeClr val="accent1"/>
+          </a:effectRef>
+          <a:fontRef idx="minor">
+            <a:schemeClr val="lt1"/>
+          </a:fontRef>
+        </p:style>
+        <p:txBody>
+          <a:bodyPr rtlCol="0" anchor="ctr"/>
+          <a:lstStyle/>
+          <a:p>
+            <a:pPr algn="ctr"/>
+            <a:endParaRPr lang="en-IN"/>
           </a:p>
         </p:txBody>
       </p:sp>
@@ -4465,10 +4522,1182 @@
           </a:p>
         </p:txBody>
       </p:sp>
+      <p:sp>
+        <p:nvSpPr>
+          <p:cNvPr id="9" name="Rectangle: Rounded Corners 8">
+            <a:extLst>
+              <a:ext uri="{FF2B5EF4-FFF2-40B4-BE49-F238E27FC236}">
+                <a16:creationId xmlns:a16="http://schemas.microsoft.com/office/drawing/2014/main" id="{516AC5BD-4D8B-4EC1-ACEA-80A0AC7F6C1F}"/>
+              </a:ext>
+            </a:extLst>
+          </p:cNvPr>
+          <p:cNvSpPr/>
+          <p:nvPr/>
+        </p:nvSpPr>
+        <p:spPr>
+          <a:xfrm>
+            <a:off x="1201281" y="2779538"/>
+            <a:ext cx="1416791" cy="300546"/>
+          </a:xfrm>
+          <a:prstGeom prst="roundRect">
+            <a:avLst/>
+          </a:prstGeom>
+          <a:solidFill>
+            <a:srgbClr val="FFFF00">
+              <a:alpha val="22000"/>
+            </a:srgbClr>
+          </a:solidFill>
+          <a:ln>
+            <a:noFill/>
+          </a:ln>
+        </p:spPr>
+        <p:style>
+          <a:lnRef idx="2">
+            <a:schemeClr val="accent1">
+              <a:shade val="50000"/>
+            </a:schemeClr>
+          </a:lnRef>
+          <a:fillRef idx="1">
+            <a:schemeClr val="accent1"/>
+          </a:fillRef>
+          <a:effectRef idx="0">
+            <a:schemeClr val="accent1"/>
+          </a:effectRef>
+          <a:fontRef idx="minor">
+            <a:schemeClr val="lt1"/>
+          </a:fontRef>
+        </p:style>
+        <p:txBody>
+          <a:bodyPr rtlCol="0" anchor="ctr"/>
+          <a:lstStyle/>
+          <a:p>
+            <a:pPr algn="ctr"/>
+            <a:endParaRPr lang="en-IN"/>
+          </a:p>
+        </p:txBody>
+      </p:sp>
     </p:spTree>
     <p:extLst>
       <p:ext uri="{BB962C8B-B14F-4D97-AF65-F5344CB8AC3E}">
         <p14:creationId xmlns:p14="http://schemas.microsoft.com/office/powerpoint/2010/main" val="3130402744"/>
+      </p:ext>
+    </p:extLst>
+  </p:cSld>
+  <p:clrMapOvr>
+    <a:masterClrMapping/>
+  </p:clrMapOvr>
+</p:sld>
+</file>
+
+<file path=ppt/slides/slide14.xml><?xml version="1.0" encoding="utf-8"?>
+<p:sld xmlns:a="http://schemas.openxmlformats.org/drawingml/2006/main" xmlns:r="http://schemas.openxmlformats.org/officeDocument/2006/relationships" xmlns:p="http://schemas.openxmlformats.org/presentationml/2006/main">
+  <p:cSld>
+    <p:spTree>
+      <p:nvGrpSpPr>
+        <p:cNvPr id="1" name=""/>
+        <p:cNvGrpSpPr/>
+        <p:nvPr/>
+      </p:nvGrpSpPr>
+      <p:grpSpPr>
+        <a:xfrm>
+          <a:off x="0" y="0"/>
+          <a:ext cx="0" cy="0"/>
+          <a:chOff x="0" y="0"/>
+          <a:chExt cx="0" cy="0"/>
+        </a:xfrm>
+      </p:grpSpPr>
+      <p:sp>
+        <p:nvSpPr>
+          <p:cNvPr id="7" name="TextBox 6">
+            <a:extLst>
+              <a:ext uri="{FF2B5EF4-FFF2-40B4-BE49-F238E27FC236}">
+                <a16:creationId xmlns:a16="http://schemas.microsoft.com/office/drawing/2014/main" id="{342C9C4D-8096-4F7B-9016-6C449FB864BB}"/>
+              </a:ext>
+            </a:extLst>
+          </p:cNvPr>
+          <p:cNvSpPr txBox="1"/>
+          <p:nvPr/>
+        </p:nvSpPr>
+        <p:spPr>
+          <a:xfrm>
+            <a:off x="0" y="0"/>
+            <a:ext cx="910827" cy="369332"/>
+          </a:xfrm>
+          <a:prstGeom prst="rect">
+            <a:avLst/>
+          </a:prstGeom>
+          <a:solidFill>
+            <a:srgbClr val="FFFF00"/>
+          </a:solidFill>
+        </p:spPr>
+        <p:txBody>
+          <a:bodyPr wrap="none" rtlCol="0">
+            <a:spAutoFit/>
+          </a:bodyPr>
+          <a:lstStyle/>
+          <a:p>
+            <a:r>
+              <a:rPr lang="en-IN"/>
+              <a:t>Phase 1</a:t>
+            </a:r>
+          </a:p>
+        </p:txBody>
+      </p:sp>
+      <p:sp>
+        <p:nvSpPr>
+          <p:cNvPr id="9" name="Rectangle 8">
+            <a:extLst>
+              <a:ext uri="{FF2B5EF4-FFF2-40B4-BE49-F238E27FC236}">
+                <a16:creationId xmlns:a16="http://schemas.microsoft.com/office/drawing/2014/main" id="{2BD5C4B9-FFED-4311-BEB9-A4AE679A3CC9}"/>
+              </a:ext>
+            </a:extLst>
+          </p:cNvPr>
+          <p:cNvSpPr/>
+          <p:nvPr/>
+        </p:nvSpPr>
+        <p:spPr>
+          <a:xfrm>
+            <a:off x="87786" y="503112"/>
+            <a:ext cx="6070380" cy="1384995"/>
+          </a:xfrm>
+          <a:prstGeom prst="rect">
+            <a:avLst/>
+          </a:prstGeom>
+        </p:spPr>
+        <p:txBody>
+          <a:bodyPr wrap="none">
+            <a:spAutoFit/>
+          </a:bodyPr>
+          <a:lstStyle/>
+          <a:p>
+            <a:r>
+              <a:rPr lang="en-IN" sz="1200">
+                <a:solidFill>
+                  <a:schemeClr val="bg1">
+                    <a:lumMod val="75000"/>
+                  </a:schemeClr>
+                </a:solidFill>
+              </a:rPr>
+              <a:t>1.0 Enter username first – to be unique in current and session – then enters chat window page</a:t>
+            </a:r>
+          </a:p>
+          <a:p>
+            <a:r>
+              <a:rPr lang="en-IN" sz="1200"/>
+              <a:t>1.1 Online Userlists display on right/left pane</a:t>
+            </a:r>
+          </a:p>
+          <a:p>
+            <a:r>
+              <a:rPr lang="en-IN" sz="1200"/>
+              <a:t>1.2 Display User’s message on right, others on left of chat window</a:t>
+            </a:r>
+          </a:p>
+          <a:p>
+            <a:endParaRPr lang="en-IN" sz="1200"/>
+          </a:p>
+          <a:p>
+            <a:r>
+              <a:rPr lang="en-IN" sz="1200">
+                <a:solidFill>
+                  <a:schemeClr val="bg1">
+                    <a:lumMod val="75000"/>
+                  </a:schemeClr>
+                </a:solidFill>
+              </a:rPr>
+              <a:t>2.1 Private messaging (italicized, diff color)</a:t>
+            </a:r>
+          </a:p>
+          <a:p>
+            <a:r>
+              <a:rPr lang="en-IN" sz="1200">
+                <a:solidFill>
+                  <a:schemeClr val="bg1">
+                    <a:lumMod val="75000"/>
+                  </a:schemeClr>
+                </a:solidFill>
+              </a:rPr>
+              <a:t>2.2 When receiver offline, inform sender, it is so.</a:t>
+            </a:r>
+          </a:p>
+          <a:p>
+            <a:r>
+              <a:rPr lang="en-IN" sz="1200">
+                <a:solidFill>
+                  <a:schemeClr val="bg1">
+                    <a:lumMod val="75000"/>
+                  </a:schemeClr>
+                </a:solidFill>
+              </a:rPr>
+              <a:t>2.3 Auto Scroll</a:t>
+            </a:r>
+          </a:p>
+        </p:txBody>
+      </p:sp>
+      <p:sp>
+        <p:nvSpPr>
+          <p:cNvPr id="3" name="TextBox 2">
+            <a:extLst>
+              <a:ext uri="{FF2B5EF4-FFF2-40B4-BE49-F238E27FC236}">
+                <a16:creationId xmlns:a16="http://schemas.microsoft.com/office/drawing/2014/main" id="{DBE60D6F-55C1-4A2A-9A1B-694A889A9A8E}"/>
+              </a:ext>
+            </a:extLst>
+          </p:cNvPr>
+          <p:cNvSpPr txBox="1"/>
+          <p:nvPr/>
+        </p:nvSpPr>
+        <p:spPr>
+          <a:xfrm>
+            <a:off x="375385" y="2050181"/>
+            <a:ext cx="6273128" cy="830997"/>
+          </a:xfrm>
+          <a:prstGeom prst="rect">
+            <a:avLst/>
+          </a:prstGeom>
+          <a:noFill/>
+        </p:spPr>
+        <p:txBody>
+          <a:bodyPr wrap="none" rtlCol="0">
+            <a:spAutoFit/>
+          </a:bodyPr>
+          <a:lstStyle/>
+          <a:p>
+            <a:r>
+              <a:rPr lang="en-IN" sz="1200"/>
+              <a:t>Object.keys plays a helpful role in retrieving online users. If you recall, how we stored online users</a:t>
+            </a:r>
+          </a:p>
+          <a:p>
+            <a:r>
+              <a:rPr lang="en-IN" sz="1200"/>
+              <a:t>It is as below:</a:t>
+            </a:r>
+          </a:p>
+          <a:p>
+            <a:endParaRPr lang="en-IN" sz="1200"/>
+          </a:p>
+          <a:p>
+            <a:endParaRPr lang="en-IN" sz="1200"/>
+          </a:p>
+        </p:txBody>
+      </p:sp>
+      <p:pic>
+        <p:nvPicPr>
+          <p:cNvPr id="5" name="Picture 4">
+            <a:extLst>
+              <a:ext uri="{FF2B5EF4-FFF2-40B4-BE49-F238E27FC236}">
+                <a16:creationId xmlns:a16="http://schemas.microsoft.com/office/drawing/2014/main" id="{66735AAF-DB39-48CD-B5D7-01ECD79D4A2A}"/>
+              </a:ext>
+            </a:extLst>
+          </p:cNvPr>
+          <p:cNvPicPr>
+            <a:picLocks noChangeAspect="1"/>
+          </p:cNvPicPr>
+          <p:nvPr/>
+        </p:nvPicPr>
+        <p:blipFill>
+          <a:blip r:embed="rId2">
+            <a:extLst>
+              <a:ext uri="{28A0092B-C50C-407E-A947-70E740481C1C}">
+                <a14:useLocalDpi xmlns:a14="http://schemas.microsoft.com/office/drawing/2010/main" val="0"/>
+              </a:ext>
+            </a:extLst>
+          </a:blip>
+          <a:stretch>
+            <a:fillRect/>
+          </a:stretch>
+        </p:blipFill>
+        <p:spPr>
+          <a:xfrm>
+            <a:off x="455413" y="2547858"/>
+            <a:ext cx="4153480" cy="181000"/>
+          </a:xfrm>
+          <a:prstGeom prst="rect">
+            <a:avLst/>
+          </a:prstGeom>
+        </p:spPr>
+      </p:pic>
+      <p:sp>
+        <p:nvSpPr>
+          <p:cNvPr id="8" name="TextBox 7">
+            <a:extLst>
+              <a:ext uri="{FF2B5EF4-FFF2-40B4-BE49-F238E27FC236}">
+                <a16:creationId xmlns:a16="http://schemas.microsoft.com/office/drawing/2014/main" id="{2821E142-C1D7-495F-AAE1-9E7946C308E8}"/>
+              </a:ext>
+            </a:extLst>
+          </p:cNvPr>
+          <p:cNvSpPr txBox="1"/>
+          <p:nvPr/>
+        </p:nvSpPr>
+        <p:spPr>
+          <a:xfrm>
+            <a:off x="375385" y="2811036"/>
+            <a:ext cx="6030305" cy="461665"/>
+          </a:xfrm>
+          <a:prstGeom prst="rect">
+            <a:avLst/>
+          </a:prstGeom>
+          <a:noFill/>
+        </p:spPr>
+        <p:txBody>
+          <a:bodyPr wrap="none" rtlCol="0">
+            <a:spAutoFit/>
+          </a:bodyPr>
+          <a:lstStyle/>
+          <a:p>
+            <a:r>
+              <a:rPr lang="en-IN" sz="1200"/>
+              <a:t>Here, username string is used as a key and value is respective socket object itself in userArray.</a:t>
+            </a:r>
+          </a:p>
+          <a:p>
+            <a:r>
+              <a:rPr lang="en-IN" sz="1200"/>
+              <a:t>So when you print Object.keys(usersArray), you get the list of keys, that is the userNames. </a:t>
+            </a:r>
+          </a:p>
+        </p:txBody>
+      </p:sp>
+      <p:pic>
+        <p:nvPicPr>
+          <p:cNvPr id="10" name="Picture 9">
+            <a:extLst>
+              <a:ext uri="{FF2B5EF4-FFF2-40B4-BE49-F238E27FC236}">
+                <a16:creationId xmlns:a16="http://schemas.microsoft.com/office/drawing/2014/main" id="{764865E3-1653-4F3D-8D8A-23E9D6567A94}"/>
+              </a:ext>
+            </a:extLst>
+          </p:cNvPr>
+          <p:cNvPicPr>
+            <a:picLocks noChangeAspect="1"/>
+          </p:cNvPicPr>
+          <p:nvPr/>
+        </p:nvPicPr>
+        <p:blipFill>
+          <a:blip r:embed="rId3">
+            <a:extLst>
+              <a:ext uri="{28A0092B-C50C-407E-A947-70E740481C1C}">
+                <a14:useLocalDpi xmlns:a14="http://schemas.microsoft.com/office/drawing/2010/main" val="0"/>
+              </a:ext>
+            </a:extLst>
+          </a:blip>
+          <a:stretch>
+            <a:fillRect/>
+          </a:stretch>
+        </p:blipFill>
+        <p:spPr>
+          <a:xfrm>
+            <a:off x="246848" y="3378855"/>
+            <a:ext cx="6287377" cy="219106"/>
+          </a:xfrm>
+          <a:prstGeom prst="rect">
+            <a:avLst/>
+          </a:prstGeom>
+        </p:spPr>
+      </p:pic>
+      <p:pic>
+        <p:nvPicPr>
+          <p:cNvPr id="12" name="Picture 11">
+            <a:extLst>
+              <a:ext uri="{FF2B5EF4-FFF2-40B4-BE49-F238E27FC236}">
+                <a16:creationId xmlns:a16="http://schemas.microsoft.com/office/drawing/2014/main" id="{3C5D53FF-1CAA-4EA6-87B6-1FEA9188B008}"/>
+              </a:ext>
+            </a:extLst>
+          </p:cNvPr>
+          <p:cNvPicPr>
+            <a:picLocks noChangeAspect="1"/>
+          </p:cNvPicPr>
+          <p:nvPr/>
+        </p:nvPicPr>
+        <p:blipFill>
+          <a:blip r:embed="rId4">
+            <a:extLst>
+              <a:ext uri="{28A0092B-C50C-407E-A947-70E740481C1C}">
+                <a14:useLocalDpi xmlns:a14="http://schemas.microsoft.com/office/drawing/2010/main" val="0"/>
+              </a:ext>
+            </a:extLst>
+          </a:blip>
+          <a:stretch>
+            <a:fillRect/>
+          </a:stretch>
+        </p:blipFill>
+        <p:spPr>
+          <a:xfrm>
+            <a:off x="375385" y="3642033"/>
+            <a:ext cx="3734321" cy="276264"/>
+          </a:xfrm>
+          <a:prstGeom prst="rect">
+            <a:avLst/>
+          </a:prstGeom>
+        </p:spPr>
+      </p:pic>
+      <p:sp>
+        <p:nvSpPr>
+          <p:cNvPr id="13" name="TextBox 12">
+            <a:extLst>
+              <a:ext uri="{FF2B5EF4-FFF2-40B4-BE49-F238E27FC236}">
+                <a16:creationId xmlns:a16="http://schemas.microsoft.com/office/drawing/2014/main" id="{306F6263-7023-4180-AF28-CCCF9DBC8705}"/>
+              </a:ext>
+            </a:extLst>
+          </p:cNvPr>
+          <p:cNvSpPr txBox="1"/>
+          <p:nvPr/>
+        </p:nvSpPr>
+        <p:spPr>
+          <a:xfrm>
+            <a:off x="248145" y="3938362"/>
+            <a:ext cx="6464398" cy="646331"/>
+          </a:xfrm>
+          <a:prstGeom prst="rect">
+            <a:avLst/>
+          </a:prstGeom>
+          <a:noFill/>
+        </p:spPr>
+        <p:txBody>
+          <a:bodyPr wrap="none" rtlCol="0">
+            <a:spAutoFit/>
+          </a:bodyPr>
+          <a:lstStyle/>
+          <a:p>
+            <a:r>
+              <a:rPr lang="en-IN" sz="1200"/>
+              <a:t>So to display online users, we could just send Object.keys(usersArray) to client, and client can simply </a:t>
+            </a:r>
+          </a:p>
+          <a:p>
+            <a:r>
+              <a:rPr lang="en-IN" sz="1200"/>
+              <a:t>iterate to list the key Names.  (Of course we have to remove them in usersArray when socket </a:t>
+            </a:r>
+          </a:p>
+          <a:p>
+            <a:r>
+              <a:rPr lang="en-IN" sz="1200"/>
+              <a:t>Disconnects)</a:t>
+            </a:r>
+          </a:p>
+        </p:txBody>
+      </p:sp>
+    </p:spTree>
+    <p:extLst>
+      <p:ext uri="{BB962C8B-B14F-4D97-AF65-F5344CB8AC3E}">
+        <p14:creationId xmlns:p14="http://schemas.microsoft.com/office/powerpoint/2010/main" val="1485157457"/>
+      </p:ext>
+    </p:extLst>
+  </p:cSld>
+  <p:clrMapOvr>
+    <a:masterClrMapping/>
+  </p:clrMapOvr>
+</p:sld>
+</file>
+
+<file path=ppt/slides/slide15.xml><?xml version="1.0" encoding="utf-8"?>
+<p:sld xmlns:a="http://schemas.openxmlformats.org/drawingml/2006/main" xmlns:r="http://schemas.openxmlformats.org/officeDocument/2006/relationships" xmlns:p="http://schemas.openxmlformats.org/presentationml/2006/main">
+  <p:cSld>
+    <p:spTree>
+      <p:nvGrpSpPr>
+        <p:cNvPr id="1" name=""/>
+        <p:cNvGrpSpPr/>
+        <p:nvPr/>
+      </p:nvGrpSpPr>
+      <p:grpSpPr>
+        <a:xfrm>
+          <a:off x="0" y="0"/>
+          <a:ext cx="0" cy="0"/>
+          <a:chOff x="0" y="0"/>
+          <a:chExt cx="0" cy="0"/>
+        </a:xfrm>
+      </p:grpSpPr>
+      <p:sp>
+        <p:nvSpPr>
+          <p:cNvPr id="7" name="TextBox 6">
+            <a:extLst>
+              <a:ext uri="{FF2B5EF4-FFF2-40B4-BE49-F238E27FC236}">
+                <a16:creationId xmlns:a16="http://schemas.microsoft.com/office/drawing/2014/main" id="{342C9C4D-8096-4F7B-9016-6C449FB864BB}"/>
+              </a:ext>
+            </a:extLst>
+          </p:cNvPr>
+          <p:cNvSpPr txBox="1"/>
+          <p:nvPr/>
+        </p:nvSpPr>
+        <p:spPr>
+          <a:xfrm>
+            <a:off x="0" y="0"/>
+            <a:ext cx="910827" cy="369332"/>
+          </a:xfrm>
+          <a:prstGeom prst="rect">
+            <a:avLst/>
+          </a:prstGeom>
+          <a:solidFill>
+            <a:srgbClr val="FFFF00"/>
+          </a:solidFill>
+        </p:spPr>
+        <p:txBody>
+          <a:bodyPr wrap="none" rtlCol="0">
+            <a:spAutoFit/>
+          </a:bodyPr>
+          <a:lstStyle/>
+          <a:p>
+            <a:r>
+              <a:rPr lang="en-IN"/>
+              <a:t>Phase 1</a:t>
+            </a:r>
+          </a:p>
+        </p:txBody>
+      </p:sp>
+      <p:sp>
+        <p:nvSpPr>
+          <p:cNvPr id="11" name="TextBox 10">
+            <a:extLst>
+              <a:ext uri="{FF2B5EF4-FFF2-40B4-BE49-F238E27FC236}">
+                <a16:creationId xmlns:a16="http://schemas.microsoft.com/office/drawing/2014/main" id="{61CD41E9-3556-4C95-8EC7-EB55AE94B104}"/>
+              </a:ext>
+            </a:extLst>
+          </p:cNvPr>
+          <p:cNvSpPr txBox="1"/>
+          <p:nvPr/>
+        </p:nvSpPr>
+        <p:spPr>
+          <a:xfrm>
+            <a:off x="173255" y="510139"/>
+            <a:ext cx="5976060" cy="1384995"/>
+          </a:xfrm>
+          <a:prstGeom prst="rect">
+            <a:avLst/>
+          </a:prstGeom>
+          <a:noFill/>
+        </p:spPr>
+        <p:txBody>
+          <a:bodyPr wrap="none" rtlCol="0">
+            <a:spAutoFit/>
+          </a:bodyPr>
+          <a:lstStyle/>
+          <a:p>
+            <a:r>
+              <a:rPr lang="en-IN" sz="1200"/>
+              <a:t>We need to update online lists on basically two occasions: </a:t>
+            </a:r>
+          </a:p>
+          <a:p>
+            <a:endParaRPr lang="en-IN" sz="1200"/>
+          </a:p>
+          <a:p>
+            <a:r>
+              <a:rPr lang="en-IN" sz="1200"/>
+              <a:t>When new user joins,  (New User Validation Event)</a:t>
+            </a:r>
+          </a:p>
+          <a:p>
+            <a:r>
+              <a:rPr lang="en-IN" sz="1200"/>
+              <a:t>When existing user quits  (Disconnect Event)</a:t>
+            </a:r>
+          </a:p>
+          <a:p>
+            <a:endParaRPr lang="en-IN" sz="1200"/>
+          </a:p>
+          <a:p>
+            <a:r>
+              <a:rPr lang="en-IN" sz="1200"/>
+              <a:t>So we will define the server emitting usersArray in a function, so we could call at both above </a:t>
+            </a:r>
+          </a:p>
+          <a:p>
+            <a:r>
+              <a:rPr lang="en-IN" sz="1200"/>
+              <a:t>Scenarios</a:t>
+            </a:r>
+          </a:p>
+        </p:txBody>
+      </p:sp>
+      <p:pic>
+        <p:nvPicPr>
+          <p:cNvPr id="3" name="Picture 2">
+            <a:extLst>
+              <a:ext uri="{FF2B5EF4-FFF2-40B4-BE49-F238E27FC236}">
+                <a16:creationId xmlns:a16="http://schemas.microsoft.com/office/drawing/2014/main" id="{7951D7C3-0898-4782-9BD5-2056753CE13A}"/>
+              </a:ext>
+            </a:extLst>
+          </p:cNvPr>
+          <p:cNvPicPr>
+            <a:picLocks noChangeAspect="1"/>
+          </p:cNvPicPr>
+          <p:nvPr/>
+        </p:nvPicPr>
+        <p:blipFill>
+          <a:blip r:embed="rId2">
+            <a:extLst>
+              <a:ext uri="{28A0092B-C50C-407E-A947-70E740481C1C}">
+                <a14:useLocalDpi xmlns:a14="http://schemas.microsoft.com/office/drawing/2010/main" val="0"/>
+              </a:ext>
+            </a:extLst>
+          </a:blip>
+          <a:stretch>
+            <a:fillRect/>
+          </a:stretch>
+        </p:blipFill>
+        <p:spPr>
+          <a:xfrm>
+            <a:off x="0" y="2229139"/>
+            <a:ext cx="2333604" cy="777868"/>
+          </a:xfrm>
+          <a:prstGeom prst="rect">
+            <a:avLst/>
+          </a:prstGeom>
+        </p:spPr>
+      </p:pic>
+      <p:pic>
+        <p:nvPicPr>
+          <p:cNvPr id="5" name="Picture 4">
+            <a:extLst>
+              <a:ext uri="{FF2B5EF4-FFF2-40B4-BE49-F238E27FC236}">
+                <a16:creationId xmlns:a16="http://schemas.microsoft.com/office/drawing/2014/main" id="{BF4F50D3-9E61-4070-B41B-74328E65B551}"/>
+              </a:ext>
+            </a:extLst>
+          </p:cNvPr>
+          <p:cNvPicPr>
+            <a:picLocks noChangeAspect="1"/>
+          </p:cNvPicPr>
+          <p:nvPr/>
+        </p:nvPicPr>
+        <p:blipFill>
+          <a:blip r:embed="rId3">
+            <a:extLst>
+              <a:ext uri="{28A0092B-C50C-407E-A947-70E740481C1C}">
+                <a14:useLocalDpi xmlns:a14="http://schemas.microsoft.com/office/drawing/2010/main" val="0"/>
+              </a:ext>
+            </a:extLst>
+          </a:blip>
+          <a:stretch>
+            <a:fillRect/>
+          </a:stretch>
+        </p:blipFill>
+        <p:spPr>
+          <a:xfrm>
+            <a:off x="0" y="3257626"/>
+            <a:ext cx="2846742" cy="1164813"/>
+          </a:xfrm>
+          <a:prstGeom prst="rect">
+            <a:avLst/>
+          </a:prstGeom>
+        </p:spPr>
+      </p:pic>
+      <p:pic>
+        <p:nvPicPr>
+          <p:cNvPr id="8" name="Picture 7">
+            <a:extLst>
+              <a:ext uri="{FF2B5EF4-FFF2-40B4-BE49-F238E27FC236}">
+                <a16:creationId xmlns:a16="http://schemas.microsoft.com/office/drawing/2014/main" id="{B3F38C81-47E1-48CC-88B8-01EAAA35DDE3}"/>
+              </a:ext>
+            </a:extLst>
+          </p:cNvPr>
+          <p:cNvPicPr>
+            <a:picLocks noChangeAspect="1"/>
+          </p:cNvPicPr>
+          <p:nvPr/>
+        </p:nvPicPr>
+        <p:blipFill>
+          <a:blip r:embed="rId4">
+            <a:extLst>
+              <a:ext uri="{28A0092B-C50C-407E-A947-70E740481C1C}">
+                <a14:useLocalDpi xmlns:a14="http://schemas.microsoft.com/office/drawing/2010/main" val="0"/>
+              </a:ext>
+            </a:extLst>
+          </a:blip>
+          <a:stretch>
+            <a:fillRect/>
+          </a:stretch>
+        </p:blipFill>
+        <p:spPr>
+          <a:xfrm>
+            <a:off x="2876574" y="2560320"/>
+            <a:ext cx="3562728" cy="1862119"/>
+          </a:xfrm>
+          <a:prstGeom prst="rect">
+            <a:avLst/>
+          </a:prstGeom>
+        </p:spPr>
+      </p:pic>
+      <p:sp>
+        <p:nvSpPr>
+          <p:cNvPr id="10" name="Rectangle: Rounded Corners 9">
+            <a:extLst>
+              <a:ext uri="{FF2B5EF4-FFF2-40B4-BE49-F238E27FC236}">
+                <a16:creationId xmlns:a16="http://schemas.microsoft.com/office/drawing/2014/main" id="{3CC26836-B48B-4EC6-A436-B3E9E6AE418A}"/>
+              </a:ext>
+            </a:extLst>
+          </p:cNvPr>
+          <p:cNvSpPr/>
+          <p:nvPr/>
+        </p:nvSpPr>
+        <p:spPr>
+          <a:xfrm>
+            <a:off x="298110" y="4028726"/>
+            <a:ext cx="1442559" cy="224078"/>
+          </a:xfrm>
+          <a:prstGeom prst="roundRect">
+            <a:avLst/>
+          </a:prstGeom>
+          <a:solidFill>
+            <a:srgbClr val="FFFF00">
+              <a:alpha val="22000"/>
+            </a:srgbClr>
+          </a:solidFill>
+          <a:ln>
+            <a:noFill/>
+          </a:ln>
+        </p:spPr>
+        <p:style>
+          <a:lnRef idx="2">
+            <a:schemeClr val="accent1">
+              <a:shade val="50000"/>
+            </a:schemeClr>
+          </a:lnRef>
+          <a:fillRef idx="1">
+            <a:schemeClr val="accent1"/>
+          </a:fillRef>
+          <a:effectRef idx="0">
+            <a:schemeClr val="accent1"/>
+          </a:effectRef>
+          <a:fontRef idx="minor">
+            <a:schemeClr val="lt1"/>
+          </a:fontRef>
+        </p:style>
+        <p:txBody>
+          <a:bodyPr rtlCol="0" anchor="ctr"/>
+          <a:lstStyle/>
+          <a:p>
+            <a:pPr algn="ctr"/>
+            <a:endParaRPr lang="en-IN"/>
+          </a:p>
+        </p:txBody>
+      </p:sp>
+      <p:sp>
+        <p:nvSpPr>
+          <p:cNvPr id="12" name="Rectangle: Rounded Corners 11">
+            <a:extLst>
+              <a:ext uri="{FF2B5EF4-FFF2-40B4-BE49-F238E27FC236}">
+                <a16:creationId xmlns:a16="http://schemas.microsoft.com/office/drawing/2014/main" id="{4B4348D0-5788-4C91-BC5E-0708D3FAC999}"/>
+              </a:ext>
+            </a:extLst>
+          </p:cNvPr>
+          <p:cNvSpPr/>
+          <p:nvPr/>
+        </p:nvSpPr>
+        <p:spPr>
+          <a:xfrm>
+            <a:off x="3289963" y="3974068"/>
+            <a:ext cx="1442559" cy="224078"/>
+          </a:xfrm>
+          <a:prstGeom prst="roundRect">
+            <a:avLst/>
+          </a:prstGeom>
+          <a:solidFill>
+            <a:srgbClr val="FFFF00">
+              <a:alpha val="22000"/>
+            </a:srgbClr>
+          </a:solidFill>
+          <a:ln>
+            <a:noFill/>
+          </a:ln>
+        </p:spPr>
+        <p:style>
+          <a:lnRef idx="2">
+            <a:schemeClr val="accent1">
+              <a:shade val="50000"/>
+            </a:schemeClr>
+          </a:lnRef>
+          <a:fillRef idx="1">
+            <a:schemeClr val="accent1"/>
+          </a:fillRef>
+          <a:effectRef idx="0">
+            <a:schemeClr val="accent1"/>
+          </a:effectRef>
+          <a:fontRef idx="minor">
+            <a:schemeClr val="lt1"/>
+          </a:fontRef>
+        </p:style>
+        <p:txBody>
+          <a:bodyPr rtlCol="0" anchor="ctr"/>
+          <a:lstStyle/>
+          <a:p>
+            <a:pPr algn="ctr"/>
+            <a:endParaRPr lang="en-IN"/>
+          </a:p>
+        </p:txBody>
+      </p:sp>
+      <p:sp>
+        <p:nvSpPr>
+          <p:cNvPr id="13" name="Rectangle 12">
+            <a:extLst>
+              <a:ext uri="{FF2B5EF4-FFF2-40B4-BE49-F238E27FC236}">
+                <a16:creationId xmlns:a16="http://schemas.microsoft.com/office/drawing/2014/main" id="{55536680-5F7F-412D-8F59-11193288FC13}"/>
+              </a:ext>
+            </a:extLst>
+          </p:cNvPr>
+          <p:cNvSpPr/>
+          <p:nvPr/>
+        </p:nvSpPr>
+        <p:spPr>
+          <a:xfrm>
+            <a:off x="2787897" y="1899532"/>
+            <a:ext cx="746775" cy="246221"/>
+          </a:xfrm>
+          <a:prstGeom prst="rect">
+            <a:avLst/>
+          </a:prstGeom>
+        </p:spPr>
+        <p:txBody>
+          <a:bodyPr wrap="square">
+            <a:spAutoFit/>
+          </a:bodyPr>
+          <a:lstStyle/>
+          <a:p>
+            <a:r>
+              <a:rPr lang="en-IN" sz="1000" b="1"/>
+              <a:t>Server</a:t>
+            </a:r>
+          </a:p>
+        </p:txBody>
+      </p:sp>
+    </p:spTree>
+    <p:extLst>
+      <p:ext uri="{BB962C8B-B14F-4D97-AF65-F5344CB8AC3E}">
+        <p14:creationId xmlns:p14="http://schemas.microsoft.com/office/powerpoint/2010/main" val="1024572077"/>
+      </p:ext>
+    </p:extLst>
+  </p:cSld>
+  <p:clrMapOvr>
+    <a:masterClrMapping/>
+  </p:clrMapOvr>
+</p:sld>
+</file>
+
+<file path=ppt/slides/slide16.xml><?xml version="1.0" encoding="utf-8"?>
+<p:sld xmlns:a="http://schemas.openxmlformats.org/drawingml/2006/main" xmlns:r="http://schemas.openxmlformats.org/officeDocument/2006/relationships" xmlns:p="http://schemas.openxmlformats.org/presentationml/2006/main">
+  <p:cSld>
+    <p:spTree>
+      <p:nvGrpSpPr>
+        <p:cNvPr id="1" name=""/>
+        <p:cNvGrpSpPr/>
+        <p:nvPr/>
+      </p:nvGrpSpPr>
+      <p:grpSpPr>
+        <a:xfrm>
+          <a:off x="0" y="0"/>
+          <a:ext cx="0" cy="0"/>
+          <a:chOff x="0" y="0"/>
+          <a:chExt cx="0" cy="0"/>
+        </a:xfrm>
+      </p:grpSpPr>
+      <p:sp>
+        <p:nvSpPr>
+          <p:cNvPr id="7" name="TextBox 6">
+            <a:extLst>
+              <a:ext uri="{FF2B5EF4-FFF2-40B4-BE49-F238E27FC236}">
+                <a16:creationId xmlns:a16="http://schemas.microsoft.com/office/drawing/2014/main" id="{342C9C4D-8096-4F7B-9016-6C449FB864BB}"/>
+              </a:ext>
+            </a:extLst>
+          </p:cNvPr>
+          <p:cNvSpPr txBox="1"/>
+          <p:nvPr/>
+        </p:nvSpPr>
+        <p:spPr>
+          <a:xfrm>
+            <a:off x="0" y="0"/>
+            <a:ext cx="910827" cy="369332"/>
+          </a:xfrm>
+          <a:prstGeom prst="rect">
+            <a:avLst/>
+          </a:prstGeom>
+          <a:solidFill>
+            <a:srgbClr val="FFFF00"/>
+          </a:solidFill>
+        </p:spPr>
+        <p:txBody>
+          <a:bodyPr wrap="none" rtlCol="0">
+            <a:spAutoFit/>
+          </a:bodyPr>
+          <a:lstStyle/>
+          <a:p>
+            <a:r>
+              <a:rPr lang="en-IN"/>
+              <a:t>Phase 1</a:t>
+            </a:r>
+          </a:p>
+        </p:txBody>
+      </p:sp>
+      <p:sp>
+        <p:nvSpPr>
+          <p:cNvPr id="13" name="Rectangle 12">
+            <a:extLst>
+              <a:ext uri="{FF2B5EF4-FFF2-40B4-BE49-F238E27FC236}">
+                <a16:creationId xmlns:a16="http://schemas.microsoft.com/office/drawing/2014/main" id="{55536680-5F7F-412D-8F59-11193288FC13}"/>
+              </a:ext>
+            </a:extLst>
+          </p:cNvPr>
+          <p:cNvSpPr/>
+          <p:nvPr/>
+        </p:nvSpPr>
+        <p:spPr>
+          <a:xfrm>
+            <a:off x="272614" y="619951"/>
+            <a:ext cx="746775" cy="246221"/>
+          </a:xfrm>
+          <a:prstGeom prst="rect">
+            <a:avLst/>
+          </a:prstGeom>
+        </p:spPr>
+        <p:txBody>
+          <a:bodyPr wrap="square">
+            <a:spAutoFit/>
+          </a:bodyPr>
+          <a:lstStyle/>
+          <a:p>
+            <a:r>
+              <a:rPr lang="en-IN" sz="1000" b="1"/>
+              <a:t>Client</a:t>
+            </a:r>
+          </a:p>
+        </p:txBody>
+      </p:sp>
+      <p:pic>
+        <p:nvPicPr>
+          <p:cNvPr id="9" name="Picture 8">
+            <a:extLst>
+              <a:ext uri="{FF2B5EF4-FFF2-40B4-BE49-F238E27FC236}">
+                <a16:creationId xmlns:a16="http://schemas.microsoft.com/office/drawing/2014/main" id="{2C8D59B0-9E5C-48B0-83FD-46F075719C34}"/>
+              </a:ext>
+            </a:extLst>
+          </p:cNvPr>
+          <p:cNvPicPr>
+            <a:picLocks noChangeAspect="1"/>
+          </p:cNvPicPr>
+          <p:nvPr/>
+        </p:nvPicPr>
+        <p:blipFill>
+          <a:blip r:embed="rId2">
+            <a:extLst>
+              <a:ext uri="{28A0092B-C50C-407E-A947-70E740481C1C}">
+                <a14:useLocalDpi xmlns:a14="http://schemas.microsoft.com/office/drawing/2010/main" val="0"/>
+              </a:ext>
+            </a:extLst>
+          </a:blip>
+          <a:stretch>
+            <a:fillRect/>
+          </a:stretch>
+        </p:blipFill>
+        <p:spPr>
+          <a:xfrm>
+            <a:off x="462013" y="2399908"/>
+            <a:ext cx="4677878" cy="1687204"/>
+          </a:xfrm>
+          <a:prstGeom prst="rect">
+            <a:avLst/>
+          </a:prstGeom>
+        </p:spPr>
+      </p:pic>
+      <p:sp>
+        <p:nvSpPr>
+          <p:cNvPr id="14" name="Rectangle: Rounded Corners 13">
+            <a:extLst>
+              <a:ext uri="{FF2B5EF4-FFF2-40B4-BE49-F238E27FC236}">
+                <a16:creationId xmlns:a16="http://schemas.microsoft.com/office/drawing/2014/main" id="{B6FA1389-814E-47CE-9EA4-8A974700EC19}"/>
+              </a:ext>
+            </a:extLst>
+          </p:cNvPr>
+          <p:cNvSpPr/>
+          <p:nvPr/>
+        </p:nvSpPr>
+        <p:spPr>
+          <a:xfrm>
+            <a:off x="910827" y="3102434"/>
+            <a:ext cx="1428112" cy="141279"/>
+          </a:xfrm>
+          <a:prstGeom prst="roundRect">
+            <a:avLst/>
+          </a:prstGeom>
+          <a:solidFill>
+            <a:srgbClr val="FFFF00">
+              <a:alpha val="22000"/>
+            </a:srgbClr>
+          </a:solidFill>
+          <a:ln>
+            <a:noFill/>
+          </a:ln>
+        </p:spPr>
+        <p:style>
+          <a:lnRef idx="2">
+            <a:schemeClr val="accent1">
+              <a:shade val="50000"/>
+            </a:schemeClr>
+          </a:lnRef>
+          <a:fillRef idx="1">
+            <a:schemeClr val="accent1"/>
+          </a:fillRef>
+          <a:effectRef idx="0">
+            <a:schemeClr val="accent1"/>
+          </a:effectRef>
+          <a:fontRef idx="minor">
+            <a:schemeClr val="lt1"/>
+          </a:fontRef>
+        </p:style>
+        <p:txBody>
+          <a:bodyPr rtlCol="0" anchor="ctr"/>
+          <a:lstStyle/>
+          <a:p>
+            <a:pPr algn="ctr"/>
+            <a:endParaRPr lang="en-IN"/>
+          </a:p>
+        </p:txBody>
+      </p:sp>
+      <p:sp>
+        <p:nvSpPr>
+          <p:cNvPr id="16" name="Rectangle: Rounded Corners 15">
+            <a:extLst>
+              <a:ext uri="{FF2B5EF4-FFF2-40B4-BE49-F238E27FC236}">
+                <a16:creationId xmlns:a16="http://schemas.microsoft.com/office/drawing/2014/main" id="{5C6DA4B9-02D0-4E10-B32E-08B97FD9A2D5}"/>
+              </a:ext>
+            </a:extLst>
+          </p:cNvPr>
+          <p:cNvSpPr/>
+          <p:nvPr/>
+        </p:nvSpPr>
+        <p:spPr>
+          <a:xfrm>
+            <a:off x="1116531" y="3447339"/>
+            <a:ext cx="4023360" cy="258387"/>
+          </a:xfrm>
+          <a:prstGeom prst="roundRect">
+            <a:avLst/>
+          </a:prstGeom>
+          <a:solidFill>
+            <a:srgbClr val="FFFF00">
+              <a:alpha val="22000"/>
+            </a:srgbClr>
+          </a:solidFill>
+          <a:ln>
+            <a:noFill/>
+          </a:ln>
+        </p:spPr>
+        <p:style>
+          <a:lnRef idx="2">
+            <a:schemeClr val="accent1">
+              <a:shade val="50000"/>
+            </a:schemeClr>
+          </a:lnRef>
+          <a:fillRef idx="1">
+            <a:schemeClr val="accent1"/>
+          </a:fillRef>
+          <a:effectRef idx="0">
+            <a:schemeClr val="accent1"/>
+          </a:effectRef>
+          <a:fontRef idx="minor">
+            <a:schemeClr val="lt1"/>
+          </a:fontRef>
+        </p:style>
+        <p:txBody>
+          <a:bodyPr rtlCol="0" anchor="ctr"/>
+          <a:lstStyle/>
+          <a:p>
+            <a:pPr algn="ctr"/>
+            <a:endParaRPr lang="en-IN"/>
+          </a:p>
+        </p:txBody>
+      </p:sp>
+      <p:pic>
+        <p:nvPicPr>
+          <p:cNvPr id="18" name="Picture 17">
+            <a:extLst>
+              <a:ext uri="{FF2B5EF4-FFF2-40B4-BE49-F238E27FC236}">
+                <a16:creationId xmlns:a16="http://schemas.microsoft.com/office/drawing/2014/main" id="{3A837B10-E1E3-42CB-9EDA-594DFA5DB9DB}"/>
+              </a:ext>
+            </a:extLst>
+          </p:cNvPr>
+          <p:cNvPicPr>
+            <a:picLocks noChangeAspect="1"/>
+          </p:cNvPicPr>
+          <p:nvPr/>
+        </p:nvPicPr>
+        <p:blipFill>
+          <a:blip r:embed="rId3">
+            <a:extLst>
+              <a:ext uri="{28A0092B-C50C-407E-A947-70E740481C1C}">
+                <a14:useLocalDpi xmlns:a14="http://schemas.microsoft.com/office/drawing/2010/main" val="0"/>
+              </a:ext>
+            </a:extLst>
+          </a:blip>
+          <a:stretch>
+            <a:fillRect/>
+          </a:stretch>
+        </p:blipFill>
+        <p:spPr>
+          <a:xfrm>
+            <a:off x="462013" y="1080310"/>
+            <a:ext cx="3644649" cy="1115972"/>
+          </a:xfrm>
+          <a:prstGeom prst="rect">
+            <a:avLst/>
+          </a:prstGeom>
+        </p:spPr>
+      </p:pic>
+      <p:sp>
+        <p:nvSpPr>
+          <p:cNvPr id="19" name="Rectangle: Rounded Corners 18">
+            <a:extLst>
+              <a:ext uri="{FF2B5EF4-FFF2-40B4-BE49-F238E27FC236}">
+                <a16:creationId xmlns:a16="http://schemas.microsoft.com/office/drawing/2014/main" id="{A16B0850-C849-4C52-AFF3-2CD67116F30D}"/>
+              </a:ext>
+            </a:extLst>
+          </p:cNvPr>
+          <p:cNvSpPr/>
+          <p:nvPr/>
+        </p:nvSpPr>
+        <p:spPr>
+          <a:xfrm>
+            <a:off x="1116530" y="1676196"/>
+            <a:ext cx="2358189" cy="210356"/>
+          </a:xfrm>
+          <a:prstGeom prst="roundRect">
+            <a:avLst/>
+          </a:prstGeom>
+          <a:solidFill>
+            <a:srgbClr val="FFFF00">
+              <a:alpha val="22000"/>
+            </a:srgbClr>
+          </a:solidFill>
+          <a:ln>
+            <a:noFill/>
+          </a:ln>
+        </p:spPr>
+        <p:style>
+          <a:lnRef idx="2">
+            <a:schemeClr val="accent1">
+              <a:shade val="50000"/>
+            </a:schemeClr>
+          </a:lnRef>
+          <a:fillRef idx="1">
+            <a:schemeClr val="accent1"/>
+          </a:fillRef>
+          <a:effectRef idx="0">
+            <a:schemeClr val="accent1"/>
+          </a:effectRef>
+          <a:fontRef idx="minor">
+            <a:schemeClr val="lt1"/>
+          </a:fontRef>
+        </p:style>
+        <p:txBody>
+          <a:bodyPr rtlCol="0" anchor="ctr"/>
+          <a:lstStyle/>
+          <a:p>
+            <a:pPr algn="ctr"/>
+            <a:endParaRPr lang="en-IN"/>
+          </a:p>
+        </p:txBody>
+      </p:sp>
+    </p:spTree>
+    <p:extLst>
+      <p:ext uri="{BB962C8B-B14F-4D97-AF65-F5344CB8AC3E}">
+        <p14:creationId xmlns:p14="http://schemas.microsoft.com/office/powerpoint/2010/main" val="946009789"/>
       </p:ext>
     </p:extLst>
   </p:cSld>

</xml_diff>

<commit_message>
Private Messaging and Auto Scroll
</commit_message>
<xml_diff>
--- a/Illustrations.pptx
+++ b/Illustrations.pptx
@@ -25,6 +25,12 @@
     <p:sldId id="273" r:id="rId19"/>
     <p:sldId id="274" r:id="rId20"/>
     <p:sldId id="275" r:id="rId21"/>
+    <p:sldId id="276" r:id="rId22"/>
+    <p:sldId id="277" r:id="rId23"/>
+    <p:sldId id="278" r:id="rId24"/>
+    <p:sldId id="279" r:id="rId25"/>
+    <p:sldId id="280" r:id="rId26"/>
+    <p:sldId id="281" r:id="rId27"/>
   </p:sldIdLst>
   <p:sldSz cx="6659563" cy="4679950"/>
   <p:notesSz cx="6858000" cy="9144000"/>
@@ -277,7 +283,7 @@
           <a:p>
             <a:fld id="{2E87C897-2203-447C-8023-8D9097301B59}" type="datetimeFigureOut">
               <a:rPr lang="en-IN" smtClean="0"/>
-              <a:t>06-11-2017</a:t>
+              <a:t>07-11-2017</a:t>
             </a:fld>
             <a:endParaRPr lang="en-IN"/>
           </a:p>
@@ -447,7 +453,7 @@
           <a:p>
             <a:fld id="{2E87C897-2203-447C-8023-8D9097301B59}" type="datetimeFigureOut">
               <a:rPr lang="en-IN" smtClean="0"/>
-              <a:t>06-11-2017</a:t>
+              <a:t>07-11-2017</a:t>
             </a:fld>
             <a:endParaRPr lang="en-IN"/>
           </a:p>
@@ -627,7 +633,7 @@
           <a:p>
             <a:fld id="{2E87C897-2203-447C-8023-8D9097301B59}" type="datetimeFigureOut">
               <a:rPr lang="en-IN" smtClean="0"/>
-              <a:t>06-11-2017</a:t>
+              <a:t>07-11-2017</a:t>
             </a:fld>
             <a:endParaRPr lang="en-IN"/>
           </a:p>
@@ -797,7 +803,7 @@
           <a:p>
             <a:fld id="{2E87C897-2203-447C-8023-8D9097301B59}" type="datetimeFigureOut">
               <a:rPr lang="en-IN" smtClean="0"/>
-              <a:t>06-11-2017</a:t>
+              <a:t>07-11-2017</a:t>
             </a:fld>
             <a:endParaRPr lang="en-IN"/>
           </a:p>
@@ -1041,7 +1047,7 @@
           <a:p>
             <a:fld id="{2E87C897-2203-447C-8023-8D9097301B59}" type="datetimeFigureOut">
               <a:rPr lang="en-IN" smtClean="0"/>
-              <a:t>06-11-2017</a:t>
+              <a:t>07-11-2017</a:t>
             </a:fld>
             <a:endParaRPr lang="en-IN"/>
           </a:p>
@@ -1273,7 +1279,7 @@
           <a:p>
             <a:fld id="{2E87C897-2203-447C-8023-8D9097301B59}" type="datetimeFigureOut">
               <a:rPr lang="en-IN" smtClean="0"/>
-              <a:t>06-11-2017</a:t>
+              <a:t>07-11-2017</a:t>
             </a:fld>
             <a:endParaRPr lang="en-IN"/>
           </a:p>
@@ -1640,7 +1646,7 @@
           <a:p>
             <a:fld id="{2E87C897-2203-447C-8023-8D9097301B59}" type="datetimeFigureOut">
               <a:rPr lang="en-IN" smtClean="0"/>
-              <a:t>06-11-2017</a:t>
+              <a:t>07-11-2017</a:t>
             </a:fld>
             <a:endParaRPr lang="en-IN"/>
           </a:p>
@@ -1758,7 +1764,7 @@
           <a:p>
             <a:fld id="{2E87C897-2203-447C-8023-8D9097301B59}" type="datetimeFigureOut">
               <a:rPr lang="en-IN" smtClean="0"/>
-              <a:t>06-11-2017</a:t>
+              <a:t>07-11-2017</a:t>
             </a:fld>
             <a:endParaRPr lang="en-IN"/>
           </a:p>
@@ -1853,7 +1859,7 @@
           <a:p>
             <a:fld id="{2E87C897-2203-447C-8023-8D9097301B59}" type="datetimeFigureOut">
               <a:rPr lang="en-IN" smtClean="0"/>
-              <a:t>06-11-2017</a:t>
+              <a:t>07-11-2017</a:t>
             </a:fld>
             <a:endParaRPr lang="en-IN"/>
           </a:p>
@@ -2130,7 +2136,7 @@
           <a:p>
             <a:fld id="{2E87C897-2203-447C-8023-8D9097301B59}" type="datetimeFigureOut">
               <a:rPr lang="en-IN" smtClean="0"/>
-              <a:t>06-11-2017</a:t>
+              <a:t>07-11-2017</a:t>
             </a:fld>
             <a:endParaRPr lang="en-IN"/>
           </a:p>
@@ -2387,7 +2393,7 @@
           <a:p>
             <a:fld id="{2E87C897-2203-447C-8023-8D9097301B59}" type="datetimeFigureOut">
               <a:rPr lang="en-IN" smtClean="0"/>
-              <a:t>06-11-2017</a:t>
+              <a:t>07-11-2017</a:t>
             </a:fld>
             <a:endParaRPr lang="en-IN"/>
           </a:p>
@@ -2600,7 +2606,7 @@
           <a:p>
             <a:fld id="{2E87C897-2203-447C-8023-8D9097301B59}" type="datetimeFigureOut">
               <a:rPr lang="en-IN" smtClean="0"/>
-              <a:t>06-11-2017</a:t>
+              <a:t>07-11-2017</a:t>
             </a:fld>
             <a:endParaRPr lang="en-IN"/>
           </a:p>
@@ -7527,6 +7533,1988 @@
 </p:sld>
 </file>
 
+<file path=ppt/slides/slide21.xml><?xml version="1.0" encoding="utf-8"?>
+<p:sld xmlns:a="http://schemas.openxmlformats.org/drawingml/2006/main" xmlns:r="http://schemas.openxmlformats.org/officeDocument/2006/relationships" xmlns:p="http://schemas.openxmlformats.org/presentationml/2006/main">
+  <p:cSld>
+    <p:spTree>
+      <p:nvGrpSpPr>
+        <p:cNvPr id="1" name=""/>
+        <p:cNvGrpSpPr/>
+        <p:nvPr/>
+      </p:nvGrpSpPr>
+      <p:grpSpPr>
+        <a:xfrm>
+          <a:off x="0" y="0"/>
+          <a:ext cx="0" cy="0"/>
+          <a:chOff x="0" y="0"/>
+          <a:chExt cx="0" cy="0"/>
+        </a:xfrm>
+      </p:grpSpPr>
+      <p:sp>
+        <p:nvSpPr>
+          <p:cNvPr id="7" name="TextBox 6">
+            <a:extLst>
+              <a:ext uri="{FF2B5EF4-FFF2-40B4-BE49-F238E27FC236}">
+                <a16:creationId xmlns:a16="http://schemas.microsoft.com/office/drawing/2014/main" id="{342C9C4D-8096-4F7B-9016-6C449FB864BB}"/>
+              </a:ext>
+            </a:extLst>
+          </p:cNvPr>
+          <p:cNvSpPr txBox="1"/>
+          <p:nvPr/>
+        </p:nvSpPr>
+        <p:spPr>
+          <a:xfrm>
+            <a:off x="0" y="0"/>
+            <a:ext cx="910827" cy="369332"/>
+          </a:xfrm>
+          <a:prstGeom prst="rect">
+            <a:avLst/>
+          </a:prstGeom>
+          <a:solidFill>
+            <a:srgbClr val="FFFF00"/>
+          </a:solidFill>
+        </p:spPr>
+        <p:txBody>
+          <a:bodyPr wrap="none" rtlCol="0">
+            <a:spAutoFit/>
+          </a:bodyPr>
+          <a:lstStyle/>
+          <a:p>
+            <a:r>
+              <a:rPr lang="en-IN"/>
+              <a:t>Phase 2</a:t>
+            </a:r>
+          </a:p>
+        </p:txBody>
+      </p:sp>
+      <p:sp>
+        <p:nvSpPr>
+          <p:cNvPr id="9" name="Rectangle 8">
+            <a:extLst>
+              <a:ext uri="{FF2B5EF4-FFF2-40B4-BE49-F238E27FC236}">
+                <a16:creationId xmlns:a16="http://schemas.microsoft.com/office/drawing/2014/main" id="{2BD5C4B9-FFED-4311-BEB9-A4AE679A3CC9}"/>
+              </a:ext>
+            </a:extLst>
+          </p:cNvPr>
+          <p:cNvSpPr/>
+          <p:nvPr/>
+        </p:nvSpPr>
+        <p:spPr>
+          <a:xfrm>
+            <a:off x="78161" y="685992"/>
+            <a:ext cx="3211264" cy="646331"/>
+          </a:xfrm>
+          <a:prstGeom prst="rect">
+            <a:avLst/>
+          </a:prstGeom>
+        </p:spPr>
+        <p:txBody>
+          <a:bodyPr wrap="none">
+            <a:spAutoFit/>
+          </a:bodyPr>
+          <a:lstStyle/>
+          <a:p>
+            <a:r>
+              <a:rPr lang="en-IN" sz="1200"/>
+              <a:t>2.1 Private messaging (italicized, diff color)</a:t>
+            </a:r>
+          </a:p>
+          <a:p>
+            <a:r>
+              <a:rPr lang="en-IN" sz="1200"/>
+              <a:t>2.2 When receiver offline, inform sender, it is so.</a:t>
+            </a:r>
+          </a:p>
+          <a:p>
+            <a:r>
+              <a:rPr lang="en-IN" sz="1200"/>
+              <a:t>2.3 Auto Scroll</a:t>
+            </a:r>
+          </a:p>
+        </p:txBody>
+      </p:sp>
+      <p:sp>
+        <p:nvSpPr>
+          <p:cNvPr id="4" name="Rectangle 3">
+            <a:extLst>
+              <a:ext uri="{FF2B5EF4-FFF2-40B4-BE49-F238E27FC236}">
+                <a16:creationId xmlns:a16="http://schemas.microsoft.com/office/drawing/2014/main" id="{7BA6EAB1-49CE-462E-AA3F-5D6B55D463B9}"/>
+              </a:ext>
+            </a:extLst>
+          </p:cNvPr>
+          <p:cNvSpPr/>
+          <p:nvPr/>
+        </p:nvSpPr>
+        <p:spPr>
+          <a:xfrm>
+            <a:off x="243399" y="1466103"/>
+            <a:ext cx="6092052" cy="3046988"/>
+          </a:xfrm>
+          <a:prstGeom prst="rect">
+            <a:avLst/>
+          </a:prstGeom>
+        </p:spPr>
+        <p:txBody>
+          <a:bodyPr wrap="none">
+            <a:spAutoFit/>
+          </a:bodyPr>
+          <a:lstStyle/>
+          <a:p>
+            <a:r>
+              <a:rPr lang="en-IN" sz="1200"/>
+              <a:t>Private Message should start with @username. So on server side, we could identify if an</a:t>
+            </a:r>
+          </a:p>
+          <a:p>
+            <a:r>
+              <a:rPr lang="en-IN" sz="1200"/>
+              <a:t>Incoming message from any socket is a private message or not by below method. </a:t>
+            </a:r>
+          </a:p>
+          <a:p>
+            <a:endParaRPr lang="en-IN" sz="1200"/>
+          </a:p>
+          <a:p>
+            <a:r>
+              <a:rPr lang="en-IN" sz="1200"/>
+              <a:t>If </a:t>
+            </a:r>
+            <a:r>
+              <a:rPr lang="en-IN" sz="1200">
+                <a:solidFill>
+                  <a:srgbClr val="0070C0"/>
+                </a:solidFill>
+              </a:rPr>
+              <a:t>(incomingMessage.substr(0,1) === “@”)</a:t>
+            </a:r>
+          </a:p>
+          <a:p>
+            <a:r>
+              <a:rPr lang="en-IN" sz="1200"/>
+              <a:t>{</a:t>
+            </a:r>
+          </a:p>
+          <a:p>
+            <a:r>
+              <a:rPr lang="en-IN" sz="1200"/>
+              <a:t>	</a:t>
+            </a:r>
+            <a:r>
+              <a:rPr lang="en-IN" sz="1200">
+                <a:solidFill>
+                  <a:srgbClr val="0070C0"/>
+                </a:solidFill>
+              </a:rPr>
+              <a:t>Step 1: Then it’s a private message. Next to extract user name to whom it was intended</a:t>
+            </a:r>
+          </a:p>
+          <a:p>
+            <a:r>
+              <a:rPr lang="en-IN" sz="1200"/>
+              <a:t>}</a:t>
+            </a:r>
+          </a:p>
+          <a:p>
+            <a:r>
+              <a:rPr lang="en-IN" sz="1200"/>
+              <a:t>Else</a:t>
+            </a:r>
+          </a:p>
+          <a:p>
+            <a:r>
+              <a:rPr lang="en-IN" sz="1200"/>
+              <a:t>{</a:t>
+            </a:r>
+          </a:p>
+          <a:p>
+            <a:r>
+              <a:rPr lang="en-IN" sz="1200"/>
+              <a:t>	Step 2: Broadcast message to all (usual stuff)</a:t>
+            </a:r>
+          </a:p>
+          <a:p>
+            <a:r>
+              <a:rPr lang="en-IN" sz="1200"/>
+              <a:t>}</a:t>
+            </a:r>
+          </a:p>
+          <a:p>
+            <a:endParaRPr lang="en-IN" sz="1200"/>
+          </a:p>
+          <a:p>
+            <a:r>
+              <a:rPr lang="en-IN" sz="1200"/>
+              <a:t>We will look into detail, Step 1 next. (Step 2 is default broadcast, done already)</a:t>
+            </a:r>
+          </a:p>
+          <a:p>
+            <a:r>
+              <a:rPr lang="en-IN" sz="1200" b="1"/>
+              <a:t>Note:</a:t>
+            </a:r>
+          </a:p>
+          <a:p>
+            <a:r>
+              <a:rPr lang="en-IN" sz="1200"/>
+              <a:t>Substr(starting position, no of characters) =&gt; returns extracted string</a:t>
+            </a:r>
+            <a:br>
+              <a:rPr lang="en-IN" sz="1200"/>
+            </a:br>
+            <a:r>
+              <a:rPr lang="en-IN" sz="1200"/>
+              <a:t>indexOf(textTobefound) =&gt; returns starting point of that text in given string</a:t>
+            </a:r>
+          </a:p>
+        </p:txBody>
+      </p:sp>
+      <p:sp>
+        <p:nvSpPr>
+          <p:cNvPr id="5" name="Rectangle 4">
+            <a:extLst>
+              <a:ext uri="{FF2B5EF4-FFF2-40B4-BE49-F238E27FC236}">
+                <a16:creationId xmlns:a16="http://schemas.microsoft.com/office/drawing/2014/main" id="{848FB5FD-BF35-4BE7-8879-834062B1203E}"/>
+              </a:ext>
+            </a:extLst>
+          </p:cNvPr>
+          <p:cNvSpPr/>
+          <p:nvPr/>
+        </p:nvSpPr>
+        <p:spPr>
+          <a:xfrm>
+            <a:off x="164052" y="413712"/>
+            <a:ext cx="746775" cy="276999"/>
+          </a:xfrm>
+          <a:prstGeom prst="rect">
+            <a:avLst/>
+          </a:prstGeom>
+        </p:spPr>
+        <p:txBody>
+          <a:bodyPr wrap="square">
+            <a:spAutoFit/>
+          </a:bodyPr>
+          <a:lstStyle/>
+          <a:p>
+            <a:r>
+              <a:rPr lang="en-IN" sz="1200" b="1"/>
+              <a:t>Logic</a:t>
+            </a:r>
+          </a:p>
+        </p:txBody>
+      </p:sp>
+    </p:spTree>
+    <p:extLst>
+      <p:ext uri="{BB962C8B-B14F-4D97-AF65-F5344CB8AC3E}">
+        <p14:creationId xmlns:p14="http://schemas.microsoft.com/office/powerpoint/2010/main" val="2265886284"/>
+      </p:ext>
+    </p:extLst>
+  </p:cSld>
+  <p:clrMapOvr>
+    <a:masterClrMapping/>
+  </p:clrMapOvr>
+</p:sld>
+</file>
+
+<file path=ppt/slides/slide22.xml><?xml version="1.0" encoding="utf-8"?>
+<p:sld xmlns:a="http://schemas.openxmlformats.org/drawingml/2006/main" xmlns:r="http://schemas.openxmlformats.org/officeDocument/2006/relationships" xmlns:p="http://schemas.openxmlformats.org/presentationml/2006/main">
+  <p:cSld>
+    <p:spTree>
+      <p:nvGrpSpPr>
+        <p:cNvPr id="1" name=""/>
+        <p:cNvGrpSpPr/>
+        <p:nvPr/>
+      </p:nvGrpSpPr>
+      <p:grpSpPr>
+        <a:xfrm>
+          <a:off x="0" y="0"/>
+          <a:ext cx="0" cy="0"/>
+          <a:chOff x="0" y="0"/>
+          <a:chExt cx="0" cy="0"/>
+        </a:xfrm>
+      </p:grpSpPr>
+      <p:sp>
+        <p:nvSpPr>
+          <p:cNvPr id="7" name="TextBox 6">
+            <a:extLst>
+              <a:ext uri="{FF2B5EF4-FFF2-40B4-BE49-F238E27FC236}">
+                <a16:creationId xmlns:a16="http://schemas.microsoft.com/office/drawing/2014/main" id="{342C9C4D-8096-4F7B-9016-6C449FB864BB}"/>
+              </a:ext>
+            </a:extLst>
+          </p:cNvPr>
+          <p:cNvSpPr txBox="1"/>
+          <p:nvPr/>
+        </p:nvSpPr>
+        <p:spPr>
+          <a:xfrm>
+            <a:off x="0" y="0"/>
+            <a:ext cx="910827" cy="369332"/>
+          </a:xfrm>
+          <a:prstGeom prst="rect">
+            <a:avLst/>
+          </a:prstGeom>
+          <a:solidFill>
+            <a:srgbClr val="FFFF00"/>
+          </a:solidFill>
+        </p:spPr>
+        <p:txBody>
+          <a:bodyPr wrap="none" rtlCol="0">
+            <a:spAutoFit/>
+          </a:bodyPr>
+          <a:lstStyle/>
+          <a:p>
+            <a:r>
+              <a:rPr lang="en-IN"/>
+              <a:t>Phase 2</a:t>
+            </a:r>
+          </a:p>
+        </p:txBody>
+      </p:sp>
+      <p:sp>
+        <p:nvSpPr>
+          <p:cNvPr id="5" name="Rectangle 4">
+            <a:extLst>
+              <a:ext uri="{FF2B5EF4-FFF2-40B4-BE49-F238E27FC236}">
+                <a16:creationId xmlns:a16="http://schemas.microsoft.com/office/drawing/2014/main" id="{4C5F7E7C-718F-4A86-A2F5-5CB58385D960}"/>
+              </a:ext>
+            </a:extLst>
+          </p:cNvPr>
+          <p:cNvSpPr/>
+          <p:nvPr/>
+        </p:nvSpPr>
+        <p:spPr>
+          <a:xfrm>
+            <a:off x="70144" y="735091"/>
+            <a:ext cx="6663555" cy="2862322"/>
+          </a:xfrm>
+          <a:prstGeom prst="rect">
+            <a:avLst/>
+          </a:prstGeom>
+        </p:spPr>
+        <p:txBody>
+          <a:bodyPr wrap="none">
+            <a:spAutoFit/>
+          </a:bodyPr>
+          <a:lstStyle/>
+          <a:p>
+            <a:r>
+              <a:rPr lang="en-IN" sz="1200"/>
+              <a:t>If </a:t>
+            </a:r>
+            <a:r>
+              <a:rPr lang="en-IN" sz="1200">
+                <a:solidFill>
+                  <a:srgbClr val="0070C0"/>
+                </a:solidFill>
+              </a:rPr>
+              <a:t>(incomingMessage.substr(0,1) === “@”)</a:t>
+            </a:r>
+          </a:p>
+          <a:p>
+            <a:r>
+              <a:rPr lang="en-IN" sz="1200"/>
+              <a:t>{</a:t>
+            </a:r>
+          </a:p>
+          <a:p>
+            <a:r>
+              <a:rPr lang="en-IN" sz="1200"/>
+              <a:t>	</a:t>
+            </a:r>
+            <a:r>
+              <a:rPr lang="en-IN" sz="1200">
+                <a:solidFill>
+                  <a:srgbClr val="0070C0"/>
+                </a:solidFill>
+              </a:rPr>
+              <a:t>Step 1: Then it’s a private message. Next to extract user name to whom it was intended</a:t>
+            </a:r>
+          </a:p>
+          <a:p>
+            <a:r>
+              <a:rPr lang="en-IN" sz="1200">
+                <a:solidFill>
+                  <a:srgbClr val="0070C0"/>
+                </a:solidFill>
+              </a:rPr>
+              <a:t>	1.1 Get the raw message excluding “@”</a:t>
+            </a:r>
+          </a:p>
+          <a:p>
+            <a:r>
+              <a:rPr lang="en-IN" sz="1200">
+                <a:solidFill>
+                  <a:srgbClr val="0070C0"/>
+                </a:solidFill>
+              </a:rPr>
+              <a:t>	1.2 If nothing after user name, it means user forgot to write message</a:t>
+            </a:r>
+            <a:r>
+              <a:rPr lang="en-IN" sz="1200">
+                <a:solidFill>
+                  <a:srgbClr val="FF0000"/>
+                </a:solidFill>
+              </a:rPr>
+              <a:t>. Return error in cb.</a:t>
+            </a:r>
+          </a:p>
+          <a:p>
+            <a:r>
+              <a:rPr lang="en-IN" sz="1200">
+                <a:solidFill>
+                  <a:srgbClr val="0070C0"/>
+                </a:solidFill>
+              </a:rPr>
+              <a:t>	1.3 If there is something after user name, then investigate further</a:t>
+            </a:r>
+          </a:p>
+          <a:p>
+            <a:r>
+              <a:rPr lang="en-IN" sz="1200">
+                <a:solidFill>
+                  <a:srgbClr val="0070C0"/>
+                </a:solidFill>
+              </a:rPr>
+              <a:t>		1.4.1 Get user name (characters before first occurance of “ “)</a:t>
+            </a:r>
+          </a:p>
+          <a:p>
+            <a:r>
+              <a:rPr lang="en-IN" sz="1200">
+                <a:solidFill>
+                  <a:srgbClr val="0070C0"/>
+                </a:solidFill>
+              </a:rPr>
+              <a:t>		1.4.2 Get message (characters after that)</a:t>
+            </a:r>
+          </a:p>
+          <a:p>
+            <a:r>
+              <a:rPr lang="en-IN" sz="1200">
+                <a:solidFill>
+                  <a:srgbClr val="0070C0"/>
+                </a:solidFill>
+              </a:rPr>
+              <a:t>		1.4.3 If user is not online (check in usersArray), </a:t>
+            </a:r>
+            <a:r>
+              <a:rPr lang="en-IN" sz="1200">
+                <a:solidFill>
+                  <a:srgbClr val="FF0000"/>
+                </a:solidFill>
+              </a:rPr>
+              <a:t>return error in cb</a:t>
+            </a:r>
+          </a:p>
+          <a:p>
+            <a:r>
+              <a:rPr lang="en-IN" sz="1200">
+                <a:solidFill>
+                  <a:srgbClr val="0070C0"/>
+                </a:solidFill>
+              </a:rPr>
+              <a:t>		1.4.4 If not, do 2 things:</a:t>
+            </a:r>
+          </a:p>
+          <a:p>
+            <a:r>
+              <a:rPr lang="en-IN" sz="1200">
+                <a:solidFill>
+                  <a:srgbClr val="0070C0"/>
+                </a:solidFill>
+              </a:rPr>
+              <a:t>			1.4.4.1 </a:t>
+            </a:r>
+            <a:r>
+              <a:rPr lang="en-IN" sz="1200" b="1">
+                <a:solidFill>
+                  <a:srgbClr val="FF0000"/>
+                </a:solidFill>
+              </a:rPr>
+              <a:t>Whisper</a:t>
+            </a:r>
+            <a:r>
+              <a:rPr lang="en-IN" sz="1200">
+                <a:solidFill>
+                  <a:srgbClr val="0070C0"/>
+                </a:solidFill>
+              </a:rPr>
+              <a:t> to intended recipient socket (get that socket from usersArray)</a:t>
+            </a:r>
+          </a:p>
+          <a:p>
+            <a:r>
+              <a:rPr lang="en-IN" sz="1200">
+                <a:solidFill>
+                  <a:srgbClr val="0070C0"/>
+                </a:solidFill>
+              </a:rPr>
+              <a:t>			1.4.4.2 To one who sent private message, broadcast </a:t>
+            </a:r>
+            <a:r>
+              <a:rPr lang="en-IN" sz="1200" b="1">
+                <a:solidFill>
+                  <a:srgbClr val="FF0000"/>
+                </a:solidFill>
+              </a:rPr>
+              <a:t>Private</a:t>
+            </a:r>
+            <a:r>
+              <a:rPr lang="en-IN" sz="1200">
+                <a:solidFill>
+                  <a:srgbClr val="0070C0"/>
+                </a:solidFill>
+              </a:rPr>
+              <a:t> event with his socket </a:t>
+            </a:r>
+          </a:p>
+          <a:p>
+            <a:r>
+              <a:rPr lang="en-IN" sz="1200">
+                <a:solidFill>
+                  <a:srgbClr val="0070C0"/>
+                </a:solidFill>
+              </a:rPr>
+              <a:t>			itself  (so it goes to him only)</a:t>
+            </a:r>
+          </a:p>
+          <a:p>
+            <a:r>
+              <a:rPr lang="en-IN" sz="1200">
+                <a:solidFill>
+                  <a:srgbClr val="0070C0"/>
+                </a:solidFill>
+              </a:rPr>
+              <a:t>				</a:t>
+            </a:r>
+          </a:p>
+          <a:p>
+            <a:r>
+              <a:rPr lang="en-IN" sz="1200"/>
+              <a:t>}</a:t>
+            </a:r>
+          </a:p>
+        </p:txBody>
+      </p:sp>
+      <p:sp>
+        <p:nvSpPr>
+          <p:cNvPr id="3" name="Rectangle 2">
+            <a:extLst>
+              <a:ext uri="{FF2B5EF4-FFF2-40B4-BE49-F238E27FC236}">
+                <a16:creationId xmlns:a16="http://schemas.microsoft.com/office/drawing/2014/main" id="{85B1ED58-6F46-41B0-A870-774487A618F0}"/>
+              </a:ext>
+            </a:extLst>
+          </p:cNvPr>
+          <p:cNvSpPr/>
+          <p:nvPr/>
+        </p:nvSpPr>
+        <p:spPr>
+          <a:xfrm>
+            <a:off x="74521" y="3597413"/>
+            <a:ext cx="6374405" cy="1015663"/>
+          </a:xfrm>
+          <a:prstGeom prst="rect">
+            <a:avLst/>
+          </a:prstGeom>
+        </p:spPr>
+        <p:txBody>
+          <a:bodyPr wrap="square">
+            <a:spAutoFit/>
+          </a:bodyPr>
+          <a:lstStyle/>
+          <a:p>
+            <a:pPr lvl="0"/>
+            <a:r>
+              <a:rPr lang="en-IN" sz="1200" b="1">
+                <a:solidFill>
+                  <a:prstClr val="black"/>
+                </a:solidFill>
+              </a:rPr>
+              <a:t>Note:</a:t>
+            </a:r>
+          </a:p>
+          <a:p>
+            <a:pPr lvl="0"/>
+            <a:r>
+              <a:rPr lang="en-IN" sz="1200">
+                <a:solidFill>
+                  <a:prstClr val="black"/>
+                </a:solidFill>
+              </a:rPr>
+              <a:t>Due to possibility of returning error message in call back,  client side “New Message Event” should </a:t>
+            </a:r>
+          </a:p>
+          <a:p>
+            <a:pPr lvl="0"/>
+            <a:r>
+              <a:rPr lang="en-IN" sz="1200">
+                <a:solidFill>
+                  <a:prstClr val="black"/>
+                </a:solidFill>
+              </a:rPr>
+              <a:t>Handle callback now (so far we did not)</a:t>
+            </a:r>
+          </a:p>
+          <a:p>
+            <a:pPr lvl="0"/>
+            <a:endParaRPr lang="en-IN" sz="1200">
+              <a:solidFill>
+                <a:prstClr val="black"/>
+              </a:solidFill>
+            </a:endParaRPr>
+          </a:p>
+          <a:p>
+            <a:pPr lvl="0"/>
+            <a:r>
+              <a:rPr lang="en-IN" sz="1200">
+                <a:solidFill>
+                  <a:prstClr val="black"/>
+                </a:solidFill>
+              </a:rPr>
+              <a:t>For diff private message style, lets us a css class : whisper</a:t>
+            </a:r>
+            <a:endParaRPr lang="en-IN"/>
+          </a:p>
+        </p:txBody>
+      </p:sp>
+      <p:sp>
+        <p:nvSpPr>
+          <p:cNvPr id="8" name="Rectangle 7">
+            <a:extLst>
+              <a:ext uri="{FF2B5EF4-FFF2-40B4-BE49-F238E27FC236}">
+                <a16:creationId xmlns:a16="http://schemas.microsoft.com/office/drawing/2014/main" id="{C0D4F0F2-F66D-4AB5-BAC4-1AC0D692F4FC}"/>
+              </a:ext>
+            </a:extLst>
+          </p:cNvPr>
+          <p:cNvSpPr/>
+          <p:nvPr/>
+        </p:nvSpPr>
+        <p:spPr>
+          <a:xfrm>
+            <a:off x="70144" y="423163"/>
+            <a:ext cx="746775" cy="276999"/>
+          </a:xfrm>
+          <a:prstGeom prst="rect">
+            <a:avLst/>
+          </a:prstGeom>
+        </p:spPr>
+        <p:txBody>
+          <a:bodyPr wrap="square">
+            <a:spAutoFit/>
+          </a:bodyPr>
+          <a:lstStyle/>
+          <a:p>
+            <a:r>
+              <a:rPr lang="en-IN" sz="1200" b="1"/>
+              <a:t>Logic</a:t>
+            </a:r>
+          </a:p>
+        </p:txBody>
+      </p:sp>
+    </p:spTree>
+    <p:extLst>
+      <p:ext uri="{BB962C8B-B14F-4D97-AF65-F5344CB8AC3E}">
+        <p14:creationId xmlns:p14="http://schemas.microsoft.com/office/powerpoint/2010/main" val="2895276221"/>
+      </p:ext>
+    </p:extLst>
+  </p:cSld>
+  <p:clrMapOvr>
+    <a:masterClrMapping/>
+  </p:clrMapOvr>
+</p:sld>
+</file>
+
+<file path=ppt/slides/slide23.xml><?xml version="1.0" encoding="utf-8"?>
+<p:sld xmlns:a="http://schemas.openxmlformats.org/drawingml/2006/main" xmlns:r="http://schemas.openxmlformats.org/officeDocument/2006/relationships" xmlns:p="http://schemas.openxmlformats.org/presentationml/2006/main">
+  <p:cSld>
+    <p:spTree>
+      <p:nvGrpSpPr>
+        <p:cNvPr id="1" name=""/>
+        <p:cNvGrpSpPr/>
+        <p:nvPr/>
+      </p:nvGrpSpPr>
+      <p:grpSpPr>
+        <a:xfrm>
+          <a:off x="0" y="0"/>
+          <a:ext cx="0" cy="0"/>
+          <a:chOff x="0" y="0"/>
+          <a:chExt cx="0" cy="0"/>
+        </a:xfrm>
+      </p:grpSpPr>
+      <p:sp>
+        <p:nvSpPr>
+          <p:cNvPr id="7" name="TextBox 6">
+            <a:extLst>
+              <a:ext uri="{FF2B5EF4-FFF2-40B4-BE49-F238E27FC236}">
+                <a16:creationId xmlns:a16="http://schemas.microsoft.com/office/drawing/2014/main" id="{342C9C4D-8096-4F7B-9016-6C449FB864BB}"/>
+              </a:ext>
+            </a:extLst>
+          </p:cNvPr>
+          <p:cNvSpPr txBox="1"/>
+          <p:nvPr/>
+        </p:nvSpPr>
+        <p:spPr>
+          <a:xfrm>
+            <a:off x="0" y="0"/>
+            <a:ext cx="910827" cy="369332"/>
+          </a:xfrm>
+          <a:prstGeom prst="rect">
+            <a:avLst/>
+          </a:prstGeom>
+          <a:solidFill>
+            <a:srgbClr val="FFFF00"/>
+          </a:solidFill>
+        </p:spPr>
+        <p:txBody>
+          <a:bodyPr wrap="none" rtlCol="0">
+            <a:spAutoFit/>
+          </a:bodyPr>
+          <a:lstStyle/>
+          <a:p>
+            <a:r>
+              <a:rPr lang="en-IN"/>
+              <a:t>Phase 2</a:t>
+            </a:r>
+          </a:p>
+        </p:txBody>
+      </p:sp>
+      <p:sp>
+        <p:nvSpPr>
+          <p:cNvPr id="8" name="Rectangle 7">
+            <a:extLst>
+              <a:ext uri="{FF2B5EF4-FFF2-40B4-BE49-F238E27FC236}">
+                <a16:creationId xmlns:a16="http://schemas.microsoft.com/office/drawing/2014/main" id="{C0D4F0F2-F66D-4AB5-BAC4-1AC0D692F4FC}"/>
+              </a:ext>
+            </a:extLst>
+          </p:cNvPr>
+          <p:cNvSpPr/>
+          <p:nvPr/>
+        </p:nvSpPr>
+        <p:spPr>
+          <a:xfrm>
+            <a:off x="156771" y="452039"/>
+            <a:ext cx="1768281" cy="276999"/>
+          </a:xfrm>
+          <a:prstGeom prst="rect">
+            <a:avLst/>
+          </a:prstGeom>
+        </p:spPr>
+        <p:txBody>
+          <a:bodyPr wrap="square">
+            <a:spAutoFit/>
+          </a:bodyPr>
+          <a:lstStyle/>
+          <a:p>
+            <a:r>
+              <a:rPr lang="en-IN" sz="1200" b="1"/>
+              <a:t>Summary before coding</a:t>
+            </a:r>
+          </a:p>
+        </p:txBody>
+      </p:sp>
+      <p:graphicFrame>
+        <p:nvGraphicFramePr>
+          <p:cNvPr id="4" name="Table 3">
+            <a:extLst>
+              <a:ext uri="{FF2B5EF4-FFF2-40B4-BE49-F238E27FC236}">
+                <a16:creationId xmlns:a16="http://schemas.microsoft.com/office/drawing/2014/main" id="{B9581074-D0B7-4EA3-9375-2ADCCE1983B3}"/>
+              </a:ext>
+            </a:extLst>
+          </p:cNvPr>
+          <p:cNvGraphicFramePr>
+            <a:graphicFrameLocks noGrp="1"/>
+          </p:cNvGraphicFramePr>
+          <p:nvPr>
+            <p:extLst>
+              <p:ext uri="{D42A27DB-BD31-4B8C-83A1-F6EECF244321}">
+                <p14:modId xmlns:p14="http://schemas.microsoft.com/office/powerpoint/2010/main" val="101320215"/>
+              </p:ext>
+            </p:extLst>
+          </p:nvPr>
+        </p:nvGraphicFramePr>
+        <p:xfrm>
+          <a:off x="320658" y="729039"/>
+          <a:ext cx="5493004" cy="3642742"/>
+        </p:xfrm>
+        <a:graphic>
+          <a:graphicData uri="http://schemas.openxmlformats.org/drawingml/2006/table">
+            <a:tbl>
+              <a:tblPr firstRow="1" bandRow="1">
+                <a:tableStyleId>{073A0DAA-6AF3-43AB-8588-CEC1D06C72B9}</a:tableStyleId>
+              </a:tblPr>
+              <a:tblGrid>
+                <a:gridCol w="2746502">
+                  <a:extLst>
+                    <a:ext uri="{9D8B030D-6E8A-4147-A177-3AD203B41FA5}">
+                      <a16:colId xmlns:a16="http://schemas.microsoft.com/office/drawing/2014/main" val="198004692"/>
+                    </a:ext>
+                  </a:extLst>
+                </a:gridCol>
+                <a:gridCol w="2746502">
+                  <a:extLst>
+                    <a:ext uri="{9D8B030D-6E8A-4147-A177-3AD203B41FA5}">
+                      <a16:colId xmlns:a16="http://schemas.microsoft.com/office/drawing/2014/main" val="869521293"/>
+                    </a:ext>
+                  </a:extLst>
+                </a:gridCol>
+              </a:tblGrid>
+              <a:tr h="232790">
+                <a:tc>
+                  <a:txBody>
+                    <a:bodyPr/>
+                    <a:lstStyle/>
+                    <a:p>
+                      <a:r>
+                        <a:rPr lang="en-IN"/>
+                        <a:t>Client</a:t>
+                      </a:r>
+                    </a:p>
+                  </a:txBody>
+                  <a:tcPr/>
+                </a:tc>
+                <a:tc>
+                  <a:txBody>
+                    <a:bodyPr/>
+                    <a:lstStyle/>
+                    <a:p>
+                      <a:r>
+                        <a:rPr lang="en-IN"/>
+                        <a:t>Server</a:t>
+                      </a:r>
+                    </a:p>
+                  </a:txBody>
+                  <a:tcPr/>
+                </a:tc>
+                <a:extLst>
+                  <a:ext uri="{0D108BD9-81ED-4DB2-BD59-A6C34878D82A}">
+                    <a16:rowId xmlns:a16="http://schemas.microsoft.com/office/drawing/2014/main" val="1358249765"/>
+                  </a:ext>
+                </a:extLst>
+              </a:tr>
+              <a:tr h="2109332">
+                <a:tc>
+                  <a:txBody>
+                    <a:bodyPr/>
+                    <a:lstStyle/>
+                    <a:p>
+                      <a:r>
+                        <a:rPr lang="en-IN"/>
+                        <a:t>1. Send “New Message Event” with call back as it could be a private msg also. In case, data available in cb, print that (so sender knows there is an error)</a:t>
+                      </a:r>
+                    </a:p>
+                  </a:txBody>
+                  <a:tcPr/>
+                </a:tc>
+                <a:tc>
+                  <a:txBody>
+                    <a:bodyPr/>
+                    <a:lstStyle/>
+                    <a:p>
+                      <a:r>
+                        <a:rPr lang="en-IN"/>
+                        <a:t>1. Validate “New message event” for private message. </a:t>
+                      </a:r>
+                    </a:p>
+                    <a:p>
+                      <a:endParaRPr lang="en-IN"/>
+                    </a:p>
+                    <a:p>
+                      <a:r>
+                        <a:rPr lang="en-IN"/>
+                        <a:t>1.1 If only username, notify via cb</a:t>
+                      </a:r>
+                    </a:p>
+                    <a:p>
+                      <a:r>
+                        <a:rPr lang="en-IN"/>
+                        <a:t>1.2 If user not online, notify via cb</a:t>
+                      </a:r>
+                    </a:p>
+                    <a:p>
+                      <a:endParaRPr lang="en-IN"/>
+                    </a:p>
+                    <a:p>
+                      <a:r>
+                        <a:rPr lang="en-IN"/>
+                        <a:t>1.3 If user online, emit 2 events</a:t>
+                      </a:r>
+                    </a:p>
+                    <a:p>
+                      <a:endParaRPr lang="en-IN"/>
+                    </a:p>
+                    <a:p>
+                      <a:r>
+                        <a:rPr lang="en-IN" b="1"/>
+                        <a:t>Whisper</a:t>
+                      </a:r>
+                      <a:r>
+                        <a:rPr lang="en-IN"/>
+                        <a:t>: To intended recipient (emit via recipient socket from usersArray)</a:t>
+                      </a:r>
+                    </a:p>
+                    <a:p>
+                      <a:endParaRPr lang="en-IN"/>
+                    </a:p>
+                    <a:p>
+                      <a:r>
+                        <a:rPr lang="en-IN" b="1"/>
+                        <a:t>Private</a:t>
+                      </a:r>
+                      <a:r>
+                        <a:rPr lang="en-IN"/>
+                        <a:t>: To sender (emit via his own socket)</a:t>
+                      </a:r>
+                    </a:p>
+                  </a:txBody>
+                  <a:tcPr/>
+                </a:tc>
+                <a:extLst>
+                  <a:ext uri="{0D108BD9-81ED-4DB2-BD59-A6C34878D82A}">
+                    <a16:rowId xmlns:a16="http://schemas.microsoft.com/office/drawing/2014/main" val="3275032513"/>
+                  </a:ext>
+                </a:extLst>
+              </a:tr>
+              <a:tr h="750070">
+                <a:tc>
+                  <a:txBody>
+                    <a:bodyPr/>
+                    <a:lstStyle/>
+                    <a:p>
+                      <a:r>
+                        <a:rPr lang="en-IN"/>
+                        <a:t>2. Implement 2 event listeners.</a:t>
+                      </a:r>
+                    </a:p>
+                    <a:p>
+                      <a:r>
+                        <a:rPr lang="en-IN" b="1"/>
+                        <a:t>Whisper</a:t>
+                      </a:r>
+                      <a:r>
+                        <a:rPr lang="en-IN"/>
+                        <a:t>: Just print in chat window</a:t>
+                      </a:r>
+                    </a:p>
+                    <a:p>
+                      <a:r>
+                        <a:rPr lang="en-IN" b="1"/>
+                        <a:t>Private</a:t>
+                      </a:r>
+                      <a:r>
+                        <a:rPr lang="en-IN"/>
+                        <a:t> : Just print in chat window</a:t>
+                      </a:r>
+                    </a:p>
+                    <a:p>
+                      <a:r>
+                        <a:rPr lang="en-IN"/>
+                        <a:t>(use diff style for private – use CSS)</a:t>
+                      </a:r>
+                    </a:p>
+                  </a:txBody>
+                  <a:tcPr/>
+                </a:tc>
+                <a:tc>
+                  <a:txBody>
+                    <a:bodyPr/>
+                    <a:lstStyle/>
+                    <a:p>
+                      <a:endParaRPr lang="en-IN"/>
+                    </a:p>
+                  </a:txBody>
+                  <a:tcPr/>
+                </a:tc>
+                <a:extLst>
+                  <a:ext uri="{0D108BD9-81ED-4DB2-BD59-A6C34878D82A}">
+                    <a16:rowId xmlns:a16="http://schemas.microsoft.com/office/drawing/2014/main" val="591222457"/>
+                  </a:ext>
+                </a:extLst>
+              </a:tr>
+            </a:tbl>
+          </a:graphicData>
+        </a:graphic>
+      </p:graphicFrame>
+    </p:spTree>
+    <p:extLst>
+      <p:ext uri="{BB962C8B-B14F-4D97-AF65-F5344CB8AC3E}">
+        <p14:creationId xmlns:p14="http://schemas.microsoft.com/office/powerpoint/2010/main" val="3276558391"/>
+      </p:ext>
+    </p:extLst>
+  </p:cSld>
+  <p:clrMapOvr>
+    <a:masterClrMapping/>
+  </p:clrMapOvr>
+</p:sld>
+</file>
+
+<file path=ppt/slides/slide24.xml><?xml version="1.0" encoding="utf-8"?>
+<p:sld xmlns:a="http://schemas.openxmlformats.org/drawingml/2006/main" xmlns:r="http://schemas.openxmlformats.org/officeDocument/2006/relationships" xmlns:p="http://schemas.openxmlformats.org/presentationml/2006/main">
+  <p:cSld>
+    <p:spTree>
+      <p:nvGrpSpPr>
+        <p:cNvPr id="1" name=""/>
+        <p:cNvGrpSpPr/>
+        <p:nvPr/>
+      </p:nvGrpSpPr>
+      <p:grpSpPr>
+        <a:xfrm>
+          <a:off x="0" y="0"/>
+          <a:ext cx="0" cy="0"/>
+          <a:chOff x="0" y="0"/>
+          <a:chExt cx="0" cy="0"/>
+        </a:xfrm>
+      </p:grpSpPr>
+      <p:sp>
+        <p:nvSpPr>
+          <p:cNvPr id="7" name="TextBox 6">
+            <a:extLst>
+              <a:ext uri="{FF2B5EF4-FFF2-40B4-BE49-F238E27FC236}">
+                <a16:creationId xmlns:a16="http://schemas.microsoft.com/office/drawing/2014/main" id="{342C9C4D-8096-4F7B-9016-6C449FB864BB}"/>
+              </a:ext>
+            </a:extLst>
+          </p:cNvPr>
+          <p:cNvSpPr txBox="1"/>
+          <p:nvPr/>
+        </p:nvSpPr>
+        <p:spPr>
+          <a:xfrm>
+            <a:off x="0" y="0"/>
+            <a:ext cx="910827" cy="369332"/>
+          </a:xfrm>
+          <a:prstGeom prst="rect">
+            <a:avLst/>
+          </a:prstGeom>
+          <a:solidFill>
+            <a:srgbClr val="FFFF00"/>
+          </a:solidFill>
+        </p:spPr>
+        <p:txBody>
+          <a:bodyPr wrap="none" rtlCol="0">
+            <a:spAutoFit/>
+          </a:bodyPr>
+          <a:lstStyle/>
+          <a:p>
+            <a:r>
+              <a:rPr lang="en-IN"/>
+              <a:t>Phase 2</a:t>
+            </a:r>
+          </a:p>
+        </p:txBody>
+      </p:sp>
+      <p:pic>
+        <p:nvPicPr>
+          <p:cNvPr id="10" name="Picture 9">
+            <a:extLst>
+              <a:ext uri="{FF2B5EF4-FFF2-40B4-BE49-F238E27FC236}">
+                <a16:creationId xmlns:a16="http://schemas.microsoft.com/office/drawing/2014/main" id="{EEE7C185-C05C-4BAB-95E6-7D0FD2BBC3C0}"/>
+              </a:ext>
+            </a:extLst>
+          </p:cNvPr>
+          <p:cNvPicPr>
+            <a:picLocks noChangeAspect="1"/>
+          </p:cNvPicPr>
+          <p:nvPr/>
+        </p:nvPicPr>
+        <p:blipFill>
+          <a:blip r:embed="rId2">
+            <a:extLst>
+              <a:ext uri="{28A0092B-C50C-407E-A947-70E740481C1C}">
+                <a14:useLocalDpi xmlns:a14="http://schemas.microsoft.com/office/drawing/2010/main" val="0"/>
+              </a:ext>
+            </a:extLst>
+          </a:blip>
+          <a:stretch>
+            <a:fillRect/>
+          </a:stretch>
+        </p:blipFill>
+        <p:spPr>
+          <a:xfrm>
+            <a:off x="1243945" y="272671"/>
+            <a:ext cx="4242456" cy="4214773"/>
+          </a:xfrm>
+          <a:prstGeom prst="rect">
+            <a:avLst/>
+          </a:prstGeom>
+        </p:spPr>
+      </p:pic>
+      <p:sp>
+        <p:nvSpPr>
+          <p:cNvPr id="11" name="Rectangle: Rounded Corners 10">
+            <a:extLst>
+              <a:ext uri="{FF2B5EF4-FFF2-40B4-BE49-F238E27FC236}">
+                <a16:creationId xmlns:a16="http://schemas.microsoft.com/office/drawing/2014/main" id="{98F15B83-24BA-4A13-849D-4787C490E0EA}"/>
+              </a:ext>
+            </a:extLst>
+          </p:cNvPr>
+          <p:cNvSpPr/>
+          <p:nvPr/>
+        </p:nvSpPr>
+        <p:spPr>
+          <a:xfrm>
+            <a:off x="1977627" y="2360806"/>
+            <a:ext cx="3335518" cy="343892"/>
+          </a:xfrm>
+          <a:prstGeom prst="roundRect">
+            <a:avLst/>
+          </a:prstGeom>
+          <a:solidFill>
+            <a:srgbClr val="FFFF00">
+              <a:alpha val="22000"/>
+            </a:srgbClr>
+          </a:solidFill>
+          <a:ln>
+            <a:noFill/>
+          </a:ln>
+        </p:spPr>
+        <p:style>
+          <a:lnRef idx="2">
+            <a:schemeClr val="accent1">
+              <a:shade val="50000"/>
+            </a:schemeClr>
+          </a:lnRef>
+          <a:fillRef idx="1">
+            <a:schemeClr val="accent1"/>
+          </a:fillRef>
+          <a:effectRef idx="0">
+            <a:schemeClr val="accent1"/>
+          </a:effectRef>
+          <a:fontRef idx="minor">
+            <a:schemeClr val="lt1"/>
+          </a:fontRef>
+        </p:style>
+        <p:txBody>
+          <a:bodyPr rtlCol="0" anchor="ctr"/>
+          <a:lstStyle/>
+          <a:p>
+            <a:pPr algn="ctr"/>
+            <a:endParaRPr lang="en-IN"/>
+          </a:p>
+        </p:txBody>
+      </p:sp>
+      <p:sp>
+        <p:nvSpPr>
+          <p:cNvPr id="12" name="Rectangle: Rounded Corners 11">
+            <a:extLst>
+              <a:ext uri="{FF2B5EF4-FFF2-40B4-BE49-F238E27FC236}">
+                <a16:creationId xmlns:a16="http://schemas.microsoft.com/office/drawing/2014/main" id="{1AD3DF20-D58E-4413-B6D4-07787C3CA3BF}"/>
+              </a:ext>
+            </a:extLst>
+          </p:cNvPr>
+          <p:cNvSpPr/>
+          <p:nvPr/>
+        </p:nvSpPr>
+        <p:spPr>
+          <a:xfrm>
+            <a:off x="1977627" y="3658614"/>
+            <a:ext cx="2344116" cy="162616"/>
+          </a:xfrm>
+          <a:prstGeom prst="roundRect">
+            <a:avLst/>
+          </a:prstGeom>
+          <a:solidFill>
+            <a:srgbClr val="FFFF00">
+              <a:alpha val="22000"/>
+            </a:srgbClr>
+          </a:solidFill>
+          <a:ln>
+            <a:noFill/>
+          </a:ln>
+        </p:spPr>
+        <p:style>
+          <a:lnRef idx="2">
+            <a:schemeClr val="accent1">
+              <a:shade val="50000"/>
+            </a:schemeClr>
+          </a:lnRef>
+          <a:fillRef idx="1">
+            <a:schemeClr val="accent1"/>
+          </a:fillRef>
+          <a:effectRef idx="0">
+            <a:schemeClr val="accent1"/>
+          </a:effectRef>
+          <a:fontRef idx="minor">
+            <a:schemeClr val="lt1"/>
+          </a:fontRef>
+        </p:style>
+        <p:txBody>
+          <a:bodyPr rtlCol="0" anchor="ctr"/>
+          <a:lstStyle/>
+          <a:p>
+            <a:pPr algn="ctr"/>
+            <a:endParaRPr lang="en-IN"/>
+          </a:p>
+        </p:txBody>
+      </p:sp>
+      <p:sp>
+        <p:nvSpPr>
+          <p:cNvPr id="13" name="Rectangle 12">
+            <a:extLst>
+              <a:ext uri="{FF2B5EF4-FFF2-40B4-BE49-F238E27FC236}">
+                <a16:creationId xmlns:a16="http://schemas.microsoft.com/office/drawing/2014/main" id="{AB5F13A7-489D-492B-95E3-7BF4F2943696}"/>
+              </a:ext>
+            </a:extLst>
+          </p:cNvPr>
+          <p:cNvSpPr/>
+          <p:nvPr/>
+        </p:nvSpPr>
+        <p:spPr>
+          <a:xfrm>
+            <a:off x="1126579" y="61555"/>
+            <a:ext cx="2588773" cy="246221"/>
+          </a:xfrm>
+          <a:prstGeom prst="rect">
+            <a:avLst/>
+          </a:prstGeom>
+        </p:spPr>
+        <p:txBody>
+          <a:bodyPr wrap="square">
+            <a:spAutoFit/>
+          </a:bodyPr>
+          <a:lstStyle/>
+          <a:p>
+            <a:r>
+              <a:rPr lang="en-IN" sz="1000" b="1"/>
+              <a:t>Server (errors not shown)</a:t>
+            </a:r>
+          </a:p>
+        </p:txBody>
+      </p:sp>
+    </p:spTree>
+    <p:extLst>
+      <p:ext uri="{BB962C8B-B14F-4D97-AF65-F5344CB8AC3E}">
+        <p14:creationId xmlns:p14="http://schemas.microsoft.com/office/powerpoint/2010/main" val="469406636"/>
+      </p:ext>
+    </p:extLst>
+  </p:cSld>
+  <p:clrMapOvr>
+    <a:masterClrMapping/>
+  </p:clrMapOvr>
+</p:sld>
+</file>
+
+<file path=ppt/slides/slide25.xml><?xml version="1.0" encoding="utf-8"?>
+<p:sld xmlns:a="http://schemas.openxmlformats.org/drawingml/2006/main" xmlns:r="http://schemas.openxmlformats.org/officeDocument/2006/relationships" xmlns:p="http://schemas.openxmlformats.org/presentationml/2006/main">
+  <p:cSld>
+    <p:spTree>
+      <p:nvGrpSpPr>
+        <p:cNvPr id="1" name=""/>
+        <p:cNvGrpSpPr/>
+        <p:nvPr/>
+      </p:nvGrpSpPr>
+      <p:grpSpPr>
+        <a:xfrm>
+          <a:off x="0" y="0"/>
+          <a:ext cx="0" cy="0"/>
+          <a:chOff x="0" y="0"/>
+          <a:chExt cx="0" cy="0"/>
+        </a:xfrm>
+      </p:grpSpPr>
+      <p:sp>
+        <p:nvSpPr>
+          <p:cNvPr id="7" name="TextBox 6">
+            <a:extLst>
+              <a:ext uri="{FF2B5EF4-FFF2-40B4-BE49-F238E27FC236}">
+                <a16:creationId xmlns:a16="http://schemas.microsoft.com/office/drawing/2014/main" id="{342C9C4D-8096-4F7B-9016-6C449FB864BB}"/>
+              </a:ext>
+            </a:extLst>
+          </p:cNvPr>
+          <p:cNvSpPr txBox="1"/>
+          <p:nvPr/>
+        </p:nvSpPr>
+        <p:spPr>
+          <a:xfrm>
+            <a:off x="0" y="0"/>
+            <a:ext cx="910827" cy="369332"/>
+          </a:xfrm>
+          <a:prstGeom prst="rect">
+            <a:avLst/>
+          </a:prstGeom>
+          <a:solidFill>
+            <a:srgbClr val="FFFF00"/>
+          </a:solidFill>
+        </p:spPr>
+        <p:txBody>
+          <a:bodyPr wrap="none" rtlCol="0">
+            <a:spAutoFit/>
+          </a:bodyPr>
+          <a:lstStyle/>
+          <a:p>
+            <a:r>
+              <a:rPr lang="en-IN"/>
+              <a:t>Phase 2</a:t>
+            </a:r>
+          </a:p>
+        </p:txBody>
+      </p:sp>
+      <p:sp>
+        <p:nvSpPr>
+          <p:cNvPr id="13" name="Rectangle 12">
+            <a:extLst>
+              <a:ext uri="{FF2B5EF4-FFF2-40B4-BE49-F238E27FC236}">
+                <a16:creationId xmlns:a16="http://schemas.microsoft.com/office/drawing/2014/main" id="{AB5F13A7-489D-492B-95E3-7BF4F2943696}"/>
+              </a:ext>
+            </a:extLst>
+          </p:cNvPr>
+          <p:cNvSpPr/>
+          <p:nvPr/>
+        </p:nvSpPr>
+        <p:spPr>
+          <a:xfrm>
+            <a:off x="0" y="375733"/>
+            <a:ext cx="3609474" cy="246221"/>
+          </a:xfrm>
+          <a:prstGeom prst="rect">
+            <a:avLst/>
+          </a:prstGeom>
+        </p:spPr>
+        <p:txBody>
+          <a:bodyPr wrap="square">
+            <a:spAutoFit/>
+          </a:bodyPr>
+          <a:lstStyle/>
+          <a:p>
+            <a:r>
+              <a:rPr lang="en-IN" sz="1000" b="1"/>
+              <a:t>Client (handling server response about private message)</a:t>
+            </a:r>
+          </a:p>
+        </p:txBody>
+      </p:sp>
+      <p:pic>
+        <p:nvPicPr>
+          <p:cNvPr id="3" name="Picture 2">
+            <a:extLst>
+              <a:ext uri="{FF2B5EF4-FFF2-40B4-BE49-F238E27FC236}">
+                <a16:creationId xmlns:a16="http://schemas.microsoft.com/office/drawing/2014/main" id="{D9895232-56C4-46D7-B6BC-24340B8BDC3F}"/>
+              </a:ext>
+            </a:extLst>
+          </p:cNvPr>
+          <p:cNvPicPr>
+            <a:picLocks noChangeAspect="1"/>
+          </p:cNvPicPr>
+          <p:nvPr/>
+        </p:nvPicPr>
+        <p:blipFill>
+          <a:blip r:embed="rId2">
+            <a:extLst>
+              <a:ext uri="{28A0092B-C50C-407E-A947-70E740481C1C}">
+                <a14:useLocalDpi xmlns:a14="http://schemas.microsoft.com/office/drawing/2010/main" val="0"/>
+              </a:ext>
+            </a:extLst>
+          </a:blip>
+          <a:stretch>
+            <a:fillRect/>
+          </a:stretch>
+        </p:blipFill>
+        <p:spPr>
+          <a:xfrm>
+            <a:off x="115503" y="551005"/>
+            <a:ext cx="4212313" cy="2016475"/>
+          </a:xfrm>
+          <a:prstGeom prst="rect">
+            <a:avLst/>
+          </a:prstGeom>
+        </p:spPr>
+      </p:pic>
+      <p:sp>
+        <p:nvSpPr>
+          <p:cNvPr id="9" name="Rectangle: Rounded Corners 8">
+            <a:extLst>
+              <a:ext uri="{FF2B5EF4-FFF2-40B4-BE49-F238E27FC236}">
+                <a16:creationId xmlns:a16="http://schemas.microsoft.com/office/drawing/2014/main" id="{D081D579-5866-4002-84F0-DA455C3D00B0}"/>
+              </a:ext>
+            </a:extLst>
+          </p:cNvPr>
+          <p:cNvSpPr/>
+          <p:nvPr/>
+        </p:nvSpPr>
+        <p:spPr>
+          <a:xfrm>
+            <a:off x="748182" y="1396626"/>
+            <a:ext cx="3429182" cy="140950"/>
+          </a:xfrm>
+          <a:prstGeom prst="roundRect">
+            <a:avLst/>
+          </a:prstGeom>
+          <a:solidFill>
+            <a:srgbClr val="FFFF00">
+              <a:alpha val="22000"/>
+            </a:srgbClr>
+          </a:solidFill>
+          <a:ln>
+            <a:noFill/>
+          </a:ln>
+        </p:spPr>
+        <p:style>
+          <a:lnRef idx="2">
+            <a:schemeClr val="accent1">
+              <a:shade val="50000"/>
+            </a:schemeClr>
+          </a:lnRef>
+          <a:fillRef idx="1">
+            <a:schemeClr val="accent1"/>
+          </a:fillRef>
+          <a:effectRef idx="0">
+            <a:schemeClr val="accent1"/>
+          </a:effectRef>
+          <a:fontRef idx="minor">
+            <a:schemeClr val="lt1"/>
+          </a:fontRef>
+        </p:style>
+        <p:txBody>
+          <a:bodyPr rtlCol="0" anchor="ctr"/>
+          <a:lstStyle/>
+          <a:p>
+            <a:pPr algn="ctr"/>
+            <a:endParaRPr lang="en-IN"/>
+          </a:p>
+        </p:txBody>
+      </p:sp>
+      <p:pic>
+        <p:nvPicPr>
+          <p:cNvPr id="8" name="Picture 7">
+            <a:extLst>
+              <a:ext uri="{FF2B5EF4-FFF2-40B4-BE49-F238E27FC236}">
+                <a16:creationId xmlns:a16="http://schemas.microsoft.com/office/drawing/2014/main" id="{2D44B284-D980-48B7-9C93-9777EC4119BE}"/>
+              </a:ext>
+            </a:extLst>
+          </p:cNvPr>
+          <p:cNvPicPr>
+            <a:picLocks noChangeAspect="1"/>
+          </p:cNvPicPr>
+          <p:nvPr/>
+        </p:nvPicPr>
+        <p:blipFill>
+          <a:blip r:embed="rId3">
+            <a:extLst>
+              <a:ext uri="{28A0092B-C50C-407E-A947-70E740481C1C}">
+                <a14:useLocalDpi xmlns:a14="http://schemas.microsoft.com/office/drawing/2010/main" val="0"/>
+              </a:ext>
+            </a:extLst>
+          </a:blip>
+          <a:stretch>
+            <a:fillRect/>
+          </a:stretch>
+        </p:blipFill>
+        <p:spPr>
+          <a:xfrm>
+            <a:off x="115503" y="2497725"/>
+            <a:ext cx="4639377" cy="2182225"/>
+          </a:xfrm>
+          <a:prstGeom prst="rect">
+            <a:avLst/>
+          </a:prstGeom>
+        </p:spPr>
+      </p:pic>
+    </p:spTree>
+    <p:extLst>
+      <p:ext uri="{BB962C8B-B14F-4D97-AF65-F5344CB8AC3E}">
+        <p14:creationId xmlns:p14="http://schemas.microsoft.com/office/powerpoint/2010/main" val="270839013"/>
+      </p:ext>
+    </p:extLst>
+  </p:cSld>
+  <p:clrMapOvr>
+    <a:masterClrMapping/>
+  </p:clrMapOvr>
+</p:sld>
+</file>
+
+<file path=ppt/slides/slide26.xml><?xml version="1.0" encoding="utf-8"?>
+<p:sld xmlns:a="http://schemas.openxmlformats.org/drawingml/2006/main" xmlns:r="http://schemas.openxmlformats.org/officeDocument/2006/relationships" xmlns:p="http://schemas.openxmlformats.org/presentationml/2006/main">
+  <p:cSld>
+    <p:spTree>
+      <p:nvGrpSpPr>
+        <p:cNvPr id="1" name=""/>
+        <p:cNvGrpSpPr/>
+        <p:nvPr/>
+      </p:nvGrpSpPr>
+      <p:grpSpPr>
+        <a:xfrm>
+          <a:off x="0" y="0"/>
+          <a:ext cx="0" cy="0"/>
+          <a:chOff x="0" y="0"/>
+          <a:chExt cx="0" cy="0"/>
+        </a:xfrm>
+      </p:grpSpPr>
+      <p:sp>
+        <p:nvSpPr>
+          <p:cNvPr id="7" name="TextBox 6">
+            <a:extLst>
+              <a:ext uri="{FF2B5EF4-FFF2-40B4-BE49-F238E27FC236}">
+                <a16:creationId xmlns:a16="http://schemas.microsoft.com/office/drawing/2014/main" id="{342C9C4D-8096-4F7B-9016-6C449FB864BB}"/>
+              </a:ext>
+            </a:extLst>
+          </p:cNvPr>
+          <p:cNvSpPr txBox="1"/>
+          <p:nvPr/>
+        </p:nvSpPr>
+        <p:spPr>
+          <a:xfrm>
+            <a:off x="0" y="0"/>
+            <a:ext cx="910827" cy="369332"/>
+          </a:xfrm>
+          <a:prstGeom prst="rect">
+            <a:avLst/>
+          </a:prstGeom>
+          <a:solidFill>
+            <a:srgbClr val="FFFF00"/>
+          </a:solidFill>
+        </p:spPr>
+        <p:txBody>
+          <a:bodyPr wrap="none" rtlCol="0">
+            <a:spAutoFit/>
+          </a:bodyPr>
+          <a:lstStyle/>
+          <a:p>
+            <a:r>
+              <a:rPr lang="en-IN"/>
+              <a:t>Phase 2</a:t>
+            </a:r>
+          </a:p>
+        </p:txBody>
+      </p:sp>
+      <p:sp>
+        <p:nvSpPr>
+          <p:cNvPr id="8" name="Rectangle 7">
+            <a:extLst>
+              <a:ext uri="{FF2B5EF4-FFF2-40B4-BE49-F238E27FC236}">
+                <a16:creationId xmlns:a16="http://schemas.microsoft.com/office/drawing/2014/main" id="{79F7688C-D777-4B71-A2EB-801705B8DF19}"/>
+              </a:ext>
+            </a:extLst>
+          </p:cNvPr>
+          <p:cNvSpPr/>
+          <p:nvPr/>
+        </p:nvSpPr>
+        <p:spPr>
+          <a:xfrm>
+            <a:off x="78161" y="512737"/>
+            <a:ext cx="3211264" cy="646331"/>
+          </a:xfrm>
+          <a:prstGeom prst="rect">
+            <a:avLst/>
+          </a:prstGeom>
+        </p:spPr>
+        <p:txBody>
+          <a:bodyPr wrap="none">
+            <a:spAutoFit/>
+          </a:bodyPr>
+          <a:lstStyle/>
+          <a:p>
+            <a:r>
+              <a:rPr lang="en-IN" sz="1200">
+                <a:solidFill>
+                  <a:schemeClr val="bg1">
+                    <a:lumMod val="75000"/>
+                  </a:schemeClr>
+                </a:solidFill>
+              </a:rPr>
+              <a:t>2.1 Private messaging (italicized, diff color)</a:t>
+            </a:r>
+          </a:p>
+          <a:p>
+            <a:r>
+              <a:rPr lang="en-IN" sz="1200">
+                <a:solidFill>
+                  <a:schemeClr val="bg1">
+                    <a:lumMod val="75000"/>
+                  </a:schemeClr>
+                </a:solidFill>
+              </a:rPr>
+              <a:t>2.2 When receiver offline, inform sender, it is so.</a:t>
+            </a:r>
+          </a:p>
+          <a:p>
+            <a:r>
+              <a:rPr lang="en-IN" sz="1200"/>
+              <a:t>2.3 Auto Scroll</a:t>
+            </a:r>
+          </a:p>
+        </p:txBody>
+      </p:sp>
+      <p:sp>
+        <p:nvSpPr>
+          <p:cNvPr id="4" name="Rectangle 3">
+            <a:extLst>
+              <a:ext uri="{FF2B5EF4-FFF2-40B4-BE49-F238E27FC236}">
+                <a16:creationId xmlns:a16="http://schemas.microsoft.com/office/drawing/2014/main" id="{C0DD4382-B57E-49BD-A68E-A598C5E4253D}"/>
+              </a:ext>
+            </a:extLst>
+          </p:cNvPr>
+          <p:cNvSpPr/>
+          <p:nvPr/>
+        </p:nvSpPr>
+        <p:spPr>
+          <a:xfrm>
+            <a:off x="78161" y="1159068"/>
+            <a:ext cx="6374405" cy="1569660"/>
+          </a:xfrm>
+          <a:prstGeom prst="rect">
+            <a:avLst/>
+          </a:prstGeom>
+        </p:spPr>
+        <p:txBody>
+          <a:bodyPr wrap="square">
+            <a:spAutoFit/>
+          </a:bodyPr>
+          <a:lstStyle/>
+          <a:p>
+            <a:pPr lvl="0"/>
+            <a:r>
+              <a:rPr lang="en-IN" sz="1200">
+                <a:solidFill>
+                  <a:prstClr val="black"/>
+                </a:solidFill>
+              </a:rPr>
+              <a:t>Let us use 2 divs for chat message window. </a:t>
+            </a:r>
+          </a:p>
+          <a:p>
+            <a:pPr lvl="0"/>
+            <a:r>
+              <a:rPr lang="en-IN" sz="1200">
+                <a:solidFill>
+                  <a:prstClr val="black"/>
+                </a:solidFill>
+              </a:rPr>
+              <a:t>An outer one, say chatWrap (here we enable scroll)</a:t>
+            </a:r>
+          </a:p>
+          <a:p>
+            <a:pPr lvl="0"/>
+            <a:r>
+              <a:rPr lang="en-IN" sz="1200">
+                <a:solidFill>
+                  <a:prstClr val="black"/>
+                </a:solidFill>
+              </a:rPr>
+              <a:t>An inner one, say messagesID, div where we enter chat messages</a:t>
+            </a:r>
+          </a:p>
+          <a:p>
+            <a:pPr lvl="0"/>
+            <a:r>
+              <a:rPr lang="en-IN" sz="1200">
+                <a:solidFill>
+                  <a:prstClr val="black"/>
+                </a:solidFill>
+              </a:rPr>
+              <a:t>Then below code can do the trick of automatically scrolling down as messages fill up div. </a:t>
+            </a:r>
+          </a:p>
+          <a:p>
+            <a:pPr lvl="0"/>
+            <a:endParaRPr lang="en-IN" sz="1200">
+              <a:solidFill>
+                <a:srgbClr val="0070C0"/>
+              </a:solidFill>
+            </a:endParaRPr>
+          </a:p>
+          <a:p>
+            <a:pPr lvl="0"/>
+            <a:r>
+              <a:rPr lang="en-IN" sz="1200">
+                <a:solidFill>
+                  <a:srgbClr val="0070C0"/>
+                </a:solidFill>
+              </a:rPr>
+              <a:t>$("#chatWrap").</a:t>
+            </a:r>
+            <a:r>
+              <a:rPr lang="en-IN" sz="1200" b="1">
+                <a:solidFill>
+                  <a:srgbClr val="0000FF"/>
+                </a:solidFill>
+              </a:rPr>
+              <a:t>scrollTop</a:t>
+            </a:r>
+            <a:r>
+              <a:rPr lang="en-IN" sz="1200">
+                <a:solidFill>
+                  <a:srgbClr val="0070C0"/>
+                </a:solidFill>
+              </a:rPr>
+              <a:t>($("#messagesID").</a:t>
+            </a:r>
+            <a:r>
+              <a:rPr lang="en-IN" sz="1200" b="1">
+                <a:solidFill>
+                  <a:srgbClr val="0000FF"/>
+                </a:solidFill>
+              </a:rPr>
+              <a:t>outerHeight</a:t>
+            </a:r>
+            <a:r>
+              <a:rPr lang="en-IN" sz="1200">
+                <a:solidFill>
+                  <a:srgbClr val="0070C0"/>
+                </a:solidFill>
+              </a:rPr>
+              <a:t>());</a:t>
+            </a:r>
+          </a:p>
+          <a:p>
+            <a:pPr lvl="0"/>
+            <a:endParaRPr lang="en-IN" sz="1200">
+              <a:solidFill>
+                <a:srgbClr val="0070C0"/>
+              </a:solidFill>
+            </a:endParaRPr>
+          </a:p>
+          <a:p>
+            <a:pPr lvl="0"/>
+            <a:r>
+              <a:rPr lang="en-IN" sz="1200"/>
+              <a:t>We will put that in a function, and call whenever we append any msg to messagesID  in client.</a:t>
+            </a:r>
+          </a:p>
+        </p:txBody>
+      </p:sp>
+      <p:pic>
+        <p:nvPicPr>
+          <p:cNvPr id="3" name="Picture 2">
+            <a:extLst>
+              <a:ext uri="{FF2B5EF4-FFF2-40B4-BE49-F238E27FC236}">
+                <a16:creationId xmlns:a16="http://schemas.microsoft.com/office/drawing/2014/main" id="{80195B15-1D7B-416A-A747-41D07CE28B21}"/>
+              </a:ext>
+            </a:extLst>
+          </p:cNvPr>
+          <p:cNvPicPr>
+            <a:picLocks noChangeAspect="1"/>
+          </p:cNvPicPr>
+          <p:nvPr/>
+        </p:nvPicPr>
+        <p:blipFill>
+          <a:blip r:embed="rId2">
+            <a:extLst>
+              <a:ext uri="{28A0092B-C50C-407E-A947-70E740481C1C}">
+                <a14:useLocalDpi xmlns:a14="http://schemas.microsoft.com/office/drawing/2010/main" val="0"/>
+              </a:ext>
+            </a:extLst>
+          </a:blip>
+          <a:stretch>
+            <a:fillRect/>
+          </a:stretch>
+        </p:blipFill>
+        <p:spPr>
+          <a:xfrm>
+            <a:off x="344956" y="2813744"/>
+            <a:ext cx="5588916" cy="1122629"/>
+          </a:xfrm>
+          <a:prstGeom prst="rect">
+            <a:avLst/>
+          </a:prstGeom>
+        </p:spPr>
+      </p:pic>
+      <p:sp>
+        <p:nvSpPr>
+          <p:cNvPr id="9" name="Rectangle: Rounded Corners 8">
+            <a:extLst>
+              <a:ext uri="{FF2B5EF4-FFF2-40B4-BE49-F238E27FC236}">
+                <a16:creationId xmlns:a16="http://schemas.microsoft.com/office/drawing/2014/main" id="{20F9ABF3-74D8-4269-AA8E-B32C583D6526}"/>
+              </a:ext>
+            </a:extLst>
+          </p:cNvPr>
+          <p:cNvSpPr/>
+          <p:nvPr/>
+        </p:nvSpPr>
+        <p:spPr>
+          <a:xfrm>
+            <a:off x="4426085" y="3304583"/>
+            <a:ext cx="1307704" cy="126993"/>
+          </a:xfrm>
+          <a:prstGeom prst="roundRect">
+            <a:avLst/>
+          </a:prstGeom>
+          <a:solidFill>
+            <a:srgbClr val="FFFF00">
+              <a:alpha val="22000"/>
+            </a:srgbClr>
+          </a:solidFill>
+          <a:ln>
+            <a:noFill/>
+          </a:ln>
+        </p:spPr>
+        <p:style>
+          <a:lnRef idx="2">
+            <a:schemeClr val="accent1">
+              <a:shade val="50000"/>
+            </a:schemeClr>
+          </a:lnRef>
+          <a:fillRef idx="1">
+            <a:schemeClr val="accent1"/>
+          </a:fillRef>
+          <a:effectRef idx="0">
+            <a:schemeClr val="accent1"/>
+          </a:effectRef>
+          <a:fontRef idx="minor">
+            <a:schemeClr val="lt1"/>
+          </a:fontRef>
+        </p:style>
+        <p:txBody>
+          <a:bodyPr rtlCol="0" anchor="ctr"/>
+          <a:lstStyle/>
+          <a:p>
+            <a:pPr algn="ctr"/>
+            <a:endParaRPr lang="en-IN"/>
+          </a:p>
+        </p:txBody>
+      </p:sp>
+      <p:sp>
+        <p:nvSpPr>
+          <p:cNvPr id="10" name="Rectangle: Rounded Corners 9">
+            <a:extLst>
+              <a:ext uri="{FF2B5EF4-FFF2-40B4-BE49-F238E27FC236}">
+                <a16:creationId xmlns:a16="http://schemas.microsoft.com/office/drawing/2014/main" id="{8E4CE64D-B1C0-4D24-A8D8-EDABB159DD19}"/>
+              </a:ext>
+            </a:extLst>
+          </p:cNvPr>
+          <p:cNvSpPr/>
+          <p:nvPr/>
+        </p:nvSpPr>
+        <p:spPr>
+          <a:xfrm>
+            <a:off x="1000758" y="3138455"/>
+            <a:ext cx="837770" cy="126993"/>
+          </a:xfrm>
+          <a:prstGeom prst="roundRect">
+            <a:avLst/>
+          </a:prstGeom>
+          <a:solidFill>
+            <a:srgbClr val="FFFF00">
+              <a:alpha val="22000"/>
+            </a:srgbClr>
+          </a:solidFill>
+          <a:ln>
+            <a:noFill/>
+          </a:ln>
+        </p:spPr>
+        <p:style>
+          <a:lnRef idx="2">
+            <a:schemeClr val="accent1">
+              <a:shade val="50000"/>
+            </a:schemeClr>
+          </a:lnRef>
+          <a:fillRef idx="1">
+            <a:schemeClr val="accent1"/>
+          </a:fillRef>
+          <a:effectRef idx="0">
+            <a:schemeClr val="accent1"/>
+          </a:effectRef>
+          <a:fontRef idx="minor">
+            <a:schemeClr val="lt1"/>
+          </a:fontRef>
+        </p:style>
+        <p:txBody>
+          <a:bodyPr rtlCol="0" anchor="ctr"/>
+          <a:lstStyle/>
+          <a:p>
+            <a:pPr algn="ctr"/>
+            <a:endParaRPr lang="en-IN"/>
+          </a:p>
+        </p:txBody>
+      </p:sp>
+      <p:sp>
+        <p:nvSpPr>
+          <p:cNvPr id="11" name="Rectangle: Rounded Corners 10">
+            <a:extLst>
+              <a:ext uri="{FF2B5EF4-FFF2-40B4-BE49-F238E27FC236}">
+                <a16:creationId xmlns:a16="http://schemas.microsoft.com/office/drawing/2014/main" id="{C24AAF08-9AE7-462D-ADD7-F4485A299E29}"/>
+              </a:ext>
+            </a:extLst>
+          </p:cNvPr>
+          <p:cNvSpPr/>
+          <p:nvPr/>
+        </p:nvSpPr>
+        <p:spPr>
+          <a:xfrm>
+            <a:off x="1235725" y="3460075"/>
+            <a:ext cx="914088" cy="126993"/>
+          </a:xfrm>
+          <a:prstGeom prst="roundRect">
+            <a:avLst/>
+          </a:prstGeom>
+          <a:solidFill>
+            <a:srgbClr val="FFFF00">
+              <a:alpha val="22000"/>
+            </a:srgbClr>
+          </a:solidFill>
+          <a:ln>
+            <a:noFill/>
+          </a:ln>
+        </p:spPr>
+        <p:style>
+          <a:lnRef idx="2">
+            <a:schemeClr val="accent1">
+              <a:shade val="50000"/>
+            </a:schemeClr>
+          </a:lnRef>
+          <a:fillRef idx="1">
+            <a:schemeClr val="accent1"/>
+          </a:fillRef>
+          <a:effectRef idx="0">
+            <a:schemeClr val="accent1"/>
+          </a:effectRef>
+          <a:fontRef idx="minor">
+            <a:schemeClr val="lt1"/>
+          </a:fontRef>
+        </p:style>
+        <p:txBody>
+          <a:bodyPr rtlCol="0" anchor="ctr"/>
+          <a:lstStyle/>
+          <a:p>
+            <a:pPr algn="ctr"/>
+            <a:endParaRPr lang="en-IN"/>
+          </a:p>
+        </p:txBody>
+      </p:sp>
+      <p:pic>
+        <p:nvPicPr>
+          <p:cNvPr id="6" name="Picture 5">
+            <a:extLst>
+              <a:ext uri="{FF2B5EF4-FFF2-40B4-BE49-F238E27FC236}">
+                <a16:creationId xmlns:a16="http://schemas.microsoft.com/office/drawing/2014/main" id="{42CD6600-99F1-4854-B272-578ECF715B75}"/>
+              </a:ext>
+            </a:extLst>
+          </p:cNvPr>
+          <p:cNvPicPr>
+            <a:picLocks noChangeAspect="1"/>
+          </p:cNvPicPr>
+          <p:nvPr/>
+        </p:nvPicPr>
+        <p:blipFill>
+          <a:blip r:embed="rId3">
+            <a:extLst>
+              <a:ext uri="{28A0092B-C50C-407E-A947-70E740481C1C}">
+                <a14:useLocalDpi xmlns:a14="http://schemas.microsoft.com/office/drawing/2010/main" val="0"/>
+              </a:ext>
+            </a:extLst>
+          </a:blip>
+          <a:stretch>
+            <a:fillRect/>
+          </a:stretch>
+        </p:blipFill>
+        <p:spPr>
+          <a:xfrm>
+            <a:off x="344956" y="3954051"/>
+            <a:ext cx="3332099" cy="636620"/>
+          </a:xfrm>
+          <a:prstGeom prst="rect">
+            <a:avLst/>
+          </a:prstGeom>
+        </p:spPr>
+      </p:pic>
+    </p:spTree>
+    <p:extLst>
+      <p:ext uri="{BB962C8B-B14F-4D97-AF65-F5344CB8AC3E}">
+        <p14:creationId xmlns:p14="http://schemas.microsoft.com/office/powerpoint/2010/main" val="2549408987"/>
+      </p:ext>
+    </p:extLst>
+  </p:cSld>
+  <p:clrMapOvr>
+    <a:masterClrMapping/>
+  </p:clrMapOvr>
+</p:sld>
+</file>
+
 <file path=ppt/slides/slide3.xml><?xml version="1.0" encoding="utf-8"?>
 <p:sld xmlns:a="http://schemas.openxmlformats.org/drawingml/2006/main" xmlns:r="http://schemas.openxmlformats.org/officeDocument/2006/relationships" xmlns:p="http://schemas.openxmlformats.org/presentationml/2006/main">
   <p:cSld>

</xml_diff>